<commit_message>
ICA / pic2 수정
</commit_message>
<xml_diff>
--- a/pics/2020-07-14_ICA/pics.pptx
+++ b/pics/2020-07-14_ICA/pics.pptx
@@ -11524,6 +11524,66 @@
           <a:chExt cx="0" cy="0"/>
         </a:xfrm>
       </p:grpSpPr>
+      <p:sp>
+        <p:nvSpPr>
+          <p:cNvPr id="120" name="TextBox 119">
+            <a:extLst>
+              <a:ext uri="{FF2B5EF4-FFF2-40B4-BE49-F238E27FC236}">
+                <a16:creationId xmlns:a16="http://schemas.microsoft.com/office/drawing/2014/main" id="{832061C8-0623-48E1-873D-EFB91F385BE2}"/>
+              </a:ext>
+            </a:extLst>
+          </p:cNvPr>
+          <p:cNvSpPr txBox="1"/>
+          <p:nvPr/>
+        </p:nvSpPr>
+        <p:spPr>
+          <a:xfrm>
+            <a:off x="238417" y="313492"/>
+            <a:ext cx="8730852" cy="523220"/>
+          </a:xfrm>
+          <a:prstGeom prst="rect">
+            <a:avLst/>
+          </a:prstGeom>
+          <a:noFill/>
+        </p:spPr>
+        <p:txBody>
+          <a:bodyPr wrap="none" rtlCol="0">
+            <a:spAutoFit/>
+          </a:bodyPr>
+          <a:lstStyle/>
+          <a:p>
+            <a:pPr algn="ctr"/>
+            <a:r>
+              <a:rPr lang="ko-KR" altLang="en-US" sz="2800" b="1" dirty="0"/>
+              <a:t>중심극한정리</a:t>
+            </a:r>
+            <a:r>
+              <a:rPr lang="en-US" altLang="ko-KR" sz="2800" b="1" dirty="0"/>
+              <a:t>(CLT)</a:t>
+            </a:r>
+            <a:r>
+              <a:rPr lang="ko-KR" altLang="en-US" sz="2800" b="1" dirty="0"/>
+              <a:t>와 독립성분분석</a:t>
+            </a:r>
+            <a:r>
+              <a:rPr lang="en-US" altLang="ko-KR" sz="2800" b="1" dirty="0"/>
+              <a:t>(ICA)</a:t>
+            </a:r>
+            <a:r>
+              <a:rPr lang="ko-KR" altLang="en-US" sz="2800" b="1" dirty="0"/>
+              <a:t> 관계</a:t>
+            </a:r>
+            <a:r>
+              <a:rPr lang="en-US" altLang="ko-KR" sz="2800" b="1" dirty="0"/>
+              <a:t> </a:t>
+            </a:r>
+            <a:r>
+              <a:rPr lang="ko-KR" altLang="en-US" sz="2800" b="1" dirty="0"/>
+              <a:t>개요도</a:t>
+            </a:r>
+          </a:p>
+        </p:txBody>
+      </p:sp>
       <p:cxnSp>
         <p:nvCxnSpPr>
           <p:cNvPr id="3" name="직선 화살표 연결선 2">
@@ -11541,13 +11601,13 @@
         </p:nvCxnSpPr>
         <p:spPr>
           <a:xfrm>
-            <a:off x="1850095" y="2805174"/>
-            <a:ext cx="0" cy="1536413"/>
+            <a:off x="1850095" y="2540234"/>
+            <a:ext cx="0" cy="1272475"/>
           </a:xfrm>
           <a:prstGeom prst="straightConnector1">
             <a:avLst/>
           </a:prstGeom>
-          <a:ln w="38100">
+          <a:ln w="19050">
             <a:solidFill>
               <a:schemeClr val="tx1"/>
             </a:solidFill>
@@ -11586,13 +11646,13 @@
         </p:nvCxnSpPr>
         <p:spPr>
           <a:xfrm>
-            <a:off x="2010138" y="2850386"/>
-            <a:ext cx="2368637" cy="1427184"/>
+            <a:off x="2010138" y="2577680"/>
+            <a:ext cx="2368637" cy="1182010"/>
           </a:xfrm>
           <a:prstGeom prst="straightConnector1">
             <a:avLst/>
           </a:prstGeom>
-          <a:ln w="38100">
+          <a:ln w="19050">
             <a:solidFill>
               <a:schemeClr val="tx1"/>
             </a:solidFill>
@@ -11631,13 +11691,13 @@
         </p:nvCxnSpPr>
         <p:spPr>
           <a:xfrm>
-            <a:off x="2266206" y="2850386"/>
-            <a:ext cx="4609240" cy="1427184"/>
+            <a:off x="2266206" y="2577680"/>
+            <a:ext cx="4609240" cy="1182010"/>
           </a:xfrm>
           <a:prstGeom prst="straightConnector1">
             <a:avLst/>
           </a:prstGeom>
-          <a:ln w="38100">
+          <a:ln w="19050">
             <a:solidFill>
               <a:schemeClr val="tx1"/>
             </a:solidFill>
@@ -11676,13 +11736,13 @@
         </p:nvCxnSpPr>
         <p:spPr>
           <a:xfrm flipH="1">
-            <a:off x="2010140" y="2859788"/>
-            <a:ext cx="2368633" cy="1417782"/>
+            <a:off x="2010140" y="2585466"/>
+            <a:ext cx="2368633" cy="1174223"/>
           </a:xfrm>
           <a:prstGeom prst="straightConnector1">
             <a:avLst/>
           </a:prstGeom>
-          <a:ln w="38100">
+          <a:ln w="19050">
             <a:solidFill>
               <a:schemeClr val="tx1"/>
             </a:solidFill>
@@ -11722,13 +11782,13 @@
         </p:nvCxnSpPr>
         <p:spPr>
           <a:xfrm>
-            <a:off x="4570826" y="2805174"/>
-            <a:ext cx="0" cy="1472396"/>
+            <a:off x="4570826" y="2540234"/>
+            <a:ext cx="0" cy="1219455"/>
           </a:xfrm>
           <a:prstGeom prst="straightConnector1">
             <a:avLst/>
           </a:prstGeom>
-          <a:ln w="38100">
+          <a:ln w="19050">
             <a:solidFill>
               <a:schemeClr val="tx1"/>
             </a:solidFill>
@@ -11767,13 +11827,13 @@
         </p:nvCxnSpPr>
         <p:spPr>
           <a:xfrm>
-            <a:off x="4778881" y="2837182"/>
-            <a:ext cx="2352634" cy="1440388"/>
+            <a:off x="4778881" y="2566744"/>
+            <a:ext cx="2352634" cy="1192946"/>
           </a:xfrm>
           <a:prstGeom prst="straightConnector1">
             <a:avLst/>
           </a:prstGeom>
-          <a:ln w="38100">
+          <a:ln w="19050">
             <a:solidFill>
               <a:schemeClr val="tx1"/>
             </a:solidFill>
@@ -11813,13 +11873,13 @@
         </p:nvCxnSpPr>
         <p:spPr>
           <a:xfrm>
-            <a:off x="7291558" y="2805174"/>
-            <a:ext cx="0" cy="1472396"/>
+            <a:off x="7291558" y="2540234"/>
+            <a:ext cx="0" cy="1219455"/>
           </a:xfrm>
           <a:prstGeom prst="straightConnector1">
             <a:avLst/>
           </a:prstGeom>
-          <a:ln w="38100">
+          <a:ln w="19050">
             <a:solidFill>
               <a:schemeClr val="tx1"/>
             </a:solidFill>
@@ -11858,13 +11918,13 @@
         </p:nvCxnSpPr>
         <p:spPr>
           <a:xfrm flipH="1">
-            <a:off x="4762880" y="2837182"/>
-            <a:ext cx="2368635" cy="1440388"/>
+            <a:off x="4762880" y="2566744"/>
+            <a:ext cx="2368635" cy="1192946"/>
           </a:xfrm>
           <a:prstGeom prst="straightConnector1">
             <a:avLst/>
           </a:prstGeom>
-          <a:ln w="38100">
+          <a:ln w="19050">
             <a:solidFill>
               <a:schemeClr val="tx1"/>
             </a:solidFill>
@@ -11903,13 +11963,13 @@
         </p:nvCxnSpPr>
         <p:spPr>
           <a:xfrm flipH="1">
-            <a:off x="2266207" y="2850386"/>
-            <a:ext cx="4641244" cy="1427184"/>
+            <a:off x="2266207" y="2577680"/>
+            <a:ext cx="4641244" cy="1182010"/>
           </a:xfrm>
           <a:prstGeom prst="straightConnector1">
             <a:avLst/>
           </a:prstGeom>
-          <a:ln w="38100">
+          <a:ln w="19050">
             <a:solidFill>
               <a:schemeClr val="tx1"/>
             </a:solidFill>
@@ -11940,8 +12000,8 @@
         </p:nvSpPr>
         <p:spPr>
           <a:xfrm>
-            <a:off x="1081888" y="1268760"/>
-            <a:ext cx="1536413" cy="1536413"/>
+            <a:off x="1081888" y="1267759"/>
+            <a:ext cx="1536413" cy="1272475"/>
           </a:xfrm>
           <a:prstGeom prst="rect">
             <a:avLst/>
@@ -11988,8 +12048,8 @@
         </p:nvSpPr>
         <p:spPr>
           <a:xfrm>
-            <a:off x="3802620" y="1268760"/>
-            <a:ext cx="1536413" cy="1536413"/>
+            <a:off x="3802620" y="1267759"/>
+            <a:ext cx="1536413" cy="1272475"/>
           </a:xfrm>
           <a:prstGeom prst="rect">
             <a:avLst/>
@@ -12036,8 +12096,8 @@
         </p:nvSpPr>
         <p:spPr>
           <a:xfrm>
-            <a:off x="6523351" y="1268760"/>
-            <a:ext cx="1536413" cy="1536413"/>
+            <a:off x="6523351" y="1267759"/>
+            <a:ext cx="1536413" cy="1272475"/>
           </a:xfrm>
           <a:prstGeom prst="rect">
             <a:avLst/>
@@ -12084,8 +12144,8 @@
         </p:nvSpPr>
         <p:spPr>
           <a:xfrm>
-            <a:off x="1081888" y="4341587"/>
-            <a:ext cx="1536413" cy="1536413"/>
+            <a:off x="1081888" y="3812709"/>
+            <a:ext cx="1536413" cy="1272475"/>
           </a:xfrm>
           <a:prstGeom prst="rect">
             <a:avLst/>
@@ -12132,8 +12192,8 @@
         </p:nvSpPr>
         <p:spPr>
           <a:xfrm>
-            <a:off x="3802620" y="4341587"/>
-            <a:ext cx="1536413" cy="1536413"/>
+            <a:off x="3802620" y="3812709"/>
+            <a:ext cx="1536413" cy="1272475"/>
           </a:xfrm>
           <a:prstGeom prst="rect">
             <a:avLst/>
@@ -12180,8 +12240,8 @@
         </p:nvSpPr>
         <p:spPr>
           <a:xfrm>
-            <a:off x="6523351" y="4341587"/>
-            <a:ext cx="1536413" cy="1536413"/>
+            <a:off x="6523351" y="3812709"/>
+            <a:ext cx="1536413" cy="1272475"/>
           </a:xfrm>
           <a:prstGeom prst="rect">
             <a:avLst/>
@@ -12228,8 +12288,8 @@
         </p:nvSpPr>
         <p:spPr>
           <a:xfrm>
-            <a:off x="1082009" y="1716881"/>
-            <a:ext cx="1524241" cy="828144"/>
+            <a:off x="1082009" y="1638898"/>
+            <a:ext cx="1524241" cy="685878"/>
           </a:xfrm>
           <a:custGeom>
             <a:avLst/>
@@ -12321,8 +12381,8 @@
         </p:nvSpPr>
         <p:spPr>
           <a:xfrm>
-            <a:off x="3806589" y="1652863"/>
-            <a:ext cx="1528474" cy="885810"/>
+            <a:off x="3806589" y="1585877"/>
+            <a:ext cx="1528474" cy="733638"/>
           </a:xfrm>
           <a:custGeom>
             <a:avLst/>
@@ -12468,8 +12528,8 @@
         </p:nvSpPr>
         <p:spPr>
           <a:xfrm>
-            <a:off x="6529757" y="1706693"/>
-            <a:ext cx="1529886" cy="835510"/>
+            <a:off x="6529757" y="1630460"/>
+            <a:ext cx="1529886" cy="691979"/>
           </a:xfrm>
           <a:custGeom>
             <a:avLst/>
@@ -12569,8 +12629,8 @@
         </p:nvSpPr>
         <p:spPr>
           <a:xfrm>
-            <a:off x="1082009" y="4666259"/>
-            <a:ext cx="1534825" cy="829865"/>
+            <a:off x="1082009" y="4081606"/>
+            <a:ext cx="1534825" cy="687304"/>
           </a:xfrm>
           <a:custGeom>
             <a:avLst/>
@@ -12814,8 +12874,8 @@
         </p:nvSpPr>
         <p:spPr>
           <a:xfrm>
-            <a:off x="3804207" y="4666259"/>
-            <a:ext cx="1534825" cy="829865"/>
+            <a:off x="3804207" y="4081606"/>
+            <a:ext cx="1534825" cy="687304"/>
           </a:xfrm>
           <a:custGeom>
             <a:avLst/>
@@ -13059,8 +13119,8 @@
         </p:nvSpPr>
         <p:spPr>
           <a:xfrm>
-            <a:off x="6527288" y="4666259"/>
-            <a:ext cx="1534825" cy="829865"/>
+            <a:off x="6527288" y="4081606"/>
+            <a:ext cx="1534825" cy="687304"/>
           </a:xfrm>
           <a:custGeom>
             <a:avLst/>
@@ -13313,7 +13373,7 @@
             <p:spPr>
               <a:xfrm>
                 <a:off x="1723174" y="1262932"/>
-                <a:ext cx="253841" cy="246260"/>
+                <a:ext cx="253841" cy="203955"/>
               </a:xfrm>
               <a:prstGeom prst="rect">
                 <a:avLst/>
@@ -13383,7 +13443,7 @@
             <p:spPr>
               <a:xfrm>
                 <a:off x="1723174" y="1262932"/>
-                <a:ext cx="253841" cy="246260"/>
+                <a:ext cx="253841" cy="203955"/>
               </a:xfrm>
               <a:prstGeom prst="rect">
                 <a:avLst/>
@@ -13391,7 +13451,7 @@
               <a:blipFill>
                 <a:blip r:embed="rId2"/>
                 <a:stretch>
-                  <a:fillRect l="-14634" r="-9756" b="-34146"/>
+                  <a:fillRect l="-14634" r="-9756" b="-61765"/>
                 </a:stretch>
               </a:blipFill>
             </p:spPr>
@@ -13427,7 +13487,7 @@
             <p:spPr>
               <a:xfrm>
                 <a:off x="4442792" y="1262932"/>
-                <a:ext cx="258573" cy="246260"/>
+                <a:ext cx="258573" cy="203955"/>
               </a:xfrm>
               <a:prstGeom prst="rect">
                 <a:avLst/>
@@ -13497,7 +13557,7 @@
             <p:spPr>
               <a:xfrm>
                 <a:off x="4442792" y="1262932"/>
-                <a:ext cx="258573" cy="246260"/>
+                <a:ext cx="258573" cy="203955"/>
               </a:xfrm>
               <a:prstGeom prst="rect">
                 <a:avLst/>
@@ -13505,7 +13565,7 @@
               <a:blipFill>
                 <a:blip r:embed="rId3"/>
                 <a:stretch>
-                  <a:fillRect l="-14286" r="-9524" b="-34146"/>
+                  <a:fillRect l="-14286" r="-9524" b="-61765"/>
                 </a:stretch>
               </a:blipFill>
             </p:spPr>
@@ -13541,7 +13601,7 @@
             <p:spPr>
               <a:xfrm>
                 <a:off x="7159905" y="1262932"/>
-                <a:ext cx="258573" cy="246260"/>
+                <a:ext cx="258573" cy="203955"/>
               </a:xfrm>
               <a:prstGeom prst="rect">
                 <a:avLst/>
@@ -13611,7 +13671,7 @@
             <p:spPr>
               <a:xfrm>
                 <a:off x="7159905" y="1262932"/>
-                <a:ext cx="258573" cy="246260"/>
+                <a:ext cx="258573" cy="203955"/>
               </a:xfrm>
               <a:prstGeom prst="rect">
                 <a:avLst/>
@@ -13619,7 +13679,7 @@
               <a:blipFill>
                 <a:blip r:embed="rId4"/>
                 <a:stretch>
-                  <a:fillRect l="-14286" r="-9524" b="-34146"/>
+                  <a:fillRect l="-14286" r="-9524" b="-61765"/>
                 </a:stretch>
               </a:blipFill>
             </p:spPr>
@@ -13654,8 +13714,8 @@
             </p:nvSpPr>
             <p:spPr>
               <a:xfrm>
-                <a:off x="1723174" y="5496125"/>
-                <a:ext cx="271114" cy="246260"/>
+                <a:off x="1723174" y="4768911"/>
+                <a:ext cx="271114" cy="203955"/>
               </a:xfrm>
               <a:prstGeom prst="rect">
                 <a:avLst/>
@@ -13724,8 +13784,8 @@
             </p:nvSpPr>
             <p:spPr>
               <a:xfrm>
-                <a:off x="1723174" y="5496125"/>
-                <a:ext cx="271114" cy="246260"/>
+                <a:off x="1723174" y="4768911"/>
+                <a:ext cx="271114" cy="203955"/>
               </a:xfrm>
               <a:prstGeom prst="rect">
                 <a:avLst/>
@@ -13733,7 +13793,7 @@
               <a:blipFill>
                 <a:blip r:embed="rId5"/>
                 <a:stretch>
-                  <a:fillRect l="-13636" r="-9091" b="-35000"/>
+                  <a:fillRect l="-13636" r="-9091" b="-61765"/>
                 </a:stretch>
               </a:blipFill>
             </p:spPr>
@@ -13768,8 +13828,8 @@
             </p:nvSpPr>
             <p:spPr>
               <a:xfrm>
-                <a:off x="4442792" y="5496125"/>
-                <a:ext cx="275845" cy="246260"/>
+                <a:off x="4442792" y="4768911"/>
+                <a:ext cx="275845" cy="203955"/>
               </a:xfrm>
               <a:prstGeom prst="rect">
                 <a:avLst/>
@@ -13838,8 +13898,8 @@
             </p:nvSpPr>
             <p:spPr>
               <a:xfrm>
-                <a:off x="4442792" y="5496125"/>
-                <a:ext cx="275845" cy="246260"/>
+                <a:off x="4442792" y="4768911"/>
+                <a:ext cx="275845" cy="203955"/>
               </a:xfrm>
               <a:prstGeom prst="rect">
                 <a:avLst/>
@@ -13847,7 +13907,7 @@
               <a:blipFill>
                 <a:blip r:embed="rId6"/>
                 <a:stretch>
-                  <a:fillRect l="-13333" r="-8889" b="-35000"/>
+                  <a:fillRect l="-13333" r="-8889" b="-61765"/>
                 </a:stretch>
               </a:blipFill>
             </p:spPr>
@@ -13882,8 +13942,8 @@
             </p:nvSpPr>
             <p:spPr>
               <a:xfrm>
-                <a:off x="7159905" y="5496125"/>
-                <a:ext cx="275845" cy="246260"/>
+                <a:off x="7159905" y="4768911"/>
+                <a:ext cx="275845" cy="203955"/>
               </a:xfrm>
               <a:prstGeom prst="rect">
                 <a:avLst/>
@@ -13952,8 +14012,8 @@
             </p:nvSpPr>
             <p:spPr>
               <a:xfrm>
-                <a:off x="7159905" y="5496125"/>
-                <a:ext cx="275845" cy="246260"/>
+                <a:off x="7159905" y="4768911"/>
+                <a:ext cx="275845" cy="203955"/>
               </a:xfrm>
               <a:prstGeom prst="rect">
                 <a:avLst/>
@@ -13961,7 +14021,7 @@
               <a:blipFill>
                 <a:blip r:embed="rId7"/>
                 <a:stretch>
-                  <a:fillRect l="-13333" r="-8889" b="-35000"/>
+                  <a:fillRect l="-13333" r="-8889" b="-61765"/>
                 </a:stretch>
               </a:blipFill>
             </p:spPr>
@@ -13980,12 +14040,284 @@
           </p:sp>
         </mc:Fallback>
       </mc:AlternateContent>
+      <p:grpSp>
+        <p:nvGrpSpPr>
+          <p:cNvPr id="30" name="그룹 29">
+            <a:extLst>
+              <a:ext uri="{FF2B5EF4-FFF2-40B4-BE49-F238E27FC236}">
+                <a16:creationId xmlns:a16="http://schemas.microsoft.com/office/drawing/2014/main" id="{81800122-E495-4273-849B-6E3848A28EE0}"/>
+              </a:ext>
+            </a:extLst>
+          </p:cNvPr>
+          <p:cNvGrpSpPr/>
+          <p:nvPr/>
+        </p:nvGrpSpPr>
+        <p:grpSpPr>
+          <a:xfrm>
+            <a:off x="481334" y="2627909"/>
+            <a:ext cx="864085" cy="1000204"/>
+            <a:chOff x="481334" y="2627909"/>
+            <a:chExt cx="864085" cy="1000204"/>
+          </a:xfrm>
+        </p:grpSpPr>
+        <p:sp>
+          <p:nvSpPr>
+            <p:cNvPr id="115" name="화살표: 아래쪽 114">
+              <a:extLst>
+                <a:ext uri="{FF2B5EF4-FFF2-40B4-BE49-F238E27FC236}">
+                  <a16:creationId xmlns:a16="http://schemas.microsoft.com/office/drawing/2014/main" id="{D1A66A2C-C81C-4B94-AD0B-9DD894B16EE0}"/>
+                </a:ext>
+              </a:extLst>
+            </p:cNvPr>
+            <p:cNvSpPr/>
+            <p:nvPr/>
+          </p:nvSpPr>
+          <p:spPr>
+            <a:xfrm>
+              <a:off x="481334" y="2627909"/>
+              <a:ext cx="864085" cy="1000204"/>
+            </a:xfrm>
+            <a:prstGeom prst="downArrow">
+              <a:avLst>
+                <a:gd name="adj1" fmla="val 32363"/>
+                <a:gd name="adj2" fmla="val 42063"/>
+              </a:avLst>
+            </a:prstGeom>
+            <a:solidFill>
+              <a:schemeClr val="accent2"/>
+            </a:solidFill>
+            <a:ln>
+              <a:noFill/>
+            </a:ln>
+          </p:spPr>
+          <p:style>
+            <a:lnRef idx="2">
+              <a:schemeClr val="accent1">
+                <a:shade val="50000"/>
+              </a:schemeClr>
+            </a:lnRef>
+            <a:fillRef idx="1">
+              <a:schemeClr val="accent1"/>
+            </a:fillRef>
+            <a:effectRef idx="0">
+              <a:schemeClr val="accent1"/>
+            </a:effectRef>
+            <a:fontRef idx="minor">
+              <a:schemeClr val="lt1"/>
+            </a:fontRef>
+          </p:style>
+          <p:txBody>
+            <a:bodyPr rtlCol="0" anchor="ctr"/>
+            <a:lstStyle/>
+            <a:p>
+              <a:pPr algn="ctr"/>
+              <a:endParaRPr lang="ko-KR" altLang="en-US"/>
+            </a:p>
+          </p:txBody>
+        </p:sp>
+        <p:sp>
+          <p:nvSpPr>
+            <p:cNvPr id="116" name="직사각형 115">
+              <a:extLst>
+                <a:ext uri="{FF2B5EF4-FFF2-40B4-BE49-F238E27FC236}">
+                  <a16:creationId xmlns:a16="http://schemas.microsoft.com/office/drawing/2014/main" id="{ACB2CE96-0555-4DE0-8A56-2235454F55BE}"/>
+                </a:ext>
+              </a:extLst>
+            </p:cNvPr>
+            <p:cNvSpPr/>
+            <p:nvPr/>
+          </p:nvSpPr>
+          <p:spPr>
+            <a:xfrm>
+              <a:off x="625435" y="3057475"/>
+              <a:ext cx="575882" cy="37865"/>
+            </a:xfrm>
+            <a:prstGeom prst="rect">
+              <a:avLst/>
+            </a:prstGeom>
+            <a:solidFill>
+              <a:schemeClr val="bg1"/>
+            </a:solidFill>
+            <a:ln>
+              <a:noFill/>
+            </a:ln>
+          </p:spPr>
+          <p:style>
+            <a:lnRef idx="2">
+              <a:schemeClr val="accent1">
+                <a:shade val="50000"/>
+              </a:schemeClr>
+            </a:lnRef>
+            <a:fillRef idx="1">
+              <a:schemeClr val="accent1"/>
+            </a:fillRef>
+            <a:effectRef idx="0">
+              <a:schemeClr val="accent1"/>
+            </a:effectRef>
+            <a:fontRef idx="minor">
+              <a:schemeClr val="lt1"/>
+            </a:fontRef>
+          </p:style>
+          <p:txBody>
+            <a:bodyPr rtlCol="0" anchor="ctr"/>
+            <a:lstStyle/>
+            <a:p>
+              <a:pPr algn="ctr"/>
+              <a:endParaRPr lang="ko-KR" altLang="en-US"/>
+            </a:p>
+          </p:txBody>
+        </p:sp>
+        <p:sp>
+          <p:nvSpPr>
+            <p:cNvPr id="117" name="직사각형 116">
+              <a:extLst>
+                <a:ext uri="{FF2B5EF4-FFF2-40B4-BE49-F238E27FC236}">
+                  <a16:creationId xmlns:a16="http://schemas.microsoft.com/office/drawing/2014/main" id="{BB03A9E3-A3B9-4E41-BDA1-27D30CDB6457}"/>
+                </a:ext>
+              </a:extLst>
+            </p:cNvPr>
+            <p:cNvSpPr/>
+            <p:nvPr/>
+          </p:nvSpPr>
+          <p:spPr>
+            <a:xfrm>
+              <a:off x="625435" y="2938199"/>
+              <a:ext cx="575882" cy="37865"/>
+            </a:xfrm>
+            <a:prstGeom prst="rect">
+              <a:avLst/>
+            </a:prstGeom>
+            <a:solidFill>
+              <a:schemeClr val="bg1"/>
+            </a:solidFill>
+            <a:ln>
+              <a:noFill/>
+            </a:ln>
+          </p:spPr>
+          <p:style>
+            <a:lnRef idx="2">
+              <a:schemeClr val="accent1">
+                <a:shade val="50000"/>
+              </a:schemeClr>
+            </a:lnRef>
+            <a:fillRef idx="1">
+              <a:schemeClr val="accent1"/>
+            </a:fillRef>
+            <a:effectRef idx="0">
+              <a:schemeClr val="accent1"/>
+            </a:effectRef>
+            <a:fontRef idx="minor">
+              <a:schemeClr val="lt1"/>
+            </a:fontRef>
+          </p:style>
+          <p:txBody>
+            <a:bodyPr rtlCol="0" anchor="ctr"/>
+            <a:lstStyle/>
+            <a:p>
+              <a:pPr algn="ctr"/>
+              <a:endParaRPr lang="ko-KR" altLang="en-US"/>
+            </a:p>
+          </p:txBody>
+        </p:sp>
+        <p:sp>
+          <p:nvSpPr>
+            <p:cNvPr id="118" name="직사각형 117">
+              <a:extLst>
+                <a:ext uri="{FF2B5EF4-FFF2-40B4-BE49-F238E27FC236}">
+                  <a16:creationId xmlns:a16="http://schemas.microsoft.com/office/drawing/2014/main" id="{99184727-9563-484D-A6CF-5A77FDD35173}"/>
+                </a:ext>
+              </a:extLst>
+            </p:cNvPr>
+            <p:cNvSpPr/>
+            <p:nvPr/>
+          </p:nvSpPr>
+          <p:spPr>
+            <a:xfrm>
+              <a:off x="625435" y="2821262"/>
+              <a:ext cx="575882" cy="37865"/>
+            </a:xfrm>
+            <a:prstGeom prst="rect">
+              <a:avLst/>
+            </a:prstGeom>
+            <a:solidFill>
+              <a:schemeClr val="bg1"/>
+            </a:solidFill>
+            <a:ln>
+              <a:noFill/>
+            </a:ln>
+          </p:spPr>
+          <p:style>
+            <a:lnRef idx="2">
+              <a:schemeClr val="accent1">
+                <a:shade val="50000"/>
+              </a:schemeClr>
+            </a:lnRef>
+            <a:fillRef idx="1">
+              <a:schemeClr val="accent1"/>
+            </a:fillRef>
+            <a:effectRef idx="0">
+              <a:schemeClr val="accent1"/>
+            </a:effectRef>
+            <a:fontRef idx="minor">
+              <a:schemeClr val="lt1"/>
+            </a:fontRef>
+          </p:style>
+          <p:txBody>
+            <a:bodyPr rtlCol="0" anchor="ctr"/>
+            <a:lstStyle/>
+            <a:p>
+              <a:pPr algn="ctr"/>
+              <a:endParaRPr lang="ko-KR" altLang="en-US"/>
+            </a:p>
+          </p:txBody>
+        </p:sp>
+      </p:grpSp>
       <p:sp>
         <p:nvSpPr>
-          <p:cNvPr id="115" name="화살표: 아래쪽 114">
+          <p:cNvPr id="119" name="TextBox 118">
             <a:extLst>
               <a:ext uri="{FF2B5EF4-FFF2-40B4-BE49-F238E27FC236}">
-                <a16:creationId xmlns:a16="http://schemas.microsoft.com/office/drawing/2014/main" id="{D1A66A2C-C81C-4B94-AD0B-9DD894B16EE0}"/>
+                <a16:creationId xmlns:a16="http://schemas.microsoft.com/office/drawing/2014/main" id="{CB2C09CE-8B04-4133-9304-BC579DF3759B}"/>
+              </a:ext>
+            </a:extLst>
+          </p:cNvPr>
+          <p:cNvSpPr txBox="1"/>
+          <p:nvPr/>
+        </p:nvSpPr>
+        <p:spPr>
+          <a:xfrm rot="16200000">
+            <a:off x="-563395" y="2944486"/>
+            <a:ext cx="1720125" cy="369332"/>
+          </a:xfrm>
+          <a:prstGeom prst="rect">
+            <a:avLst/>
+          </a:prstGeom>
+          <a:noFill/>
+        </p:spPr>
+        <p:txBody>
+          <a:bodyPr wrap="none" rtlCol="0">
+            <a:spAutoFit/>
+          </a:bodyPr>
+          <a:lstStyle/>
+          <a:p>
+            <a:r>
+              <a:rPr lang="ko-KR" altLang="en-US" dirty="0"/>
+              <a:t>중심극한정리</a:t>
+            </a:r>
+            <a:r>
+              <a:rPr lang="en-US" altLang="ko-KR" dirty="0"/>
+              <a:t>(CLT)</a:t>
+            </a:r>
+            <a:endParaRPr lang="ko-KR" altLang="en-US" dirty="0"/>
+          </a:p>
+        </p:txBody>
+      </p:sp>
+      <p:sp>
+        <p:nvSpPr>
+          <p:cNvPr id="59" name="화살표: 아래쪽 58">
+            <a:extLst>
+              <a:ext uri="{FF2B5EF4-FFF2-40B4-BE49-F238E27FC236}">
+                <a16:creationId xmlns:a16="http://schemas.microsoft.com/office/drawing/2014/main" id="{64139DE1-1F31-4F45-BFD0-90388EF9A9F9}"/>
               </a:ext>
             </a:extLst>
           </p:cNvPr>
@@ -13993,9 +14325,9 @@
           <p:nvPr/>
         </p:nvSpPr>
         <p:spPr>
-          <a:xfrm>
-            <a:off x="481334" y="2911034"/>
-            <a:ext cx="864085" cy="1207667"/>
+          <a:xfrm rot="10800000">
+            <a:off x="7796234" y="2627909"/>
+            <a:ext cx="864085" cy="1000204"/>
           </a:xfrm>
           <a:prstGeom prst="downArrow">
             <a:avLst>
@@ -14004,7 +14336,7 @@
             </a:avLst>
           </a:prstGeom>
           <a:solidFill>
-            <a:schemeClr val="accent2"/>
+            <a:schemeClr val="accent1"/>
           </a:solidFill>
           <a:ln>
             <a:noFill/>
@@ -14037,10 +14369,10 @@
       </p:sp>
       <p:sp>
         <p:nvSpPr>
-          <p:cNvPr id="116" name="직사각형 115">
+          <p:cNvPr id="60" name="직사각형 59">
             <a:extLst>
               <a:ext uri="{FF2B5EF4-FFF2-40B4-BE49-F238E27FC236}">
-                <a16:creationId xmlns:a16="http://schemas.microsoft.com/office/drawing/2014/main" id="{ACB2CE96-0555-4DE0-8A56-2235454F55BE}"/>
+                <a16:creationId xmlns:a16="http://schemas.microsoft.com/office/drawing/2014/main" id="{1B2016A3-1CFD-4919-A33F-E66E960A40BA}"/>
               </a:ext>
             </a:extLst>
           </p:cNvPr>
@@ -14048,9 +14380,9 @@
           <p:nvPr/>
         </p:nvSpPr>
         <p:spPr>
-          <a:xfrm>
-            <a:off x="625435" y="3429701"/>
-            <a:ext cx="575882" cy="45719"/>
+          <a:xfrm rot="10800000">
+            <a:off x="7940336" y="3160681"/>
+            <a:ext cx="575882" cy="37865"/>
           </a:xfrm>
           <a:prstGeom prst="rect">
             <a:avLst/>
@@ -14089,10 +14421,10 @@
       </p:sp>
       <p:sp>
         <p:nvSpPr>
-          <p:cNvPr id="117" name="직사각형 116">
+          <p:cNvPr id="61" name="직사각형 60">
             <a:extLst>
               <a:ext uri="{FF2B5EF4-FFF2-40B4-BE49-F238E27FC236}">
-                <a16:creationId xmlns:a16="http://schemas.microsoft.com/office/drawing/2014/main" id="{BB03A9E3-A3B9-4E41-BDA1-27D30CDB6457}"/>
+                <a16:creationId xmlns:a16="http://schemas.microsoft.com/office/drawing/2014/main" id="{793509B3-9536-4057-8BAD-7D97A931DD6A}"/>
               </a:ext>
             </a:extLst>
           </p:cNvPr>
@@ -14100,9 +14432,9 @@
           <p:nvPr/>
         </p:nvSpPr>
         <p:spPr>
-          <a:xfrm>
-            <a:off x="625435" y="3285685"/>
-            <a:ext cx="575882" cy="45719"/>
+          <a:xfrm rot="10800000">
+            <a:off x="7940336" y="3279956"/>
+            <a:ext cx="575882" cy="37865"/>
           </a:xfrm>
           <a:prstGeom prst="rect">
             <a:avLst/>
@@ -14141,10 +14473,10 @@
       </p:sp>
       <p:sp>
         <p:nvSpPr>
-          <p:cNvPr id="118" name="직사각형 117">
+          <p:cNvPr id="62" name="직사각형 61">
             <a:extLst>
               <a:ext uri="{FF2B5EF4-FFF2-40B4-BE49-F238E27FC236}">
-                <a16:creationId xmlns:a16="http://schemas.microsoft.com/office/drawing/2014/main" id="{99184727-9563-484D-A6CF-5A77FDD35173}"/>
+                <a16:creationId xmlns:a16="http://schemas.microsoft.com/office/drawing/2014/main" id="{5302A6EE-6398-4C4D-9DF8-C6D27BA38937}"/>
               </a:ext>
             </a:extLst>
           </p:cNvPr>
@@ -14152,9 +14484,9 @@
           <p:nvPr/>
         </p:nvSpPr>
         <p:spPr>
-          <a:xfrm>
-            <a:off x="625435" y="3144493"/>
-            <a:ext cx="575882" cy="45719"/>
+          <a:xfrm rot="10800000">
+            <a:off x="7940336" y="3396893"/>
+            <a:ext cx="575882" cy="37865"/>
           </a:xfrm>
           <a:prstGeom prst="rect">
             <a:avLst/>
@@ -14193,317 +14525,6 @@
       </p:sp>
       <p:sp>
         <p:nvSpPr>
-          <p:cNvPr id="119" name="TextBox 118">
-            <a:extLst>
-              <a:ext uri="{FF2B5EF4-FFF2-40B4-BE49-F238E27FC236}">
-                <a16:creationId xmlns:a16="http://schemas.microsoft.com/office/drawing/2014/main" id="{CB2C09CE-8B04-4133-9304-BC579DF3759B}"/>
-              </a:ext>
-            </a:extLst>
-          </p:cNvPr>
-          <p:cNvSpPr txBox="1"/>
-          <p:nvPr/>
-        </p:nvSpPr>
-        <p:spPr>
-          <a:xfrm rot="16200000">
-            <a:off x="-741790" y="3331579"/>
-            <a:ext cx="2076915" cy="369332"/>
-          </a:xfrm>
-          <a:prstGeom prst="rect">
-            <a:avLst/>
-          </a:prstGeom>
-          <a:noFill/>
-        </p:spPr>
-        <p:txBody>
-          <a:bodyPr wrap="none" rtlCol="0">
-            <a:spAutoFit/>
-          </a:bodyPr>
-          <a:lstStyle/>
-          <a:p>
-            <a:r>
-              <a:rPr lang="ko-KR" altLang="en-US" dirty="0"/>
-              <a:t>중심극한정리</a:t>
-            </a:r>
-            <a:r>
-              <a:rPr lang="en-US" altLang="ko-KR" dirty="0"/>
-              <a:t>(CLT)</a:t>
-            </a:r>
-            <a:endParaRPr lang="ko-KR" altLang="en-US" dirty="0"/>
-          </a:p>
-        </p:txBody>
-      </p:sp>
-      <p:sp>
-        <p:nvSpPr>
-          <p:cNvPr id="120" name="TextBox 119">
-            <a:extLst>
-              <a:ext uri="{FF2B5EF4-FFF2-40B4-BE49-F238E27FC236}">
-                <a16:creationId xmlns:a16="http://schemas.microsoft.com/office/drawing/2014/main" id="{832061C8-0623-48E1-873D-EFB91F385BE2}"/>
-              </a:ext>
-            </a:extLst>
-          </p:cNvPr>
-          <p:cNvSpPr txBox="1"/>
-          <p:nvPr/>
-        </p:nvSpPr>
-        <p:spPr>
-          <a:xfrm>
-            <a:off x="238417" y="313492"/>
-            <a:ext cx="8730852" cy="523220"/>
-          </a:xfrm>
-          <a:prstGeom prst="rect">
-            <a:avLst/>
-          </a:prstGeom>
-          <a:noFill/>
-        </p:spPr>
-        <p:txBody>
-          <a:bodyPr wrap="none" rtlCol="0">
-            <a:spAutoFit/>
-          </a:bodyPr>
-          <a:lstStyle/>
-          <a:p>
-            <a:pPr algn="ctr"/>
-            <a:r>
-              <a:rPr lang="ko-KR" altLang="en-US" sz="2800" b="1" dirty="0"/>
-              <a:t>중심극한정리</a:t>
-            </a:r>
-            <a:r>
-              <a:rPr lang="en-US" altLang="ko-KR" sz="2800" b="1" dirty="0"/>
-              <a:t>(CLT)</a:t>
-            </a:r>
-            <a:r>
-              <a:rPr lang="ko-KR" altLang="en-US" sz="2800" b="1" dirty="0"/>
-              <a:t>와 독립성분분석</a:t>
-            </a:r>
-            <a:r>
-              <a:rPr lang="en-US" altLang="ko-KR" sz="2800" b="1" dirty="0"/>
-              <a:t>(ICA)</a:t>
-            </a:r>
-            <a:r>
-              <a:rPr lang="ko-KR" altLang="en-US" sz="2800" b="1" dirty="0"/>
-              <a:t> 관계</a:t>
-            </a:r>
-            <a:r>
-              <a:rPr lang="en-US" altLang="ko-KR" sz="2800" b="1" dirty="0"/>
-              <a:t> </a:t>
-            </a:r>
-            <a:r>
-              <a:rPr lang="ko-KR" altLang="en-US" sz="2800" b="1" dirty="0"/>
-              <a:t>개요도</a:t>
-            </a:r>
-          </a:p>
-        </p:txBody>
-      </p:sp>
-      <p:sp>
-        <p:nvSpPr>
-          <p:cNvPr id="59" name="화살표: 아래쪽 58">
-            <a:extLst>
-              <a:ext uri="{FF2B5EF4-FFF2-40B4-BE49-F238E27FC236}">
-                <a16:creationId xmlns:a16="http://schemas.microsoft.com/office/drawing/2014/main" id="{64139DE1-1F31-4F45-BFD0-90388EF9A9F9}"/>
-              </a:ext>
-            </a:extLst>
-          </p:cNvPr>
-          <p:cNvSpPr/>
-          <p:nvPr/>
-        </p:nvSpPr>
-        <p:spPr>
-          <a:xfrm rot="10800000">
-            <a:off x="7796234" y="2911034"/>
-            <a:ext cx="864085" cy="1207667"/>
-          </a:xfrm>
-          <a:prstGeom prst="downArrow">
-            <a:avLst>
-              <a:gd name="adj1" fmla="val 32363"/>
-              <a:gd name="adj2" fmla="val 42063"/>
-            </a:avLst>
-          </a:prstGeom>
-          <a:solidFill>
-            <a:schemeClr val="accent1"/>
-          </a:solidFill>
-          <a:ln>
-            <a:noFill/>
-          </a:ln>
-        </p:spPr>
-        <p:style>
-          <a:lnRef idx="2">
-            <a:schemeClr val="accent1">
-              <a:shade val="50000"/>
-            </a:schemeClr>
-          </a:lnRef>
-          <a:fillRef idx="1">
-            <a:schemeClr val="accent1"/>
-          </a:fillRef>
-          <a:effectRef idx="0">
-            <a:schemeClr val="accent1"/>
-          </a:effectRef>
-          <a:fontRef idx="minor">
-            <a:schemeClr val="lt1"/>
-          </a:fontRef>
-        </p:style>
-        <p:txBody>
-          <a:bodyPr rtlCol="0" anchor="ctr"/>
-          <a:lstStyle/>
-          <a:p>
-            <a:pPr algn="ctr"/>
-            <a:endParaRPr lang="ko-KR" altLang="en-US"/>
-          </a:p>
-        </p:txBody>
-      </p:sp>
-      <p:sp>
-        <p:nvSpPr>
-          <p:cNvPr id="60" name="직사각형 59">
-            <a:extLst>
-              <a:ext uri="{FF2B5EF4-FFF2-40B4-BE49-F238E27FC236}">
-                <a16:creationId xmlns:a16="http://schemas.microsoft.com/office/drawing/2014/main" id="{1B2016A3-1CFD-4919-A33F-E66E960A40BA}"/>
-              </a:ext>
-            </a:extLst>
-          </p:cNvPr>
-          <p:cNvSpPr/>
-          <p:nvPr/>
-        </p:nvSpPr>
-        <p:spPr>
-          <a:xfrm rot="10800000">
-            <a:off x="7940336" y="3554314"/>
-            <a:ext cx="575882" cy="45719"/>
-          </a:xfrm>
-          <a:prstGeom prst="rect">
-            <a:avLst/>
-          </a:prstGeom>
-          <a:solidFill>
-            <a:schemeClr val="bg1"/>
-          </a:solidFill>
-          <a:ln>
-            <a:noFill/>
-          </a:ln>
-        </p:spPr>
-        <p:style>
-          <a:lnRef idx="2">
-            <a:schemeClr val="accent1">
-              <a:shade val="50000"/>
-            </a:schemeClr>
-          </a:lnRef>
-          <a:fillRef idx="1">
-            <a:schemeClr val="accent1"/>
-          </a:fillRef>
-          <a:effectRef idx="0">
-            <a:schemeClr val="accent1"/>
-          </a:effectRef>
-          <a:fontRef idx="minor">
-            <a:schemeClr val="lt1"/>
-          </a:fontRef>
-        </p:style>
-        <p:txBody>
-          <a:bodyPr rtlCol="0" anchor="ctr"/>
-          <a:lstStyle/>
-          <a:p>
-            <a:pPr algn="ctr"/>
-            <a:endParaRPr lang="ko-KR" altLang="en-US"/>
-          </a:p>
-        </p:txBody>
-      </p:sp>
-      <p:sp>
-        <p:nvSpPr>
-          <p:cNvPr id="61" name="직사각형 60">
-            <a:extLst>
-              <a:ext uri="{FF2B5EF4-FFF2-40B4-BE49-F238E27FC236}">
-                <a16:creationId xmlns:a16="http://schemas.microsoft.com/office/drawing/2014/main" id="{793509B3-9536-4057-8BAD-7D97A931DD6A}"/>
-              </a:ext>
-            </a:extLst>
-          </p:cNvPr>
-          <p:cNvSpPr/>
-          <p:nvPr/>
-        </p:nvSpPr>
-        <p:spPr>
-          <a:xfrm rot="10800000">
-            <a:off x="7940336" y="3698330"/>
-            <a:ext cx="575882" cy="45719"/>
-          </a:xfrm>
-          <a:prstGeom prst="rect">
-            <a:avLst/>
-          </a:prstGeom>
-          <a:solidFill>
-            <a:schemeClr val="bg1"/>
-          </a:solidFill>
-          <a:ln>
-            <a:noFill/>
-          </a:ln>
-        </p:spPr>
-        <p:style>
-          <a:lnRef idx="2">
-            <a:schemeClr val="accent1">
-              <a:shade val="50000"/>
-            </a:schemeClr>
-          </a:lnRef>
-          <a:fillRef idx="1">
-            <a:schemeClr val="accent1"/>
-          </a:fillRef>
-          <a:effectRef idx="0">
-            <a:schemeClr val="accent1"/>
-          </a:effectRef>
-          <a:fontRef idx="minor">
-            <a:schemeClr val="lt1"/>
-          </a:fontRef>
-        </p:style>
-        <p:txBody>
-          <a:bodyPr rtlCol="0" anchor="ctr"/>
-          <a:lstStyle/>
-          <a:p>
-            <a:pPr algn="ctr"/>
-            <a:endParaRPr lang="ko-KR" altLang="en-US"/>
-          </a:p>
-        </p:txBody>
-      </p:sp>
-      <p:sp>
-        <p:nvSpPr>
-          <p:cNvPr id="62" name="직사각형 61">
-            <a:extLst>
-              <a:ext uri="{FF2B5EF4-FFF2-40B4-BE49-F238E27FC236}">
-                <a16:creationId xmlns:a16="http://schemas.microsoft.com/office/drawing/2014/main" id="{5302A6EE-6398-4C4D-9DF8-C6D27BA38937}"/>
-              </a:ext>
-            </a:extLst>
-          </p:cNvPr>
-          <p:cNvSpPr/>
-          <p:nvPr/>
-        </p:nvSpPr>
-        <p:spPr>
-          <a:xfrm rot="10800000">
-            <a:off x="7940336" y="3839522"/>
-            <a:ext cx="575882" cy="45719"/>
-          </a:xfrm>
-          <a:prstGeom prst="rect">
-            <a:avLst/>
-          </a:prstGeom>
-          <a:solidFill>
-            <a:schemeClr val="bg1"/>
-          </a:solidFill>
-          <a:ln>
-            <a:noFill/>
-          </a:ln>
-        </p:spPr>
-        <p:style>
-          <a:lnRef idx="2">
-            <a:schemeClr val="accent1">
-              <a:shade val="50000"/>
-            </a:schemeClr>
-          </a:lnRef>
-          <a:fillRef idx="1">
-            <a:schemeClr val="accent1"/>
-          </a:fillRef>
-          <a:effectRef idx="0">
-            <a:schemeClr val="accent1"/>
-          </a:effectRef>
-          <a:fontRef idx="minor">
-            <a:schemeClr val="lt1"/>
-          </a:fontRef>
-        </p:style>
-        <p:txBody>
-          <a:bodyPr rtlCol="0" anchor="ctr"/>
-          <a:lstStyle/>
-          <a:p>
-            <a:pPr algn="ctr"/>
-            <a:endParaRPr lang="ko-KR" altLang="en-US"/>
-          </a:p>
-        </p:txBody>
-      </p:sp>
-      <p:sp>
-        <p:nvSpPr>
           <p:cNvPr id="63" name="TextBox 62">
             <a:extLst>
               <a:ext uri="{FF2B5EF4-FFF2-40B4-BE49-F238E27FC236}">
@@ -14516,8 +14537,8 @@
         </p:nvSpPr>
         <p:spPr>
           <a:xfrm rot="5400000">
-            <a:off x="7809286" y="3331579"/>
-            <a:ext cx="2071401" cy="369332"/>
+            <a:off x="7987208" y="2944486"/>
+            <a:ext cx="1715558" cy="369332"/>
           </a:xfrm>
           <a:prstGeom prst="rect">
             <a:avLst/>
@@ -14542,6 +14563,626 @@
           </a:p>
         </p:txBody>
       </p:sp>
+      <p:grpSp>
+        <p:nvGrpSpPr>
+          <p:cNvPr id="34" name="그룹 33">
+            <a:extLst>
+              <a:ext uri="{FF2B5EF4-FFF2-40B4-BE49-F238E27FC236}">
+                <a16:creationId xmlns:a16="http://schemas.microsoft.com/office/drawing/2014/main" id="{7EAFCDC8-C1F4-4359-A56C-25480E4D33E3}"/>
+              </a:ext>
+            </a:extLst>
+          </p:cNvPr>
+          <p:cNvGrpSpPr/>
+          <p:nvPr/>
+        </p:nvGrpSpPr>
+        <p:grpSpPr>
+          <a:xfrm>
+            <a:off x="367990" y="5475637"/>
+            <a:ext cx="713899" cy="326945"/>
+            <a:chOff x="367990" y="5501120"/>
+            <a:chExt cx="713899" cy="326945"/>
+          </a:xfrm>
+        </p:grpSpPr>
+        <p:sp>
+          <p:nvSpPr>
+            <p:cNvPr id="65" name="화살표: 아래쪽 64">
+              <a:extLst>
+                <a:ext uri="{FF2B5EF4-FFF2-40B4-BE49-F238E27FC236}">
+                  <a16:creationId xmlns:a16="http://schemas.microsoft.com/office/drawing/2014/main" id="{D81B72CB-F1B0-4033-A036-FA17DB3DDFB1}"/>
+                </a:ext>
+              </a:extLst>
+            </p:cNvPr>
+            <p:cNvSpPr/>
+            <p:nvPr/>
+          </p:nvSpPr>
+          <p:spPr>
+            <a:xfrm rot="16200000">
+              <a:off x="561468" y="5307643"/>
+              <a:ext cx="326944" cy="713899"/>
+            </a:xfrm>
+            <a:prstGeom prst="downArrow">
+              <a:avLst>
+                <a:gd name="adj1" fmla="val 32363"/>
+                <a:gd name="adj2" fmla="val 42063"/>
+              </a:avLst>
+            </a:prstGeom>
+            <a:solidFill>
+              <a:schemeClr val="accent2"/>
+            </a:solidFill>
+            <a:ln>
+              <a:noFill/>
+            </a:ln>
+          </p:spPr>
+          <p:style>
+            <a:lnRef idx="2">
+              <a:schemeClr val="accent1">
+                <a:shade val="50000"/>
+              </a:schemeClr>
+            </a:lnRef>
+            <a:fillRef idx="1">
+              <a:schemeClr val="accent1"/>
+            </a:fillRef>
+            <a:effectRef idx="0">
+              <a:schemeClr val="accent1"/>
+            </a:effectRef>
+            <a:fontRef idx="minor">
+              <a:schemeClr val="lt1"/>
+            </a:fontRef>
+          </p:style>
+          <p:txBody>
+            <a:bodyPr rtlCol="0" anchor="ctr"/>
+            <a:lstStyle/>
+            <a:p>
+              <a:pPr algn="ctr"/>
+              <a:endParaRPr lang="ko-KR" altLang="en-US"/>
+            </a:p>
+          </p:txBody>
+        </p:sp>
+        <p:sp>
+          <p:nvSpPr>
+            <p:cNvPr id="66" name="직사각형 65">
+              <a:extLst>
+                <a:ext uri="{FF2B5EF4-FFF2-40B4-BE49-F238E27FC236}">
+                  <a16:creationId xmlns:a16="http://schemas.microsoft.com/office/drawing/2014/main" id="{675DA16B-9A79-47A6-9EAC-3F566C908773}"/>
+                </a:ext>
+              </a:extLst>
+            </p:cNvPr>
+            <p:cNvSpPr/>
+            <p:nvPr/>
+          </p:nvSpPr>
+          <p:spPr>
+            <a:xfrm rot="16200000">
+              <a:off x="524634" y="5651080"/>
+              <a:ext cx="326945" cy="27026"/>
+            </a:xfrm>
+            <a:prstGeom prst="rect">
+              <a:avLst/>
+            </a:prstGeom>
+            <a:solidFill>
+              <a:schemeClr val="bg1"/>
+            </a:solidFill>
+            <a:ln>
+              <a:noFill/>
+            </a:ln>
+          </p:spPr>
+          <p:style>
+            <a:lnRef idx="2">
+              <a:schemeClr val="accent1">
+                <a:shade val="50000"/>
+              </a:schemeClr>
+            </a:lnRef>
+            <a:fillRef idx="1">
+              <a:schemeClr val="accent1"/>
+            </a:fillRef>
+            <a:effectRef idx="0">
+              <a:schemeClr val="accent1"/>
+            </a:effectRef>
+            <a:fontRef idx="minor">
+              <a:schemeClr val="lt1"/>
+            </a:fontRef>
+          </p:style>
+          <p:txBody>
+            <a:bodyPr rtlCol="0" anchor="ctr"/>
+            <a:lstStyle/>
+            <a:p>
+              <a:pPr algn="ctr"/>
+              <a:endParaRPr lang="ko-KR" altLang="en-US"/>
+            </a:p>
+          </p:txBody>
+        </p:sp>
+        <p:sp>
+          <p:nvSpPr>
+            <p:cNvPr id="67" name="직사각형 66">
+              <a:extLst>
+                <a:ext uri="{FF2B5EF4-FFF2-40B4-BE49-F238E27FC236}">
+                  <a16:creationId xmlns:a16="http://schemas.microsoft.com/office/drawing/2014/main" id="{3B60BDB6-C7DE-4BC1-A0A4-CF29B8A71F98}"/>
+                </a:ext>
+              </a:extLst>
+            </p:cNvPr>
+            <p:cNvSpPr/>
+            <p:nvPr/>
+          </p:nvSpPr>
+          <p:spPr>
+            <a:xfrm rot="16200000">
+              <a:off x="439501" y="5651080"/>
+              <a:ext cx="326945" cy="27026"/>
+            </a:xfrm>
+            <a:prstGeom prst="rect">
+              <a:avLst/>
+            </a:prstGeom>
+            <a:solidFill>
+              <a:schemeClr val="bg1"/>
+            </a:solidFill>
+            <a:ln>
+              <a:noFill/>
+            </a:ln>
+          </p:spPr>
+          <p:style>
+            <a:lnRef idx="2">
+              <a:schemeClr val="accent1">
+                <a:shade val="50000"/>
+              </a:schemeClr>
+            </a:lnRef>
+            <a:fillRef idx="1">
+              <a:schemeClr val="accent1"/>
+            </a:fillRef>
+            <a:effectRef idx="0">
+              <a:schemeClr val="accent1"/>
+            </a:effectRef>
+            <a:fontRef idx="minor">
+              <a:schemeClr val="lt1"/>
+            </a:fontRef>
+          </p:style>
+          <p:txBody>
+            <a:bodyPr rtlCol="0" anchor="ctr"/>
+            <a:lstStyle/>
+            <a:p>
+              <a:pPr algn="ctr"/>
+              <a:endParaRPr lang="ko-KR" altLang="en-US"/>
+            </a:p>
+          </p:txBody>
+        </p:sp>
+        <p:sp>
+          <p:nvSpPr>
+            <p:cNvPr id="68" name="직사각형 67">
+              <a:extLst>
+                <a:ext uri="{FF2B5EF4-FFF2-40B4-BE49-F238E27FC236}">
+                  <a16:creationId xmlns:a16="http://schemas.microsoft.com/office/drawing/2014/main" id="{7115E2D4-A4B6-47F7-B1E8-7DD96BC6F0C8}"/>
+                </a:ext>
+              </a:extLst>
+            </p:cNvPr>
+            <p:cNvSpPr/>
+            <p:nvPr/>
+          </p:nvSpPr>
+          <p:spPr>
+            <a:xfrm rot="16200000">
+              <a:off x="356037" y="5651080"/>
+              <a:ext cx="326945" cy="27026"/>
+            </a:xfrm>
+            <a:prstGeom prst="rect">
+              <a:avLst/>
+            </a:prstGeom>
+            <a:solidFill>
+              <a:schemeClr val="bg1"/>
+            </a:solidFill>
+            <a:ln>
+              <a:noFill/>
+            </a:ln>
+          </p:spPr>
+          <p:style>
+            <a:lnRef idx="2">
+              <a:schemeClr val="accent1">
+                <a:shade val="50000"/>
+              </a:schemeClr>
+            </a:lnRef>
+            <a:fillRef idx="1">
+              <a:schemeClr val="accent1"/>
+            </a:fillRef>
+            <a:effectRef idx="0">
+              <a:schemeClr val="accent1"/>
+            </a:effectRef>
+            <a:fontRef idx="minor">
+              <a:schemeClr val="lt1"/>
+            </a:fontRef>
+          </p:style>
+          <p:txBody>
+            <a:bodyPr rtlCol="0" anchor="ctr"/>
+            <a:lstStyle/>
+            <a:p>
+              <a:pPr algn="ctr"/>
+              <a:endParaRPr lang="ko-KR" altLang="en-US"/>
+            </a:p>
+          </p:txBody>
+        </p:sp>
+      </p:grpSp>
+      <p:sp>
+        <p:nvSpPr>
+          <p:cNvPr id="31" name="직사각형 30">
+            <a:extLst>
+              <a:ext uri="{FF2B5EF4-FFF2-40B4-BE49-F238E27FC236}">
+                <a16:creationId xmlns:a16="http://schemas.microsoft.com/office/drawing/2014/main" id="{66957543-AF12-455F-B367-0CC018C3C310}"/>
+              </a:ext>
+            </a:extLst>
+          </p:cNvPr>
+          <p:cNvSpPr/>
+          <p:nvPr/>
+        </p:nvSpPr>
+        <p:spPr>
+          <a:xfrm>
+            <a:off x="1197148" y="5457449"/>
+            <a:ext cx="7695332" cy="369332"/>
+          </a:xfrm>
+          <a:prstGeom prst="rect">
+            <a:avLst/>
+          </a:prstGeom>
+        </p:spPr>
+        <p:txBody>
+          <a:bodyPr wrap="square">
+            <a:spAutoFit/>
+          </a:bodyPr>
+          <a:lstStyle/>
+          <a:p>
+            <a:r>
+              <a:rPr lang="ko-KR" altLang="en-US" dirty="0"/>
+              <a:t>서로 독립적인 랜덤 변수들의 분포의 선형조합은 가우스 분포를 따른다</a:t>
+            </a:r>
+            <a:r>
+              <a:rPr lang="en-US" altLang="ko-KR" dirty="0"/>
+              <a:t>.</a:t>
+            </a:r>
+          </a:p>
+        </p:txBody>
+      </p:sp>
+      <mc:AlternateContent xmlns:mc="http://schemas.openxmlformats.org/markup-compatibility/2006">
+        <mc:Choice xmlns:a14="http://schemas.microsoft.com/office/drawing/2010/main" Requires="a14">
+          <p:sp>
+            <p:nvSpPr>
+              <p:cNvPr id="74" name="직사각형 73">
+                <a:extLst>
+                  <a:ext uri="{FF2B5EF4-FFF2-40B4-BE49-F238E27FC236}">
+                    <a16:creationId xmlns:a16="http://schemas.microsoft.com/office/drawing/2014/main" id="{418389AB-906E-421A-97CC-513351C6120A}"/>
+                  </a:ext>
+                </a:extLst>
+              </p:cNvPr>
+              <p:cNvSpPr/>
+              <p:nvPr/>
+            </p:nvSpPr>
+            <p:spPr>
+              <a:xfrm>
+                <a:off x="1197148" y="5969951"/>
+                <a:ext cx="7440856" cy="369332"/>
+              </a:xfrm>
+              <a:prstGeom prst="rect">
+                <a:avLst/>
+              </a:prstGeom>
+            </p:spPr>
+            <p:txBody>
+              <a:bodyPr wrap="square">
+                <a:spAutoFit/>
+              </a:bodyPr>
+              <a:lstStyle/>
+              <a:p>
+                <a:r>
+                  <a:rPr lang="en-US" altLang="ko-KR" dirty="0"/>
+                  <a:t>Gaussian </a:t>
+                </a:r>
+                <a:r>
+                  <a:rPr lang="ko-KR" altLang="en-US" dirty="0"/>
+                  <a:t>분포로 표현된 </a:t>
+                </a:r>
+                <a14:m>
+                  <m:oMath xmlns:m="http://schemas.openxmlformats.org/officeDocument/2006/math">
+                    <m:r>
+                      <a:rPr lang="en-US" altLang="ko-KR" i="1" dirty="0" smtClean="0">
+                        <a:latin typeface="Cambria Math" panose="02040503050406030204" pitchFamily="18" charset="0"/>
+                      </a:rPr>
+                      <m:t>𝑥</m:t>
+                    </m:r>
+                  </m:oMath>
+                </a14:m>
+                <a:r>
+                  <a:rPr lang="ko-KR" altLang="en-US" dirty="0"/>
+                  <a:t>들을 어떻게 조합하면 </a:t>
+                </a:r>
+                <a14:m>
+                  <m:oMath xmlns:m="http://schemas.openxmlformats.org/officeDocument/2006/math">
+                    <m:r>
+                      <a:rPr lang="en-US" altLang="ko-KR" i="1" dirty="0" smtClean="0">
+                        <a:latin typeface="Cambria Math" panose="02040503050406030204" pitchFamily="18" charset="0"/>
+                      </a:rPr>
+                      <m:t>𝑠</m:t>
+                    </m:r>
+                  </m:oMath>
+                </a14:m>
+                <a:r>
+                  <a:rPr lang="ko-KR" altLang="en-US" dirty="0"/>
+                  <a:t>가 나올까</a:t>
+                </a:r>
+                <a:r>
+                  <a:rPr lang="en-US" altLang="ko-KR" dirty="0"/>
+                  <a:t>?</a:t>
+                </a:r>
+              </a:p>
+            </p:txBody>
+          </p:sp>
+        </mc:Choice>
+        <mc:Fallback>
+          <p:sp>
+            <p:nvSpPr>
+              <p:cNvPr id="74" name="직사각형 73">
+                <a:extLst>
+                  <a:ext uri="{FF2B5EF4-FFF2-40B4-BE49-F238E27FC236}">
+                    <a16:creationId xmlns:a16="http://schemas.microsoft.com/office/drawing/2014/main" id="{418389AB-906E-421A-97CC-513351C6120A}"/>
+                  </a:ext>
+                </a:extLst>
+              </p:cNvPr>
+              <p:cNvSpPr>
+                <a:spLocks noRot="1" noChangeAspect="1" noMove="1" noResize="1" noEditPoints="1" noAdjustHandles="1" noChangeArrowheads="1" noChangeShapeType="1" noTextEdit="1"/>
+              </p:cNvSpPr>
+              <p:nvPr/>
+            </p:nvSpPr>
+            <p:spPr>
+              <a:xfrm>
+                <a:off x="1197148" y="5969951"/>
+                <a:ext cx="7440856" cy="369332"/>
+              </a:xfrm>
+              <a:prstGeom prst="rect">
+                <a:avLst/>
+              </a:prstGeom>
+              <a:blipFill>
+                <a:blip r:embed="rId8"/>
+                <a:stretch>
+                  <a:fillRect l="-655" t="-8197" b="-24590"/>
+                </a:stretch>
+              </a:blipFill>
+            </p:spPr>
+            <p:txBody>
+              <a:bodyPr/>
+              <a:lstStyle/>
+              <a:p>
+                <a:r>
+                  <a:rPr lang="ko-KR" altLang="en-US">
+                    <a:noFill/>
+                  </a:rPr>
+                  <a:t> </a:t>
+                </a:r>
+              </a:p>
+            </p:txBody>
+          </p:sp>
+        </mc:Fallback>
+      </mc:AlternateContent>
+      <p:grpSp>
+        <p:nvGrpSpPr>
+          <p:cNvPr id="35" name="그룹 34">
+            <a:extLst>
+              <a:ext uri="{FF2B5EF4-FFF2-40B4-BE49-F238E27FC236}">
+                <a16:creationId xmlns:a16="http://schemas.microsoft.com/office/drawing/2014/main" id="{05F108F8-492F-4101-8AD9-4D18971DA1FB}"/>
+              </a:ext>
+            </a:extLst>
+          </p:cNvPr>
+          <p:cNvGrpSpPr/>
+          <p:nvPr/>
+        </p:nvGrpSpPr>
+        <p:grpSpPr>
+          <a:xfrm>
+            <a:off x="367990" y="5991144"/>
+            <a:ext cx="713899" cy="326945"/>
+            <a:chOff x="367990" y="6016627"/>
+            <a:chExt cx="713899" cy="326945"/>
+          </a:xfrm>
+        </p:grpSpPr>
+        <p:sp>
+          <p:nvSpPr>
+            <p:cNvPr id="77" name="화살표: 아래쪽 76">
+              <a:extLst>
+                <a:ext uri="{FF2B5EF4-FFF2-40B4-BE49-F238E27FC236}">
+                  <a16:creationId xmlns:a16="http://schemas.microsoft.com/office/drawing/2014/main" id="{EA443A86-A8BE-4170-92A7-759E59BBA6DB}"/>
+                </a:ext>
+              </a:extLst>
+            </p:cNvPr>
+            <p:cNvSpPr/>
+            <p:nvPr/>
+          </p:nvSpPr>
+          <p:spPr>
+            <a:xfrm rot="16200000">
+              <a:off x="561468" y="5823150"/>
+              <a:ext cx="326944" cy="713899"/>
+            </a:xfrm>
+            <a:prstGeom prst="downArrow">
+              <a:avLst>
+                <a:gd name="adj1" fmla="val 32363"/>
+                <a:gd name="adj2" fmla="val 42063"/>
+              </a:avLst>
+            </a:prstGeom>
+            <a:solidFill>
+              <a:schemeClr val="accent1"/>
+            </a:solidFill>
+            <a:ln>
+              <a:noFill/>
+            </a:ln>
+          </p:spPr>
+          <p:style>
+            <a:lnRef idx="2">
+              <a:schemeClr val="accent1">
+                <a:shade val="50000"/>
+              </a:schemeClr>
+            </a:lnRef>
+            <a:fillRef idx="1">
+              <a:schemeClr val="accent1"/>
+            </a:fillRef>
+            <a:effectRef idx="0">
+              <a:schemeClr val="accent1"/>
+            </a:effectRef>
+            <a:fontRef idx="minor">
+              <a:schemeClr val="lt1"/>
+            </a:fontRef>
+          </p:style>
+          <p:txBody>
+            <a:bodyPr rtlCol="0" anchor="ctr"/>
+            <a:lstStyle/>
+            <a:p>
+              <a:pPr algn="ctr"/>
+              <a:endParaRPr lang="ko-KR" altLang="en-US"/>
+            </a:p>
+          </p:txBody>
+        </p:sp>
+        <p:sp>
+          <p:nvSpPr>
+            <p:cNvPr id="78" name="직사각형 77">
+              <a:extLst>
+                <a:ext uri="{FF2B5EF4-FFF2-40B4-BE49-F238E27FC236}">
+                  <a16:creationId xmlns:a16="http://schemas.microsoft.com/office/drawing/2014/main" id="{A400F399-3643-421A-A569-6CF5B00DB989}"/>
+                </a:ext>
+              </a:extLst>
+            </p:cNvPr>
+            <p:cNvSpPr/>
+            <p:nvPr/>
+          </p:nvSpPr>
+          <p:spPr>
+            <a:xfrm rot="16200000">
+              <a:off x="524634" y="6166587"/>
+              <a:ext cx="326945" cy="27026"/>
+            </a:xfrm>
+            <a:prstGeom prst="rect">
+              <a:avLst/>
+            </a:prstGeom>
+            <a:solidFill>
+              <a:schemeClr val="bg1"/>
+            </a:solidFill>
+            <a:ln>
+              <a:noFill/>
+            </a:ln>
+          </p:spPr>
+          <p:style>
+            <a:lnRef idx="2">
+              <a:schemeClr val="accent1">
+                <a:shade val="50000"/>
+              </a:schemeClr>
+            </a:lnRef>
+            <a:fillRef idx="1">
+              <a:schemeClr val="accent1"/>
+            </a:fillRef>
+            <a:effectRef idx="0">
+              <a:schemeClr val="accent1"/>
+            </a:effectRef>
+            <a:fontRef idx="minor">
+              <a:schemeClr val="lt1"/>
+            </a:fontRef>
+          </p:style>
+          <p:txBody>
+            <a:bodyPr rtlCol="0" anchor="ctr"/>
+            <a:lstStyle/>
+            <a:p>
+              <a:pPr algn="ctr"/>
+              <a:endParaRPr lang="ko-KR" altLang="en-US"/>
+            </a:p>
+          </p:txBody>
+        </p:sp>
+        <p:sp>
+          <p:nvSpPr>
+            <p:cNvPr id="79" name="직사각형 78">
+              <a:extLst>
+                <a:ext uri="{FF2B5EF4-FFF2-40B4-BE49-F238E27FC236}">
+                  <a16:creationId xmlns:a16="http://schemas.microsoft.com/office/drawing/2014/main" id="{4D212B28-5AED-499B-8371-8CC7A763CC87}"/>
+                </a:ext>
+              </a:extLst>
+            </p:cNvPr>
+            <p:cNvSpPr/>
+            <p:nvPr/>
+          </p:nvSpPr>
+          <p:spPr>
+            <a:xfrm rot="16200000">
+              <a:off x="439501" y="6166587"/>
+              <a:ext cx="326945" cy="27026"/>
+            </a:xfrm>
+            <a:prstGeom prst="rect">
+              <a:avLst/>
+            </a:prstGeom>
+            <a:solidFill>
+              <a:schemeClr val="bg1"/>
+            </a:solidFill>
+            <a:ln>
+              <a:noFill/>
+            </a:ln>
+          </p:spPr>
+          <p:style>
+            <a:lnRef idx="2">
+              <a:schemeClr val="accent1">
+                <a:shade val="50000"/>
+              </a:schemeClr>
+            </a:lnRef>
+            <a:fillRef idx="1">
+              <a:schemeClr val="accent1"/>
+            </a:fillRef>
+            <a:effectRef idx="0">
+              <a:schemeClr val="accent1"/>
+            </a:effectRef>
+            <a:fontRef idx="minor">
+              <a:schemeClr val="lt1"/>
+            </a:fontRef>
+          </p:style>
+          <p:txBody>
+            <a:bodyPr rtlCol="0" anchor="ctr"/>
+            <a:lstStyle/>
+            <a:p>
+              <a:pPr algn="ctr"/>
+              <a:endParaRPr lang="ko-KR" altLang="en-US"/>
+            </a:p>
+          </p:txBody>
+        </p:sp>
+        <p:sp>
+          <p:nvSpPr>
+            <p:cNvPr id="80" name="직사각형 79">
+              <a:extLst>
+                <a:ext uri="{FF2B5EF4-FFF2-40B4-BE49-F238E27FC236}">
+                  <a16:creationId xmlns:a16="http://schemas.microsoft.com/office/drawing/2014/main" id="{3C8E34C7-A8E7-4B8B-B775-625D8B4064E5}"/>
+                </a:ext>
+              </a:extLst>
+            </p:cNvPr>
+            <p:cNvSpPr/>
+            <p:nvPr/>
+          </p:nvSpPr>
+          <p:spPr>
+            <a:xfrm rot="16200000">
+              <a:off x="356037" y="6166587"/>
+              <a:ext cx="326945" cy="27026"/>
+            </a:xfrm>
+            <a:prstGeom prst="rect">
+              <a:avLst/>
+            </a:prstGeom>
+            <a:solidFill>
+              <a:schemeClr val="bg1"/>
+            </a:solidFill>
+            <a:ln>
+              <a:noFill/>
+            </a:ln>
+          </p:spPr>
+          <p:style>
+            <a:lnRef idx="2">
+              <a:schemeClr val="accent1">
+                <a:shade val="50000"/>
+              </a:schemeClr>
+            </a:lnRef>
+            <a:fillRef idx="1">
+              <a:schemeClr val="accent1"/>
+            </a:fillRef>
+            <a:effectRef idx="0">
+              <a:schemeClr val="accent1"/>
+            </a:effectRef>
+            <a:fontRef idx="minor">
+              <a:schemeClr val="lt1"/>
+            </a:fontRef>
+          </p:style>
+          <p:txBody>
+            <a:bodyPr rtlCol="0" anchor="ctr"/>
+            <a:lstStyle/>
+            <a:p>
+              <a:pPr algn="ctr"/>
+              <a:endParaRPr lang="ko-KR" altLang="en-US"/>
+            </a:p>
+          </p:txBody>
+        </p:sp>
+      </p:grpSp>
     </p:spTree>
     <p:extLst>
       <p:ext uri="{BB962C8B-B14F-4D97-AF65-F5344CB8AC3E}">

</xml_diff>

<commit_message>
ICA / pics2 재수정
</commit_message>
<xml_diff>
--- a/pics/2020-07-14_ICA/pics.pptx
+++ b/pics/2020-07-14_ICA/pics.pptx
@@ -14864,11 +14864,29 @@
               <a:p>
                 <a:r>
                   <a:rPr lang="en-US" altLang="ko-KR" dirty="0"/>
-                  <a:t>Gaussian </a:t>
+                  <a:t>(</a:t>
+                </a:r>
+                <a14:m>
+                  <m:oMath xmlns:m="http://schemas.openxmlformats.org/officeDocument/2006/math">
+                    <m:r>
+                      <a:rPr lang="en-US" altLang="ko-KR" i="1" dirty="0" smtClean="0">
+                        <a:latin typeface="Cambria Math" panose="02040503050406030204" pitchFamily="18" charset="0"/>
+                      </a:rPr>
+                      <m:t>𝑠</m:t>
+                    </m:r>
+                  </m:oMath>
+                </a14:m>
+                <a:r>
+                  <a:rPr lang="ko-KR" altLang="en-US" dirty="0"/>
+                  <a:t>에 비해 더 가우스 분포를 따르는</a:t>
+                </a:r>
+                <a:r>
+                  <a:rPr lang="en-US" altLang="ko-KR" dirty="0"/>
+                  <a:t>)</a:t>
                 </a:r>
                 <a:r>
                   <a:rPr lang="ko-KR" altLang="en-US" dirty="0"/>
-                  <a:t>분포로 표현된 </a:t>
+                  <a:t> </a:t>
                 </a:r>
                 <a14:m>
                   <m:oMath xmlns:m="http://schemas.openxmlformats.org/officeDocument/2006/math">
@@ -14896,7 +14914,7 @@
                 </a14:m>
                 <a:r>
                   <a:rPr lang="ko-KR" altLang="en-US" dirty="0"/>
-                  <a:t>가 나올까</a:t>
+                  <a:t>를 얻을까</a:t>
                 </a:r>
                 <a:r>
                   <a:rPr lang="en-US" altLang="ko-KR" dirty="0"/>
@@ -14932,7 +14950,7 @@
               <a:blipFill>
                 <a:blip r:embed="rId8"/>
                 <a:stretch>
-                  <a:fillRect l="-655" t="-8197" b="-24590"/>
+                  <a:fillRect l="-655" t="-8197" r="-2048" b="-24590"/>
                 </a:stretch>
               </a:blipFill>
             </p:spPr>

</xml_diff>

<commit_message>
ICA / pic 3 upload
</commit_message>
<xml_diff>
--- a/pics/2020-07-14_ICA/pics.pptx
+++ b/pics/2020-07-14_ICA/pics.pptx
@@ -8,6 +8,7 @@
     <p:sldId id="256" r:id="rId2"/>
     <p:sldId id="257" r:id="rId3"/>
     <p:sldId id="258" r:id="rId4"/>
+    <p:sldId id="259" r:id="rId5"/>
   </p:sldIdLst>
   <p:sldSz cx="9144000" cy="6858000" type="screen4x3"/>
   <p:notesSz cx="6858000" cy="9144000"/>
@@ -108,7 +109,7 @@
   </p:defaultTextStyle>
   <p:extLst>
     <p:ext uri="{EFAFB233-063F-42B5-8137-9DF3F51BA10A}">
-      <p15:sldGuideLst xmlns:p15="http://schemas.microsoft.com/office/powerpoint/2012/main">
+      <p15:sldGuideLst xmlns:p15="http://schemas.microsoft.com/office/powerpoint/2012/main" xmlns="">
         <p15:guide id="1" orient="horz" pos="2160">
           <p15:clr>
             <a:srgbClr val="A4A3A4"/>
@@ -304,7 +305,7 @@
           <a:p>
             <a:fld id="{5FB06F55-EB71-4627-9F55-9904957A86B1}" type="datetimeFigureOut">
               <a:rPr lang="ko-KR" altLang="en-US" smtClean="0"/>
-              <a:t>2020-07-15</a:t>
+              <a:t>2020-07-16</a:t>
             </a:fld>
             <a:endParaRPr lang="ko-KR" altLang="en-US"/>
           </a:p>
@@ -472,7 +473,7 @@
           <a:p>
             <a:fld id="{5FB06F55-EB71-4627-9F55-9904957A86B1}" type="datetimeFigureOut">
               <a:rPr lang="ko-KR" altLang="en-US" smtClean="0"/>
-              <a:t>2020-07-15</a:t>
+              <a:t>2020-07-16</a:t>
             </a:fld>
             <a:endParaRPr lang="ko-KR" altLang="en-US"/>
           </a:p>
@@ -650,7 +651,7 @@
           <a:p>
             <a:fld id="{5FB06F55-EB71-4627-9F55-9904957A86B1}" type="datetimeFigureOut">
               <a:rPr lang="ko-KR" altLang="en-US" smtClean="0"/>
-              <a:t>2020-07-15</a:t>
+              <a:t>2020-07-16</a:t>
             </a:fld>
             <a:endParaRPr lang="ko-KR" altLang="en-US"/>
           </a:p>
@@ -818,7 +819,7 @@
           <a:p>
             <a:fld id="{5FB06F55-EB71-4627-9F55-9904957A86B1}" type="datetimeFigureOut">
               <a:rPr lang="ko-KR" altLang="en-US" smtClean="0"/>
-              <a:t>2020-07-15</a:t>
+              <a:t>2020-07-16</a:t>
             </a:fld>
             <a:endParaRPr lang="ko-KR" altLang="en-US"/>
           </a:p>
@@ -1063,7 +1064,7 @@
           <a:p>
             <a:fld id="{5FB06F55-EB71-4627-9F55-9904957A86B1}" type="datetimeFigureOut">
               <a:rPr lang="ko-KR" altLang="en-US" smtClean="0"/>
-              <a:t>2020-07-15</a:t>
+              <a:t>2020-07-16</a:t>
             </a:fld>
             <a:endParaRPr lang="ko-KR" altLang="en-US"/>
           </a:p>
@@ -1348,7 +1349,7 @@
           <a:p>
             <a:fld id="{5FB06F55-EB71-4627-9F55-9904957A86B1}" type="datetimeFigureOut">
               <a:rPr lang="ko-KR" altLang="en-US" smtClean="0"/>
-              <a:t>2020-07-15</a:t>
+              <a:t>2020-07-16</a:t>
             </a:fld>
             <a:endParaRPr lang="ko-KR" altLang="en-US"/>
           </a:p>
@@ -1767,7 +1768,7 @@
           <a:p>
             <a:fld id="{5FB06F55-EB71-4627-9F55-9904957A86B1}" type="datetimeFigureOut">
               <a:rPr lang="ko-KR" altLang="en-US" smtClean="0"/>
-              <a:t>2020-07-15</a:t>
+              <a:t>2020-07-16</a:t>
             </a:fld>
             <a:endParaRPr lang="ko-KR" altLang="en-US"/>
           </a:p>
@@ -1884,7 +1885,7 @@
           <a:p>
             <a:fld id="{5FB06F55-EB71-4627-9F55-9904957A86B1}" type="datetimeFigureOut">
               <a:rPr lang="ko-KR" altLang="en-US" smtClean="0"/>
-              <a:t>2020-07-15</a:t>
+              <a:t>2020-07-16</a:t>
             </a:fld>
             <a:endParaRPr lang="ko-KR" altLang="en-US"/>
           </a:p>
@@ -1979,7 +1980,7 @@
           <a:p>
             <a:fld id="{5FB06F55-EB71-4627-9F55-9904957A86B1}" type="datetimeFigureOut">
               <a:rPr lang="ko-KR" altLang="en-US" smtClean="0"/>
-              <a:t>2020-07-15</a:t>
+              <a:t>2020-07-16</a:t>
             </a:fld>
             <a:endParaRPr lang="ko-KR" altLang="en-US"/>
           </a:p>
@@ -2254,7 +2255,7 @@
           <a:p>
             <a:fld id="{5FB06F55-EB71-4627-9F55-9904957A86B1}" type="datetimeFigureOut">
               <a:rPr lang="ko-KR" altLang="en-US" smtClean="0"/>
-              <a:t>2020-07-15</a:t>
+              <a:t>2020-07-16</a:t>
             </a:fld>
             <a:endParaRPr lang="ko-KR" altLang="en-US"/>
           </a:p>
@@ -2506,7 +2507,7 @@
           <a:p>
             <a:fld id="{5FB06F55-EB71-4627-9F55-9904957A86B1}" type="datetimeFigureOut">
               <a:rPr lang="ko-KR" altLang="en-US" smtClean="0"/>
-              <a:t>2020-07-15</a:t>
+              <a:t>2020-07-16</a:t>
             </a:fld>
             <a:endParaRPr lang="ko-KR" altLang="en-US"/>
           </a:p>
@@ -2717,7 +2718,7 @@
           <a:p>
             <a:fld id="{5FB06F55-EB71-4627-9F55-9904957A86B1}" type="datetimeFigureOut">
               <a:rPr lang="ko-KR" altLang="en-US" smtClean="0"/>
-              <a:t>2020-07-15</a:t>
+              <a:t>2020-07-16</a:t>
             </a:fld>
             <a:endParaRPr lang="ko-KR" altLang="en-US"/>
           </a:p>
@@ -3097,7 +3098,7 @@
           <p:cNvPr id="3" name="직선 화살표 연결선 2">
             <a:extLst>
               <a:ext uri="{FF2B5EF4-FFF2-40B4-BE49-F238E27FC236}">
-                <a16:creationId xmlns:a16="http://schemas.microsoft.com/office/drawing/2014/main" id="{040C2B51-BAFC-4CAA-B211-38CAACCEDB0D}"/>
+                <a16:creationId xmlns:a16="http://schemas.microsoft.com/office/drawing/2014/main" xmlns="" id="{040C2B51-BAFC-4CAA-B211-38CAACCEDB0D}"/>
               </a:ext>
             </a:extLst>
           </p:cNvPr>
@@ -3142,7 +3143,7 @@
           <p:cNvPr id="11" name="직선 화살표 연결선 10">
             <a:extLst>
               <a:ext uri="{FF2B5EF4-FFF2-40B4-BE49-F238E27FC236}">
-                <a16:creationId xmlns:a16="http://schemas.microsoft.com/office/drawing/2014/main" id="{8EF8873D-1AD7-402C-A444-34E2D013A0E0}"/>
+                <a16:creationId xmlns:a16="http://schemas.microsoft.com/office/drawing/2014/main" xmlns="" id="{8EF8873D-1AD7-402C-A444-34E2D013A0E0}"/>
               </a:ext>
             </a:extLst>
           </p:cNvPr>
@@ -3187,7 +3188,7 @@
           <p:cNvPr id="13" name="직선 화살표 연결선 12">
             <a:extLst>
               <a:ext uri="{FF2B5EF4-FFF2-40B4-BE49-F238E27FC236}">
-                <a16:creationId xmlns:a16="http://schemas.microsoft.com/office/drawing/2014/main" id="{A3542202-D6A9-4DBA-BCBB-CEBE1E4536B3}"/>
+                <a16:creationId xmlns:a16="http://schemas.microsoft.com/office/drawing/2014/main" xmlns="" id="{A3542202-D6A9-4DBA-BCBB-CEBE1E4536B3}"/>
               </a:ext>
             </a:extLst>
           </p:cNvPr>
@@ -3232,7 +3233,7 @@
           <p:cNvPr id="15" name="직선 화살표 연결선 14">
             <a:extLst>
               <a:ext uri="{FF2B5EF4-FFF2-40B4-BE49-F238E27FC236}">
-                <a16:creationId xmlns:a16="http://schemas.microsoft.com/office/drawing/2014/main" id="{A29B7648-42CB-4DEE-9996-3CDE3BD92A4A}"/>
+                <a16:creationId xmlns:a16="http://schemas.microsoft.com/office/drawing/2014/main" xmlns="" id="{A29B7648-42CB-4DEE-9996-3CDE3BD92A4A}"/>
               </a:ext>
             </a:extLst>
           </p:cNvPr>
@@ -3277,7 +3278,7 @@
           <p:cNvPr id="17" name="직선 화살표 연결선 16">
             <a:extLst>
               <a:ext uri="{FF2B5EF4-FFF2-40B4-BE49-F238E27FC236}">
-                <a16:creationId xmlns:a16="http://schemas.microsoft.com/office/drawing/2014/main" id="{DD4A1FE4-8F34-4D5D-8C2B-4EE68491132E}"/>
+                <a16:creationId xmlns:a16="http://schemas.microsoft.com/office/drawing/2014/main" xmlns="" id="{DD4A1FE4-8F34-4D5D-8C2B-4EE68491132E}"/>
               </a:ext>
             </a:extLst>
           </p:cNvPr>
@@ -3322,7 +3323,7 @@
           <p:cNvPr id="19" name="직선 화살표 연결선 18">
             <a:extLst>
               <a:ext uri="{FF2B5EF4-FFF2-40B4-BE49-F238E27FC236}">
-                <a16:creationId xmlns:a16="http://schemas.microsoft.com/office/drawing/2014/main" id="{6ACE88B7-13E2-4A22-93FF-85606FB6931D}"/>
+                <a16:creationId xmlns:a16="http://schemas.microsoft.com/office/drawing/2014/main" xmlns="" id="{6ACE88B7-13E2-4A22-93FF-85606FB6931D}"/>
               </a:ext>
             </a:extLst>
           </p:cNvPr>
@@ -3367,7 +3368,7 @@
           <p:cNvPr id="21" name="직선 화살표 연결선 20">
             <a:extLst>
               <a:ext uri="{FF2B5EF4-FFF2-40B4-BE49-F238E27FC236}">
-                <a16:creationId xmlns:a16="http://schemas.microsoft.com/office/drawing/2014/main" id="{D800A1A7-1A4E-43CB-8DD0-D43651B1F3CD}"/>
+                <a16:creationId xmlns:a16="http://schemas.microsoft.com/office/drawing/2014/main" xmlns="" id="{D800A1A7-1A4E-43CB-8DD0-D43651B1F3CD}"/>
               </a:ext>
             </a:extLst>
           </p:cNvPr>
@@ -3412,7 +3413,7 @@
           <p:cNvPr id="23" name="직선 화살표 연결선 22">
             <a:extLst>
               <a:ext uri="{FF2B5EF4-FFF2-40B4-BE49-F238E27FC236}">
-                <a16:creationId xmlns:a16="http://schemas.microsoft.com/office/drawing/2014/main" id="{247563C1-ABFA-4A5C-A741-ABC57BC692C3}"/>
+                <a16:creationId xmlns:a16="http://schemas.microsoft.com/office/drawing/2014/main" xmlns="" id="{247563C1-ABFA-4A5C-A741-ABC57BC692C3}"/>
               </a:ext>
             </a:extLst>
           </p:cNvPr>
@@ -3457,7 +3458,7 @@
           <p:cNvPr id="26" name="직선 화살표 연결선 25">
             <a:extLst>
               <a:ext uri="{FF2B5EF4-FFF2-40B4-BE49-F238E27FC236}">
-                <a16:creationId xmlns:a16="http://schemas.microsoft.com/office/drawing/2014/main" id="{FC88860E-52C4-498C-A7A7-F51F00EFB6FE}"/>
+                <a16:creationId xmlns:a16="http://schemas.microsoft.com/office/drawing/2014/main" xmlns="" id="{FC88860E-52C4-498C-A7A7-F51F00EFB6FE}"/>
               </a:ext>
             </a:extLst>
           </p:cNvPr>
@@ -4861,14 +4862,14 @@
           </a:p>
         </p:txBody>
       </p:sp>
-      <mc:AlternateContent xmlns:mc="http://schemas.openxmlformats.org/markup-compatibility/2006">
-        <mc:Choice xmlns:a14="http://schemas.microsoft.com/office/drawing/2010/main" Requires="a14">
+      <mc:AlternateContent xmlns:mc="http://schemas.openxmlformats.org/markup-compatibility/2006" xmlns:a14="http://schemas.microsoft.com/office/drawing/2010/main">
+        <mc:Choice Requires="a14">
           <p:sp>
             <p:nvSpPr>
               <p:cNvPr id="44" name="TextBox 43">
                 <a:extLst>
                   <a:ext uri="{FF2B5EF4-FFF2-40B4-BE49-F238E27FC236}">
-                    <a16:creationId xmlns:a16="http://schemas.microsoft.com/office/drawing/2014/main" id="{2389C9F1-1BC1-4696-B08C-03D181BA8EC8}"/>
+                    <a16:creationId xmlns:a16="http://schemas.microsoft.com/office/drawing/2014/main" xmlns="" id="{2389C9F1-1BC1-4696-B08C-03D181BA8EC8}"/>
                   </a:ext>
                 </a:extLst>
               </p:cNvPr>
@@ -4891,6 +4892,7 @@
               </a:bodyPr>
               <a:lstStyle/>
               <a:p>
+                <a:pPr/>
                 <a14:m>
                   <m:oMathPara xmlns:m="http://schemas.openxmlformats.org/officeDocument/2006/math">
                     <m:oMathParaPr>
@@ -4901,7 +4903,7 @@
                         <m:sSubPr>
                           <m:ctrlPr>
                             <a:rPr lang="en-US" altLang="ko-KR" b="0" i="1" smtClean="0">
-                              <a:latin typeface="Cambria Math" panose="02040503050406030204" pitchFamily="18" charset="0"/>
+                              <a:latin typeface="Cambria Math"/>
                             </a:rPr>
                           </m:ctrlPr>
                         </m:sSubPr>
@@ -4930,7 +4932,7 @@
             </p:txBody>
           </p:sp>
         </mc:Choice>
-        <mc:Fallback>
+        <mc:Fallback xmlns="">
           <p:sp>
             <p:nvSpPr>
               <p:cNvPr id="44" name="TextBox 43">
@@ -4975,14 +4977,14 @@
           </p:sp>
         </mc:Fallback>
       </mc:AlternateContent>
-      <mc:AlternateContent xmlns:mc="http://schemas.openxmlformats.org/markup-compatibility/2006">
-        <mc:Choice xmlns:a14="http://schemas.microsoft.com/office/drawing/2010/main" Requires="a14">
+      <mc:AlternateContent xmlns:mc="http://schemas.openxmlformats.org/markup-compatibility/2006" xmlns:a14="http://schemas.microsoft.com/office/drawing/2010/main">
+        <mc:Choice Requires="a14">
           <p:sp>
             <p:nvSpPr>
               <p:cNvPr id="45" name="TextBox 44">
                 <a:extLst>
                   <a:ext uri="{FF2B5EF4-FFF2-40B4-BE49-F238E27FC236}">
-                    <a16:creationId xmlns:a16="http://schemas.microsoft.com/office/drawing/2014/main" id="{891F25FD-976C-4420-A449-57E1FD49D835}"/>
+                    <a16:creationId xmlns:a16="http://schemas.microsoft.com/office/drawing/2014/main" xmlns="" id="{891F25FD-976C-4420-A449-57E1FD49D835}"/>
                   </a:ext>
                 </a:extLst>
               </p:cNvPr>
@@ -5005,6 +5007,7 @@
               </a:bodyPr>
               <a:lstStyle/>
               <a:p>
+                <a:pPr/>
                 <a14:m>
                   <m:oMathPara xmlns:m="http://schemas.openxmlformats.org/officeDocument/2006/math">
                     <m:oMathParaPr>
@@ -5015,7 +5018,7 @@
                         <m:sSubPr>
                           <m:ctrlPr>
                             <a:rPr lang="en-US" altLang="ko-KR" b="0" i="1" smtClean="0">
-                              <a:latin typeface="Cambria Math" panose="02040503050406030204" pitchFamily="18" charset="0"/>
+                              <a:latin typeface="Cambria Math"/>
                             </a:rPr>
                           </m:ctrlPr>
                         </m:sSubPr>
@@ -5044,7 +5047,7 @@
             </p:txBody>
           </p:sp>
         </mc:Choice>
-        <mc:Fallback>
+        <mc:Fallback xmlns="">
           <p:sp>
             <p:nvSpPr>
               <p:cNvPr id="45" name="TextBox 44">
@@ -5089,14 +5092,14 @@
           </p:sp>
         </mc:Fallback>
       </mc:AlternateContent>
-      <mc:AlternateContent xmlns:mc="http://schemas.openxmlformats.org/markup-compatibility/2006">
-        <mc:Choice xmlns:a14="http://schemas.microsoft.com/office/drawing/2010/main" Requires="a14">
+      <mc:AlternateContent xmlns:mc="http://schemas.openxmlformats.org/markup-compatibility/2006" xmlns:a14="http://schemas.microsoft.com/office/drawing/2010/main">
+        <mc:Choice Requires="a14">
           <p:sp>
             <p:nvSpPr>
               <p:cNvPr id="46" name="TextBox 45">
                 <a:extLst>
                   <a:ext uri="{FF2B5EF4-FFF2-40B4-BE49-F238E27FC236}">
-                    <a16:creationId xmlns:a16="http://schemas.microsoft.com/office/drawing/2014/main" id="{C9CE65DF-C084-46E8-8760-97DD4D78500E}"/>
+                    <a16:creationId xmlns:a16="http://schemas.microsoft.com/office/drawing/2014/main" xmlns="" id="{C9CE65DF-C084-46E8-8760-97DD4D78500E}"/>
                   </a:ext>
                 </a:extLst>
               </p:cNvPr>
@@ -5119,6 +5122,7 @@
               </a:bodyPr>
               <a:lstStyle/>
               <a:p>
+                <a:pPr/>
                 <a14:m>
                   <m:oMathPara xmlns:m="http://schemas.openxmlformats.org/officeDocument/2006/math">
                     <m:oMathParaPr>
@@ -5129,7 +5133,7 @@
                         <m:sSubPr>
                           <m:ctrlPr>
                             <a:rPr lang="en-US" altLang="ko-KR" b="0" i="1" smtClean="0">
-                              <a:latin typeface="Cambria Math" panose="02040503050406030204" pitchFamily="18" charset="0"/>
+                              <a:latin typeface="Cambria Math"/>
                             </a:rPr>
                           </m:ctrlPr>
                         </m:sSubPr>
@@ -5158,7 +5162,7 @@
             </p:txBody>
           </p:sp>
         </mc:Choice>
-        <mc:Fallback>
+        <mc:Fallback xmlns="">
           <p:sp>
             <p:nvSpPr>
               <p:cNvPr id="46" name="TextBox 45">
@@ -5203,14 +5207,14 @@
           </p:sp>
         </mc:Fallback>
       </mc:AlternateContent>
-      <mc:AlternateContent xmlns:mc="http://schemas.openxmlformats.org/markup-compatibility/2006">
-        <mc:Choice xmlns:a14="http://schemas.microsoft.com/office/drawing/2010/main" Requires="a14">
+      <mc:AlternateContent xmlns:mc="http://schemas.openxmlformats.org/markup-compatibility/2006" xmlns:a14="http://schemas.microsoft.com/office/drawing/2010/main">
+        <mc:Choice Requires="a14">
           <p:sp>
             <p:nvSpPr>
               <p:cNvPr id="47" name="TextBox 46">
                 <a:extLst>
                   <a:ext uri="{FF2B5EF4-FFF2-40B4-BE49-F238E27FC236}">
-                    <a16:creationId xmlns:a16="http://schemas.microsoft.com/office/drawing/2014/main" id="{55D353FC-771E-444A-BF9F-9D5973D430B2}"/>
+                    <a16:creationId xmlns:a16="http://schemas.microsoft.com/office/drawing/2014/main" xmlns="" id="{55D353FC-771E-444A-BF9F-9D5973D430B2}"/>
                   </a:ext>
                 </a:extLst>
               </p:cNvPr>
@@ -5233,6 +5237,7 @@
               </a:bodyPr>
               <a:lstStyle/>
               <a:p>
+                <a:pPr/>
                 <a14:m>
                   <m:oMathPara xmlns:m="http://schemas.openxmlformats.org/officeDocument/2006/math">
                     <m:oMathParaPr>
@@ -5243,7 +5248,7 @@
                         <m:sSubPr>
                           <m:ctrlPr>
                             <a:rPr lang="en-US" altLang="ko-KR" b="0" i="1" smtClean="0">
-                              <a:latin typeface="Cambria Math" panose="02040503050406030204" pitchFamily="18" charset="0"/>
+                              <a:latin typeface="Cambria Math"/>
                             </a:rPr>
                           </m:ctrlPr>
                         </m:sSubPr>
@@ -5272,7 +5277,7 @@
             </p:txBody>
           </p:sp>
         </mc:Choice>
-        <mc:Fallback>
+        <mc:Fallback xmlns="">
           <p:sp>
             <p:nvSpPr>
               <p:cNvPr id="47" name="TextBox 46">
@@ -5317,14 +5322,14 @@
           </p:sp>
         </mc:Fallback>
       </mc:AlternateContent>
-      <mc:AlternateContent xmlns:mc="http://schemas.openxmlformats.org/markup-compatibility/2006">
-        <mc:Choice xmlns:a14="http://schemas.microsoft.com/office/drawing/2010/main" Requires="a14">
+      <mc:AlternateContent xmlns:mc="http://schemas.openxmlformats.org/markup-compatibility/2006" xmlns:a14="http://schemas.microsoft.com/office/drawing/2010/main">
+        <mc:Choice Requires="a14">
           <p:sp>
             <p:nvSpPr>
               <p:cNvPr id="48" name="TextBox 47">
                 <a:extLst>
                   <a:ext uri="{FF2B5EF4-FFF2-40B4-BE49-F238E27FC236}">
-                    <a16:creationId xmlns:a16="http://schemas.microsoft.com/office/drawing/2014/main" id="{54DE8BB8-8293-4E88-846C-D1DF82E5CEFE}"/>
+                    <a16:creationId xmlns:a16="http://schemas.microsoft.com/office/drawing/2014/main" xmlns="" id="{54DE8BB8-8293-4E88-846C-D1DF82E5CEFE}"/>
                   </a:ext>
                 </a:extLst>
               </p:cNvPr>
@@ -5347,6 +5352,7 @@
               </a:bodyPr>
               <a:lstStyle/>
               <a:p>
+                <a:pPr/>
                 <a14:m>
                   <m:oMathPara xmlns:m="http://schemas.openxmlformats.org/officeDocument/2006/math">
                     <m:oMathParaPr>
@@ -5357,7 +5363,7 @@
                         <m:sSubPr>
                           <m:ctrlPr>
                             <a:rPr lang="en-US" altLang="ko-KR" b="0" i="1" smtClean="0">
-                              <a:latin typeface="Cambria Math" panose="02040503050406030204" pitchFamily="18" charset="0"/>
+                              <a:latin typeface="Cambria Math"/>
                             </a:rPr>
                           </m:ctrlPr>
                         </m:sSubPr>
@@ -5386,7 +5392,7 @@
             </p:txBody>
           </p:sp>
         </mc:Choice>
-        <mc:Fallback>
+        <mc:Fallback xmlns="">
           <p:sp>
             <p:nvSpPr>
               <p:cNvPr id="48" name="TextBox 47">
@@ -5431,14 +5437,14 @@
           </p:sp>
         </mc:Fallback>
       </mc:AlternateContent>
-      <mc:AlternateContent xmlns:mc="http://schemas.openxmlformats.org/markup-compatibility/2006">
-        <mc:Choice xmlns:a14="http://schemas.microsoft.com/office/drawing/2010/main" Requires="a14">
+      <mc:AlternateContent xmlns:mc="http://schemas.openxmlformats.org/markup-compatibility/2006" xmlns:a14="http://schemas.microsoft.com/office/drawing/2010/main">
+        <mc:Choice Requires="a14">
           <p:sp>
             <p:nvSpPr>
               <p:cNvPr id="49" name="TextBox 48">
                 <a:extLst>
                   <a:ext uri="{FF2B5EF4-FFF2-40B4-BE49-F238E27FC236}">
-                    <a16:creationId xmlns:a16="http://schemas.microsoft.com/office/drawing/2014/main" id="{39E07179-F872-4762-B61F-49A0E909116D}"/>
+                    <a16:creationId xmlns:a16="http://schemas.microsoft.com/office/drawing/2014/main" xmlns="" id="{39E07179-F872-4762-B61F-49A0E909116D}"/>
                   </a:ext>
                 </a:extLst>
               </p:cNvPr>
@@ -5461,6 +5467,7 @@
               </a:bodyPr>
               <a:lstStyle/>
               <a:p>
+                <a:pPr/>
                 <a14:m>
                   <m:oMathPara xmlns:m="http://schemas.openxmlformats.org/officeDocument/2006/math">
                     <m:oMathParaPr>
@@ -5471,7 +5478,7 @@
                         <m:sSubPr>
                           <m:ctrlPr>
                             <a:rPr lang="en-US" altLang="ko-KR" b="0" i="1" smtClean="0">
-                              <a:latin typeface="Cambria Math" panose="02040503050406030204" pitchFamily="18" charset="0"/>
+                              <a:latin typeface="Cambria Math"/>
                             </a:rPr>
                           </m:ctrlPr>
                         </m:sSubPr>
@@ -5500,7 +5507,7 @@
             </p:txBody>
           </p:sp>
         </mc:Choice>
-        <mc:Fallback>
+        <mc:Fallback xmlns="">
           <p:sp>
             <p:nvSpPr>
               <p:cNvPr id="49" name="TextBox 48">
@@ -5545,14 +5552,14 @@
           </p:sp>
         </mc:Fallback>
       </mc:AlternateContent>
-      <mc:AlternateContent xmlns:mc="http://schemas.openxmlformats.org/markup-compatibility/2006">
-        <mc:Choice xmlns:a14="http://schemas.microsoft.com/office/drawing/2010/main" Requires="a14">
+      <mc:AlternateContent xmlns:mc="http://schemas.openxmlformats.org/markup-compatibility/2006" xmlns:a14="http://schemas.microsoft.com/office/drawing/2010/main">
+        <mc:Choice Requires="a14">
           <p:sp>
             <p:nvSpPr>
               <p:cNvPr id="50" name="TextBox 49">
                 <a:extLst>
                   <a:ext uri="{FF2B5EF4-FFF2-40B4-BE49-F238E27FC236}">
-                    <a16:creationId xmlns:a16="http://schemas.microsoft.com/office/drawing/2014/main" id="{B55BD9F1-8070-4EE7-A0CA-B553FCD2EC09}"/>
+                    <a16:creationId xmlns:a16="http://schemas.microsoft.com/office/drawing/2014/main" xmlns="" id="{B55BD9F1-8070-4EE7-A0CA-B553FCD2EC09}"/>
                   </a:ext>
                 </a:extLst>
               </p:cNvPr>
@@ -5575,6 +5582,7 @@
               </a:bodyPr>
               <a:lstStyle/>
               <a:p>
+                <a:pPr/>
                 <a14:m>
                   <m:oMathPara xmlns:m="http://schemas.openxmlformats.org/officeDocument/2006/math">
                     <m:oMathParaPr>
@@ -5585,7 +5593,7 @@
                         <m:sSubPr>
                           <m:ctrlPr>
                             <a:rPr lang="en-US" altLang="ko-KR" b="0" i="1" smtClean="0">
-                              <a:latin typeface="Cambria Math" panose="02040503050406030204" pitchFamily="18" charset="0"/>
+                              <a:latin typeface="Cambria Math"/>
                             </a:rPr>
                           </m:ctrlPr>
                         </m:sSubPr>
@@ -5614,7 +5622,7 @@
             </p:txBody>
           </p:sp>
         </mc:Choice>
-        <mc:Fallback>
+        <mc:Fallback xmlns="">
           <p:sp>
             <p:nvSpPr>
               <p:cNvPr id="50" name="TextBox 49">
@@ -5659,14 +5667,14 @@
           </p:sp>
         </mc:Fallback>
       </mc:AlternateContent>
-      <mc:AlternateContent xmlns:mc="http://schemas.openxmlformats.org/markup-compatibility/2006">
-        <mc:Choice xmlns:a14="http://schemas.microsoft.com/office/drawing/2010/main" Requires="a14">
+      <mc:AlternateContent xmlns:mc="http://schemas.openxmlformats.org/markup-compatibility/2006" xmlns:a14="http://schemas.microsoft.com/office/drawing/2010/main">
+        <mc:Choice Requires="a14">
           <p:sp>
             <p:nvSpPr>
               <p:cNvPr id="52" name="TextBox 51">
                 <a:extLst>
                   <a:ext uri="{FF2B5EF4-FFF2-40B4-BE49-F238E27FC236}">
-                    <a16:creationId xmlns:a16="http://schemas.microsoft.com/office/drawing/2014/main" id="{F014CCF7-D5C7-4E2D-8D47-99FCEEBA9300}"/>
+                    <a16:creationId xmlns:a16="http://schemas.microsoft.com/office/drawing/2014/main" xmlns="" id="{F014CCF7-D5C7-4E2D-8D47-99FCEEBA9300}"/>
                   </a:ext>
                 </a:extLst>
               </p:cNvPr>
@@ -5689,6 +5697,7 @@
               </a:bodyPr>
               <a:lstStyle/>
               <a:p>
+                <a:pPr/>
                 <a14:m>
                   <m:oMathPara xmlns:m="http://schemas.openxmlformats.org/officeDocument/2006/math">
                     <m:oMathParaPr>
@@ -5699,7 +5708,7 @@
                         <m:sSubPr>
                           <m:ctrlPr>
                             <a:rPr lang="en-US" altLang="ko-KR" b="0" i="1" smtClean="0">
-                              <a:latin typeface="Cambria Math" panose="02040503050406030204" pitchFamily="18" charset="0"/>
+                              <a:latin typeface="Cambria Math"/>
                             </a:rPr>
                           </m:ctrlPr>
                         </m:sSubPr>
@@ -5728,7 +5737,7 @@
             </p:txBody>
           </p:sp>
         </mc:Choice>
-        <mc:Fallback>
+        <mc:Fallback xmlns="">
           <p:sp>
             <p:nvSpPr>
               <p:cNvPr id="52" name="TextBox 51">
@@ -5773,14 +5782,14 @@
           </p:sp>
         </mc:Fallback>
       </mc:AlternateContent>
-      <mc:AlternateContent xmlns:mc="http://schemas.openxmlformats.org/markup-compatibility/2006">
-        <mc:Choice xmlns:a14="http://schemas.microsoft.com/office/drawing/2010/main" Requires="a14">
+      <mc:AlternateContent xmlns:mc="http://schemas.openxmlformats.org/markup-compatibility/2006" xmlns:a14="http://schemas.microsoft.com/office/drawing/2010/main">
+        <mc:Choice Requires="a14">
           <p:sp>
             <p:nvSpPr>
               <p:cNvPr id="53" name="TextBox 52">
                 <a:extLst>
                   <a:ext uri="{FF2B5EF4-FFF2-40B4-BE49-F238E27FC236}">
-                    <a16:creationId xmlns:a16="http://schemas.microsoft.com/office/drawing/2014/main" id="{2E1644E3-ADFC-40FB-B7C4-DE41E119E8DB}"/>
+                    <a16:creationId xmlns:a16="http://schemas.microsoft.com/office/drawing/2014/main" xmlns="" id="{2E1644E3-ADFC-40FB-B7C4-DE41E119E8DB}"/>
                   </a:ext>
                 </a:extLst>
               </p:cNvPr>
@@ -5803,6 +5812,7 @@
               </a:bodyPr>
               <a:lstStyle/>
               <a:p>
+                <a:pPr/>
                 <a14:m>
                   <m:oMathPara xmlns:m="http://schemas.openxmlformats.org/officeDocument/2006/math">
                     <m:oMathParaPr>
@@ -5813,7 +5823,7 @@
                         <m:sSubPr>
                           <m:ctrlPr>
                             <a:rPr lang="en-US" altLang="ko-KR" b="0" i="1" smtClean="0">
-                              <a:latin typeface="Cambria Math" panose="02040503050406030204" pitchFamily="18" charset="0"/>
+                              <a:latin typeface="Cambria Math"/>
                             </a:rPr>
                           </m:ctrlPr>
                         </m:sSubPr>
@@ -5842,7 +5852,7 @@
             </p:txBody>
           </p:sp>
         </mc:Choice>
-        <mc:Fallback>
+        <mc:Fallback xmlns="">
           <p:sp>
             <p:nvSpPr>
               <p:cNvPr id="53" name="TextBox 52">
@@ -5892,7 +5902,7 @@
           <p:cNvPr id="115" name="화살표: 아래쪽 114">
             <a:extLst>
               <a:ext uri="{FF2B5EF4-FFF2-40B4-BE49-F238E27FC236}">
-                <a16:creationId xmlns:a16="http://schemas.microsoft.com/office/drawing/2014/main" id="{D1A66A2C-C81C-4B94-AD0B-9DD894B16EE0}"/>
+                <a16:creationId xmlns:a16="http://schemas.microsoft.com/office/drawing/2014/main" xmlns="" id="{D1A66A2C-C81C-4B94-AD0B-9DD894B16EE0}"/>
               </a:ext>
             </a:extLst>
           </p:cNvPr>
@@ -5947,7 +5957,7 @@
           <p:cNvPr id="116" name="직사각형 115">
             <a:extLst>
               <a:ext uri="{FF2B5EF4-FFF2-40B4-BE49-F238E27FC236}">
-                <a16:creationId xmlns:a16="http://schemas.microsoft.com/office/drawing/2014/main" id="{ACB2CE96-0555-4DE0-8A56-2235454F55BE}"/>
+                <a16:creationId xmlns:a16="http://schemas.microsoft.com/office/drawing/2014/main" xmlns="" id="{ACB2CE96-0555-4DE0-8A56-2235454F55BE}"/>
               </a:ext>
             </a:extLst>
           </p:cNvPr>
@@ -5999,7 +6009,7 @@
           <p:cNvPr id="117" name="직사각형 116">
             <a:extLst>
               <a:ext uri="{FF2B5EF4-FFF2-40B4-BE49-F238E27FC236}">
-                <a16:creationId xmlns:a16="http://schemas.microsoft.com/office/drawing/2014/main" id="{BB03A9E3-A3B9-4E41-BDA1-27D30CDB6457}"/>
+                <a16:creationId xmlns:a16="http://schemas.microsoft.com/office/drawing/2014/main" xmlns="" id="{BB03A9E3-A3B9-4E41-BDA1-27D30CDB6457}"/>
               </a:ext>
             </a:extLst>
           </p:cNvPr>
@@ -6051,7 +6061,7 @@
           <p:cNvPr id="118" name="직사각형 117">
             <a:extLst>
               <a:ext uri="{FF2B5EF4-FFF2-40B4-BE49-F238E27FC236}">
-                <a16:creationId xmlns:a16="http://schemas.microsoft.com/office/drawing/2014/main" id="{99184727-9563-484D-A6CF-5A77FDD35173}"/>
+                <a16:creationId xmlns:a16="http://schemas.microsoft.com/office/drawing/2014/main" xmlns="" id="{99184727-9563-484D-A6CF-5A77FDD35173}"/>
               </a:ext>
             </a:extLst>
           </p:cNvPr>
@@ -6103,7 +6113,7 @@
           <p:cNvPr id="119" name="TextBox 118">
             <a:extLst>
               <a:ext uri="{FF2B5EF4-FFF2-40B4-BE49-F238E27FC236}">
-                <a16:creationId xmlns:a16="http://schemas.microsoft.com/office/drawing/2014/main" id="{CB2C09CE-8B04-4133-9304-BC579DF3759B}"/>
+                <a16:creationId xmlns:a16="http://schemas.microsoft.com/office/drawing/2014/main" xmlns="" id="{CB2C09CE-8B04-4133-9304-BC579DF3759B}"/>
               </a:ext>
             </a:extLst>
           </p:cNvPr>
@@ -6143,7 +6153,7 @@
           <p:cNvPr id="120" name="TextBox 119">
             <a:extLst>
               <a:ext uri="{FF2B5EF4-FFF2-40B4-BE49-F238E27FC236}">
-                <a16:creationId xmlns:a16="http://schemas.microsoft.com/office/drawing/2014/main" id="{832061C8-0623-48E1-873D-EFB91F385BE2}"/>
+                <a16:creationId xmlns:a16="http://schemas.microsoft.com/office/drawing/2014/main" xmlns="" id="{832061C8-0623-48E1-873D-EFB91F385BE2}"/>
               </a:ext>
             </a:extLst>
           </p:cNvPr>
@@ -6217,7 +6227,7 @@
           <p:cNvPr id="69" name="직선 화살표 연결선 68">
             <a:extLst>
               <a:ext uri="{FF2B5EF4-FFF2-40B4-BE49-F238E27FC236}">
-                <a16:creationId xmlns:a16="http://schemas.microsoft.com/office/drawing/2014/main" id="{D60EF0A6-299A-4C60-9D0C-684BB3BA6B31}"/>
+                <a16:creationId xmlns:a16="http://schemas.microsoft.com/office/drawing/2014/main" xmlns="" id="{D60EF0A6-299A-4C60-9D0C-684BB3BA6B31}"/>
               </a:ext>
             </a:extLst>
           </p:cNvPr>
@@ -6262,7 +6272,7 @@
           <p:cNvPr id="70" name="직선 화살표 연결선 69">
             <a:extLst>
               <a:ext uri="{FF2B5EF4-FFF2-40B4-BE49-F238E27FC236}">
-                <a16:creationId xmlns:a16="http://schemas.microsoft.com/office/drawing/2014/main" id="{A0FB874E-177F-45A5-B185-337C90DCBFDC}"/>
+                <a16:creationId xmlns:a16="http://schemas.microsoft.com/office/drawing/2014/main" xmlns="" id="{A0FB874E-177F-45A5-B185-337C90DCBFDC}"/>
               </a:ext>
             </a:extLst>
           </p:cNvPr>
@@ -6307,7 +6317,7 @@
           <p:cNvPr id="71" name="직선 화살표 연결선 70">
             <a:extLst>
               <a:ext uri="{FF2B5EF4-FFF2-40B4-BE49-F238E27FC236}">
-                <a16:creationId xmlns:a16="http://schemas.microsoft.com/office/drawing/2014/main" id="{A7CD0C0C-A960-438C-B1C3-772456C01D4D}"/>
+                <a16:creationId xmlns:a16="http://schemas.microsoft.com/office/drawing/2014/main" xmlns="" id="{A7CD0C0C-A960-438C-B1C3-772456C01D4D}"/>
               </a:ext>
             </a:extLst>
           </p:cNvPr>
@@ -6352,7 +6362,7 @@
           <p:cNvPr id="72" name="직선 화살표 연결선 71">
             <a:extLst>
               <a:ext uri="{FF2B5EF4-FFF2-40B4-BE49-F238E27FC236}">
-                <a16:creationId xmlns:a16="http://schemas.microsoft.com/office/drawing/2014/main" id="{35FF6FF2-63A4-4BDF-A69E-7F8060912E3E}"/>
+                <a16:creationId xmlns:a16="http://schemas.microsoft.com/office/drawing/2014/main" xmlns="" id="{35FF6FF2-63A4-4BDF-A69E-7F8060912E3E}"/>
               </a:ext>
             </a:extLst>
           </p:cNvPr>
@@ -6397,7 +6407,7 @@
           <p:cNvPr id="73" name="직선 화살표 연결선 72">
             <a:extLst>
               <a:ext uri="{FF2B5EF4-FFF2-40B4-BE49-F238E27FC236}">
-                <a16:creationId xmlns:a16="http://schemas.microsoft.com/office/drawing/2014/main" id="{518295E7-0A14-43BC-B287-5818BC01AA9E}"/>
+                <a16:creationId xmlns:a16="http://schemas.microsoft.com/office/drawing/2014/main" xmlns="" id="{518295E7-0A14-43BC-B287-5818BC01AA9E}"/>
               </a:ext>
             </a:extLst>
           </p:cNvPr>
@@ -6442,7 +6452,7 @@
           <p:cNvPr id="74" name="직선 화살표 연결선 73">
             <a:extLst>
               <a:ext uri="{FF2B5EF4-FFF2-40B4-BE49-F238E27FC236}">
-                <a16:creationId xmlns:a16="http://schemas.microsoft.com/office/drawing/2014/main" id="{D9C13C2E-1631-4249-8D4E-3EB9634473C5}"/>
+                <a16:creationId xmlns:a16="http://schemas.microsoft.com/office/drawing/2014/main" xmlns="" id="{D9C13C2E-1631-4249-8D4E-3EB9634473C5}"/>
               </a:ext>
             </a:extLst>
           </p:cNvPr>
@@ -6487,7 +6497,7 @@
           <p:cNvPr id="75" name="직선 화살표 연결선 74">
             <a:extLst>
               <a:ext uri="{FF2B5EF4-FFF2-40B4-BE49-F238E27FC236}">
-                <a16:creationId xmlns:a16="http://schemas.microsoft.com/office/drawing/2014/main" id="{6BB301A1-DA35-4465-B68A-ADAC3BEA8DF8}"/>
+                <a16:creationId xmlns:a16="http://schemas.microsoft.com/office/drawing/2014/main" xmlns="" id="{6BB301A1-DA35-4465-B68A-ADAC3BEA8DF8}"/>
               </a:ext>
             </a:extLst>
           </p:cNvPr>
@@ -6532,7 +6542,7 @@
           <p:cNvPr id="76" name="직선 화살표 연결선 75">
             <a:extLst>
               <a:ext uri="{FF2B5EF4-FFF2-40B4-BE49-F238E27FC236}">
-                <a16:creationId xmlns:a16="http://schemas.microsoft.com/office/drawing/2014/main" id="{5FD0C157-B9D5-4368-8CBA-114FA1854DA0}"/>
+                <a16:creationId xmlns:a16="http://schemas.microsoft.com/office/drawing/2014/main" xmlns="" id="{5FD0C157-B9D5-4368-8CBA-114FA1854DA0}"/>
               </a:ext>
             </a:extLst>
           </p:cNvPr>
@@ -6577,7 +6587,7 @@
           <p:cNvPr id="77" name="직선 화살표 연결선 76">
             <a:extLst>
               <a:ext uri="{FF2B5EF4-FFF2-40B4-BE49-F238E27FC236}">
-                <a16:creationId xmlns:a16="http://schemas.microsoft.com/office/drawing/2014/main" id="{C4684DDE-ABC6-4F6F-86F0-757337D200AC}"/>
+                <a16:creationId xmlns:a16="http://schemas.microsoft.com/office/drawing/2014/main" xmlns="" id="{C4684DDE-ABC6-4F6F-86F0-757337D200AC}"/>
               </a:ext>
             </a:extLst>
           </p:cNvPr>
@@ -6622,7 +6632,7 @@
           <p:cNvPr id="112" name="직사각형 111">
             <a:extLst>
               <a:ext uri="{FF2B5EF4-FFF2-40B4-BE49-F238E27FC236}">
-                <a16:creationId xmlns:a16="http://schemas.microsoft.com/office/drawing/2014/main" id="{12701C1F-D96C-4F2C-97C4-517EDCCB9B37}"/>
+                <a16:creationId xmlns:a16="http://schemas.microsoft.com/office/drawing/2014/main" xmlns="" id="{12701C1F-D96C-4F2C-97C4-517EDCCB9B37}"/>
               </a:ext>
             </a:extLst>
           </p:cNvPr>
@@ -6676,7 +6686,7 @@
           <p:cNvPr id="113" name="직사각형 112">
             <a:extLst>
               <a:ext uri="{FF2B5EF4-FFF2-40B4-BE49-F238E27FC236}">
-                <a16:creationId xmlns:a16="http://schemas.microsoft.com/office/drawing/2014/main" id="{21E9C6EB-6A1B-4759-A90C-062265634EB8}"/>
+                <a16:creationId xmlns:a16="http://schemas.microsoft.com/office/drawing/2014/main" xmlns="" id="{21E9C6EB-6A1B-4759-A90C-062265634EB8}"/>
               </a:ext>
             </a:extLst>
           </p:cNvPr>
@@ -6730,7 +6740,7 @@
           <p:cNvPr id="114" name="직사각형 113">
             <a:extLst>
               <a:ext uri="{FF2B5EF4-FFF2-40B4-BE49-F238E27FC236}">
-                <a16:creationId xmlns:a16="http://schemas.microsoft.com/office/drawing/2014/main" id="{DDD5DA96-E26A-4770-B7EC-5216C8FDAD9A}"/>
+                <a16:creationId xmlns:a16="http://schemas.microsoft.com/office/drawing/2014/main" xmlns="" id="{DDD5DA96-E26A-4770-B7EC-5216C8FDAD9A}"/>
               </a:ext>
             </a:extLst>
           </p:cNvPr>
@@ -6784,7 +6794,7 @@
           <p:cNvPr id="115" name="자유형 24">
             <a:extLst>
               <a:ext uri="{FF2B5EF4-FFF2-40B4-BE49-F238E27FC236}">
-                <a16:creationId xmlns:a16="http://schemas.microsoft.com/office/drawing/2014/main" id="{2D2B3937-F06E-4849-88AC-518852C872A8}"/>
+                <a16:creationId xmlns:a16="http://schemas.microsoft.com/office/drawing/2014/main" xmlns="" id="{2D2B3937-F06E-4849-88AC-518852C872A8}"/>
               </a:ext>
             </a:extLst>
           </p:cNvPr>
@@ -6883,7 +6893,7 @@
           <p:cNvPr id="116" name="자유형 32">
             <a:extLst>
               <a:ext uri="{FF2B5EF4-FFF2-40B4-BE49-F238E27FC236}">
-                <a16:creationId xmlns:a16="http://schemas.microsoft.com/office/drawing/2014/main" id="{C717001A-23E7-41A8-836C-147C390BBAED}"/>
+                <a16:creationId xmlns:a16="http://schemas.microsoft.com/office/drawing/2014/main" xmlns="" id="{C717001A-23E7-41A8-836C-147C390BBAED}"/>
               </a:ext>
             </a:extLst>
           </p:cNvPr>
@@ -7036,7 +7046,7 @@
           <p:cNvPr id="117" name="자유형 35">
             <a:extLst>
               <a:ext uri="{FF2B5EF4-FFF2-40B4-BE49-F238E27FC236}">
-                <a16:creationId xmlns:a16="http://schemas.microsoft.com/office/drawing/2014/main" id="{FE1136E3-1800-4243-971A-76BC81BFC7C2}"/>
+                <a16:creationId xmlns:a16="http://schemas.microsoft.com/office/drawing/2014/main" xmlns="" id="{FE1136E3-1800-4243-971A-76BC81BFC7C2}"/>
               </a:ext>
             </a:extLst>
           </p:cNvPr>
@@ -7138,14 +7148,14 @@
           </a:p>
         </p:txBody>
       </p:sp>
-      <mc:AlternateContent xmlns:mc="http://schemas.openxmlformats.org/markup-compatibility/2006">
-        <mc:Choice xmlns:a14="http://schemas.microsoft.com/office/drawing/2010/main" Requires="a14">
+      <mc:AlternateContent xmlns:mc="http://schemas.openxmlformats.org/markup-compatibility/2006" xmlns:a14="http://schemas.microsoft.com/office/drawing/2010/main">
+        <mc:Choice Requires="a14">
           <p:sp>
             <p:nvSpPr>
               <p:cNvPr id="118" name="TextBox 117">
                 <a:extLst>
                   <a:ext uri="{FF2B5EF4-FFF2-40B4-BE49-F238E27FC236}">
-                    <a16:creationId xmlns:a16="http://schemas.microsoft.com/office/drawing/2014/main" id="{BFDE2CE3-FD0D-4E7C-ACB1-B57EC333B566}"/>
+                    <a16:creationId xmlns:a16="http://schemas.microsoft.com/office/drawing/2014/main" xmlns="" id="{BFDE2CE3-FD0D-4E7C-ACB1-B57EC333B566}"/>
                   </a:ext>
                 </a:extLst>
               </p:cNvPr>
@@ -7168,6 +7178,7 @@
               </a:bodyPr>
               <a:lstStyle/>
               <a:p>
+                <a:pPr/>
                 <a14:m>
                   <m:oMathPara xmlns:m="http://schemas.openxmlformats.org/officeDocument/2006/math">
                     <m:oMathParaPr>
@@ -7178,7 +7189,7 @@
                         <m:sSubPr>
                           <m:ctrlPr>
                             <a:rPr lang="en-US" altLang="ko-KR" b="0" i="1" smtClean="0">
-                              <a:latin typeface="Cambria Math" panose="02040503050406030204" pitchFamily="18" charset="0"/>
+                              <a:latin typeface="Cambria Math"/>
                             </a:rPr>
                           </m:ctrlPr>
                         </m:sSubPr>
@@ -7207,7 +7218,7 @@
             </p:txBody>
           </p:sp>
         </mc:Choice>
-        <mc:Fallback>
+        <mc:Fallback xmlns="">
           <p:sp>
             <p:nvSpPr>
               <p:cNvPr id="118" name="TextBox 117">
@@ -7252,14 +7263,14 @@
           </p:sp>
         </mc:Fallback>
       </mc:AlternateContent>
-      <mc:AlternateContent xmlns:mc="http://schemas.openxmlformats.org/markup-compatibility/2006">
-        <mc:Choice xmlns:a14="http://schemas.microsoft.com/office/drawing/2010/main" Requires="a14">
+      <mc:AlternateContent xmlns:mc="http://schemas.openxmlformats.org/markup-compatibility/2006" xmlns:a14="http://schemas.microsoft.com/office/drawing/2010/main">
+        <mc:Choice Requires="a14">
           <p:sp>
             <p:nvSpPr>
               <p:cNvPr id="119" name="TextBox 118">
                 <a:extLst>
                   <a:ext uri="{FF2B5EF4-FFF2-40B4-BE49-F238E27FC236}">
-                    <a16:creationId xmlns:a16="http://schemas.microsoft.com/office/drawing/2014/main" id="{EF13B6DE-3366-46B0-BB5B-49DF2D4B8356}"/>
+                    <a16:creationId xmlns:a16="http://schemas.microsoft.com/office/drawing/2014/main" xmlns="" id="{EF13B6DE-3366-46B0-BB5B-49DF2D4B8356}"/>
                   </a:ext>
                 </a:extLst>
               </p:cNvPr>
@@ -7282,6 +7293,7 @@
               </a:bodyPr>
               <a:lstStyle/>
               <a:p>
+                <a:pPr/>
                 <a14:m>
                   <m:oMathPara xmlns:m="http://schemas.openxmlformats.org/officeDocument/2006/math">
                     <m:oMathParaPr>
@@ -7292,7 +7304,7 @@
                         <m:sSubPr>
                           <m:ctrlPr>
                             <a:rPr lang="en-US" altLang="ko-KR" b="0" i="1" smtClean="0">
-                              <a:latin typeface="Cambria Math" panose="02040503050406030204" pitchFamily="18" charset="0"/>
+                              <a:latin typeface="Cambria Math"/>
                             </a:rPr>
                           </m:ctrlPr>
                         </m:sSubPr>
@@ -7321,7 +7333,7 @@
             </p:txBody>
           </p:sp>
         </mc:Choice>
-        <mc:Fallback>
+        <mc:Fallback xmlns="">
           <p:sp>
             <p:nvSpPr>
               <p:cNvPr id="119" name="TextBox 118">
@@ -7366,14 +7378,14 @@
           </p:sp>
         </mc:Fallback>
       </mc:AlternateContent>
-      <mc:AlternateContent xmlns:mc="http://schemas.openxmlformats.org/markup-compatibility/2006">
-        <mc:Choice xmlns:a14="http://schemas.microsoft.com/office/drawing/2010/main" Requires="a14">
+      <mc:AlternateContent xmlns:mc="http://schemas.openxmlformats.org/markup-compatibility/2006" xmlns:a14="http://schemas.microsoft.com/office/drawing/2010/main">
+        <mc:Choice Requires="a14">
           <p:sp>
             <p:nvSpPr>
               <p:cNvPr id="120" name="TextBox 119">
                 <a:extLst>
                   <a:ext uri="{FF2B5EF4-FFF2-40B4-BE49-F238E27FC236}">
-                    <a16:creationId xmlns:a16="http://schemas.microsoft.com/office/drawing/2014/main" id="{0C0A99C8-9DB9-4987-BA5B-501F1F02489E}"/>
+                    <a16:creationId xmlns:a16="http://schemas.microsoft.com/office/drawing/2014/main" xmlns="" id="{0C0A99C8-9DB9-4987-BA5B-501F1F02489E}"/>
                   </a:ext>
                 </a:extLst>
               </p:cNvPr>
@@ -7396,6 +7408,7 @@
               </a:bodyPr>
               <a:lstStyle/>
               <a:p>
+                <a:pPr/>
                 <a14:m>
                   <m:oMathPara xmlns:m="http://schemas.openxmlformats.org/officeDocument/2006/math">
                     <m:oMathParaPr>
@@ -7406,7 +7419,7 @@
                         <m:sSubPr>
                           <m:ctrlPr>
                             <a:rPr lang="en-US" altLang="ko-KR" b="0" i="1" smtClean="0">
-                              <a:latin typeface="Cambria Math" panose="02040503050406030204" pitchFamily="18" charset="0"/>
+                              <a:latin typeface="Cambria Math"/>
                             </a:rPr>
                           </m:ctrlPr>
                         </m:sSubPr>
@@ -7435,7 +7448,7 @@
             </p:txBody>
           </p:sp>
         </mc:Choice>
-        <mc:Fallback>
+        <mc:Fallback xmlns="">
           <p:sp>
             <p:nvSpPr>
               <p:cNvPr id="120" name="TextBox 119">
@@ -7485,7 +7498,7 @@
           <p:cNvPr id="103" name="직사각형 102">
             <a:extLst>
               <a:ext uri="{FF2B5EF4-FFF2-40B4-BE49-F238E27FC236}">
-                <a16:creationId xmlns:a16="http://schemas.microsoft.com/office/drawing/2014/main" id="{21454E77-3767-4F1F-8B2E-CB39E0DCB168}"/>
+                <a16:creationId xmlns:a16="http://schemas.microsoft.com/office/drawing/2014/main" xmlns="" id="{21454E77-3767-4F1F-8B2E-CB39E0DCB168}"/>
               </a:ext>
             </a:extLst>
           </p:cNvPr>
@@ -7539,7 +7552,7 @@
           <p:cNvPr id="104" name="직사각형 103">
             <a:extLst>
               <a:ext uri="{FF2B5EF4-FFF2-40B4-BE49-F238E27FC236}">
-                <a16:creationId xmlns:a16="http://schemas.microsoft.com/office/drawing/2014/main" id="{5E05ACC1-7DD5-45C6-9322-DDA90A99898B}"/>
+                <a16:creationId xmlns:a16="http://schemas.microsoft.com/office/drawing/2014/main" xmlns="" id="{5E05ACC1-7DD5-45C6-9322-DDA90A99898B}"/>
               </a:ext>
             </a:extLst>
           </p:cNvPr>
@@ -7593,7 +7606,7 @@
           <p:cNvPr id="105" name="직사각형 104">
             <a:extLst>
               <a:ext uri="{FF2B5EF4-FFF2-40B4-BE49-F238E27FC236}">
-                <a16:creationId xmlns:a16="http://schemas.microsoft.com/office/drawing/2014/main" id="{83063152-E821-40E9-A5AD-2179B98CF75C}"/>
+                <a16:creationId xmlns:a16="http://schemas.microsoft.com/office/drawing/2014/main" xmlns="" id="{83063152-E821-40E9-A5AD-2179B98CF75C}"/>
               </a:ext>
             </a:extLst>
           </p:cNvPr>
@@ -7647,7 +7660,7 @@
           <p:cNvPr id="106" name="자유형 36">
             <a:extLst>
               <a:ext uri="{FF2B5EF4-FFF2-40B4-BE49-F238E27FC236}">
-                <a16:creationId xmlns:a16="http://schemas.microsoft.com/office/drawing/2014/main" id="{D66FFE7D-EDFA-41EA-A6FE-4B8AC6EDDE24}"/>
+                <a16:creationId xmlns:a16="http://schemas.microsoft.com/office/drawing/2014/main" xmlns="" id="{D66FFE7D-EDFA-41EA-A6FE-4B8AC6EDDE24}"/>
               </a:ext>
             </a:extLst>
           </p:cNvPr>
@@ -7898,7 +7911,7 @@
           <p:cNvPr id="107" name="자유형 41">
             <a:extLst>
               <a:ext uri="{FF2B5EF4-FFF2-40B4-BE49-F238E27FC236}">
-                <a16:creationId xmlns:a16="http://schemas.microsoft.com/office/drawing/2014/main" id="{F7B9892E-82A7-490A-ACAC-4AFC976E8162}"/>
+                <a16:creationId xmlns:a16="http://schemas.microsoft.com/office/drawing/2014/main" xmlns="" id="{F7B9892E-82A7-490A-ACAC-4AFC976E8162}"/>
               </a:ext>
             </a:extLst>
           </p:cNvPr>
@@ -8149,7 +8162,7 @@
           <p:cNvPr id="108" name="자유형 42">
             <a:extLst>
               <a:ext uri="{FF2B5EF4-FFF2-40B4-BE49-F238E27FC236}">
-                <a16:creationId xmlns:a16="http://schemas.microsoft.com/office/drawing/2014/main" id="{A9983B90-A8E8-4908-A0FB-7610461F8E4F}"/>
+                <a16:creationId xmlns:a16="http://schemas.microsoft.com/office/drawing/2014/main" xmlns="" id="{A9983B90-A8E8-4908-A0FB-7610461F8E4F}"/>
               </a:ext>
             </a:extLst>
           </p:cNvPr>
@@ -8395,14 +8408,14 @@
           </a:p>
         </p:txBody>
       </p:sp>
-      <mc:AlternateContent xmlns:mc="http://schemas.openxmlformats.org/markup-compatibility/2006">
-        <mc:Choice xmlns:a14="http://schemas.microsoft.com/office/drawing/2010/main" Requires="a14">
+      <mc:AlternateContent xmlns:mc="http://schemas.openxmlformats.org/markup-compatibility/2006" xmlns:a14="http://schemas.microsoft.com/office/drawing/2010/main">
+        <mc:Choice Requires="a14">
           <p:sp>
             <p:nvSpPr>
               <p:cNvPr id="109" name="TextBox 108">
                 <a:extLst>
                   <a:ext uri="{FF2B5EF4-FFF2-40B4-BE49-F238E27FC236}">
-                    <a16:creationId xmlns:a16="http://schemas.microsoft.com/office/drawing/2014/main" id="{5FD83DCC-9BD7-4127-8A9C-D815F61C5C06}"/>
+                    <a16:creationId xmlns:a16="http://schemas.microsoft.com/office/drawing/2014/main" xmlns="" id="{5FD83DCC-9BD7-4127-8A9C-D815F61C5C06}"/>
                   </a:ext>
                 </a:extLst>
               </p:cNvPr>
@@ -8425,6 +8438,7 @@
               </a:bodyPr>
               <a:lstStyle/>
               <a:p>
+                <a:pPr/>
                 <a14:m>
                   <m:oMathPara xmlns:m="http://schemas.openxmlformats.org/officeDocument/2006/math">
                     <m:oMathParaPr>
@@ -8435,7 +8449,7 @@
                         <m:sSubPr>
                           <m:ctrlPr>
                             <a:rPr lang="en-US" altLang="ko-KR" b="0" i="1" smtClean="0">
-                              <a:latin typeface="Cambria Math" panose="02040503050406030204" pitchFamily="18" charset="0"/>
+                              <a:latin typeface="Cambria Math"/>
                             </a:rPr>
                           </m:ctrlPr>
                         </m:sSubPr>
@@ -8464,7 +8478,7 @@
             </p:txBody>
           </p:sp>
         </mc:Choice>
-        <mc:Fallback>
+        <mc:Fallback xmlns="">
           <p:sp>
             <p:nvSpPr>
               <p:cNvPr id="109" name="TextBox 108">
@@ -8509,14 +8523,14 @@
           </p:sp>
         </mc:Fallback>
       </mc:AlternateContent>
-      <mc:AlternateContent xmlns:mc="http://schemas.openxmlformats.org/markup-compatibility/2006">
-        <mc:Choice xmlns:a14="http://schemas.microsoft.com/office/drawing/2010/main" Requires="a14">
+      <mc:AlternateContent xmlns:mc="http://schemas.openxmlformats.org/markup-compatibility/2006" xmlns:a14="http://schemas.microsoft.com/office/drawing/2010/main">
+        <mc:Choice Requires="a14">
           <p:sp>
             <p:nvSpPr>
               <p:cNvPr id="110" name="TextBox 109">
                 <a:extLst>
                   <a:ext uri="{FF2B5EF4-FFF2-40B4-BE49-F238E27FC236}">
-                    <a16:creationId xmlns:a16="http://schemas.microsoft.com/office/drawing/2014/main" id="{0FF183B6-4A5C-4CE7-9B69-F8BBA64B9212}"/>
+                    <a16:creationId xmlns:a16="http://schemas.microsoft.com/office/drawing/2014/main" xmlns="" id="{0FF183B6-4A5C-4CE7-9B69-F8BBA64B9212}"/>
                   </a:ext>
                 </a:extLst>
               </p:cNvPr>
@@ -8539,6 +8553,7 @@
               </a:bodyPr>
               <a:lstStyle/>
               <a:p>
+                <a:pPr/>
                 <a14:m>
                   <m:oMathPara xmlns:m="http://schemas.openxmlformats.org/officeDocument/2006/math">
                     <m:oMathParaPr>
@@ -8549,7 +8564,7 @@
                         <m:sSubPr>
                           <m:ctrlPr>
                             <a:rPr lang="en-US" altLang="ko-KR" b="0" i="1" smtClean="0">
-                              <a:latin typeface="Cambria Math" panose="02040503050406030204" pitchFamily="18" charset="0"/>
+                              <a:latin typeface="Cambria Math"/>
                             </a:rPr>
                           </m:ctrlPr>
                         </m:sSubPr>
@@ -8578,7 +8593,7 @@
             </p:txBody>
           </p:sp>
         </mc:Choice>
-        <mc:Fallback>
+        <mc:Fallback xmlns="">
           <p:sp>
             <p:nvSpPr>
               <p:cNvPr id="110" name="TextBox 109">
@@ -8623,14 +8638,14 @@
           </p:sp>
         </mc:Fallback>
       </mc:AlternateContent>
-      <mc:AlternateContent xmlns:mc="http://schemas.openxmlformats.org/markup-compatibility/2006">
-        <mc:Choice xmlns:a14="http://schemas.microsoft.com/office/drawing/2010/main" Requires="a14">
+      <mc:AlternateContent xmlns:mc="http://schemas.openxmlformats.org/markup-compatibility/2006" xmlns:a14="http://schemas.microsoft.com/office/drawing/2010/main">
+        <mc:Choice Requires="a14">
           <p:sp>
             <p:nvSpPr>
               <p:cNvPr id="111" name="TextBox 110">
                 <a:extLst>
                   <a:ext uri="{FF2B5EF4-FFF2-40B4-BE49-F238E27FC236}">
-                    <a16:creationId xmlns:a16="http://schemas.microsoft.com/office/drawing/2014/main" id="{D18171D9-7100-4FE6-9D0F-A77B997A5F89}"/>
+                    <a16:creationId xmlns:a16="http://schemas.microsoft.com/office/drawing/2014/main" xmlns="" id="{D18171D9-7100-4FE6-9D0F-A77B997A5F89}"/>
                   </a:ext>
                 </a:extLst>
               </p:cNvPr>
@@ -8653,6 +8668,7 @@
               </a:bodyPr>
               <a:lstStyle/>
               <a:p>
+                <a:pPr/>
                 <a14:m>
                   <m:oMathPara xmlns:m="http://schemas.openxmlformats.org/officeDocument/2006/math">
                     <m:oMathParaPr>
@@ -8663,7 +8679,7 @@
                         <m:sSubPr>
                           <m:ctrlPr>
                             <a:rPr lang="en-US" altLang="ko-KR" b="0" i="1" smtClean="0">
-                              <a:latin typeface="Cambria Math" panose="02040503050406030204" pitchFamily="18" charset="0"/>
+                              <a:latin typeface="Cambria Math"/>
                             </a:rPr>
                           </m:ctrlPr>
                         </m:sSubPr>
@@ -8692,7 +8708,7 @@
             </p:txBody>
           </p:sp>
         </mc:Choice>
-        <mc:Fallback>
+        <mc:Fallback xmlns="">
           <p:sp>
             <p:nvSpPr>
               <p:cNvPr id="111" name="TextBox 110">
@@ -8742,7 +8758,7 @@
           <p:cNvPr id="94" name="직사각형 93">
             <a:extLst>
               <a:ext uri="{FF2B5EF4-FFF2-40B4-BE49-F238E27FC236}">
-                <a16:creationId xmlns:a16="http://schemas.microsoft.com/office/drawing/2014/main" id="{4677E49E-8561-47AB-B8B5-D65A6487037A}"/>
+                <a16:creationId xmlns:a16="http://schemas.microsoft.com/office/drawing/2014/main" xmlns="" id="{4677E49E-8561-47AB-B8B5-D65A6487037A}"/>
               </a:ext>
             </a:extLst>
           </p:cNvPr>
@@ -8796,7 +8812,7 @@
           <p:cNvPr id="95" name="직사각형 94">
             <a:extLst>
               <a:ext uri="{FF2B5EF4-FFF2-40B4-BE49-F238E27FC236}">
-                <a16:creationId xmlns:a16="http://schemas.microsoft.com/office/drawing/2014/main" id="{ED8480E0-A6A3-4BFF-A42D-F43632A3A4E7}"/>
+                <a16:creationId xmlns:a16="http://schemas.microsoft.com/office/drawing/2014/main" xmlns="" id="{ED8480E0-A6A3-4BFF-A42D-F43632A3A4E7}"/>
               </a:ext>
             </a:extLst>
           </p:cNvPr>
@@ -8850,7 +8866,7 @@
           <p:cNvPr id="96" name="직사각형 95">
             <a:extLst>
               <a:ext uri="{FF2B5EF4-FFF2-40B4-BE49-F238E27FC236}">
-                <a16:creationId xmlns:a16="http://schemas.microsoft.com/office/drawing/2014/main" id="{908E7EE1-988A-4EF7-B140-41AD8863AE45}"/>
+                <a16:creationId xmlns:a16="http://schemas.microsoft.com/office/drawing/2014/main" xmlns="" id="{908E7EE1-988A-4EF7-B140-41AD8863AE45}"/>
               </a:ext>
             </a:extLst>
           </p:cNvPr>
@@ -8904,7 +8920,7 @@
           <p:cNvPr id="97" name="자유형 24">
             <a:extLst>
               <a:ext uri="{FF2B5EF4-FFF2-40B4-BE49-F238E27FC236}">
-                <a16:creationId xmlns:a16="http://schemas.microsoft.com/office/drawing/2014/main" id="{D8E961AC-9CFE-45BD-BBF2-62F258C6D6B2}"/>
+                <a16:creationId xmlns:a16="http://schemas.microsoft.com/office/drawing/2014/main" xmlns="" id="{D8E961AC-9CFE-45BD-BBF2-62F258C6D6B2}"/>
               </a:ext>
             </a:extLst>
           </p:cNvPr>
@@ -9003,7 +9019,7 @@
           <p:cNvPr id="98" name="자유형 32">
             <a:extLst>
               <a:ext uri="{FF2B5EF4-FFF2-40B4-BE49-F238E27FC236}">
-                <a16:creationId xmlns:a16="http://schemas.microsoft.com/office/drawing/2014/main" id="{F16564F7-46B4-45A2-B811-C7298FBDE7E7}"/>
+                <a16:creationId xmlns:a16="http://schemas.microsoft.com/office/drawing/2014/main" xmlns="" id="{F16564F7-46B4-45A2-B811-C7298FBDE7E7}"/>
               </a:ext>
             </a:extLst>
           </p:cNvPr>
@@ -9156,7 +9172,7 @@
           <p:cNvPr id="99" name="자유형 35">
             <a:extLst>
               <a:ext uri="{FF2B5EF4-FFF2-40B4-BE49-F238E27FC236}">
-                <a16:creationId xmlns:a16="http://schemas.microsoft.com/office/drawing/2014/main" id="{3F466B5D-AA8B-4636-8AFA-9CA8296EA603}"/>
+                <a16:creationId xmlns:a16="http://schemas.microsoft.com/office/drawing/2014/main" xmlns="" id="{3F466B5D-AA8B-4636-8AFA-9CA8296EA603}"/>
               </a:ext>
             </a:extLst>
           </p:cNvPr>
@@ -9258,14 +9274,14 @@
           </a:p>
         </p:txBody>
       </p:sp>
-      <mc:AlternateContent xmlns:mc="http://schemas.openxmlformats.org/markup-compatibility/2006">
-        <mc:Choice xmlns:a14="http://schemas.microsoft.com/office/drawing/2010/main" Requires="a14">
+      <mc:AlternateContent xmlns:mc="http://schemas.openxmlformats.org/markup-compatibility/2006" xmlns:a14="http://schemas.microsoft.com/office/drawing/2010/main">
+        <mc:Choice Requires="a14">
           <p:sp>
             <p:nvSpPr>
               <p:cNvPr id="100" name="TextBox 99">
                 <a:extLst>
                   <a:ext uri="{FF2B5EF4-FFF2-40B4-BE49-F238E27FC236}">
-                    <a16:creationId xmlns:a16="http://schemas.microsoft.com/office/drawing/2014/main" id="{17CF78EC-A86D-4AB0-9F84-4D32C236CFFF}"/>
+                    <a16:creationId xmlns:a16="http://schemas.microsoft.com/office/drawing/2014/main" xmlns="" id="{17CF78EC-A86D-4AB0-9F84-4D32C236CFFF}"/>
                   </a:ext>
                 </a:extLst>
               </p:cNvPr>
@@ -9288,6 +9304,7 @@
               </a:bodyPr>
               <a:lstStyle/>
               <a:p>
+                <a:pPr/>
                 <a14:m>
                   <m:oMathPara xmlns:m="http://schemas.openxmlformats.org/officeDocument/2006/math">
                     <m:oMathParaPr>
@@ -9298,7 +9315,7 @@
                         <m:sSubPr>
                           <m:ctrlPr>
                             <a:rPr lang="en-US" altLang="ko-KR" b="0" i="1" smtClean="0">
-                              <a:latin typeface="Cambria Math" panose="02040503050406030204" pitchFamily="18" charset="0"/>
+                              <a:latin typeface="Cambria Math"/>
                             </a:rPr>
                           </m:ctrlPr>
                         </m:sSubPr>
@@ -9327,7 +9344,7 @@
             </p:txBody>
           </p:sp>
         </mc:Choice>
-        <mc:Fallback>
+        <mc:Fallback xmlns="">
           <p:sp>
             <p:nvSpPr>
               <p:cNvPr id="100" name="TextBox 99">
@@ -9372,14 +9389,14 @@
           </p:sp>
         </mc:Fallback>
       </mc:AlternateContent>
-      <mc:AlternateContent xmlns:mc="http://schemas.openxmlformats.org/markup-compatibility/2006">
-        <mc:Choice xmlns:a14="http://schemas.microsoft.com/office/drawing/2010/main" Requires="a14">
+      <mc:AlternateContent xmlns:mc="http://schemas.openxmlformats.org/markup-compatibility/2006" xmlns:a14="http://schemas.microsoft.com/office/drawing/2010/main">
+        <mc:Choice Requires="a14">
           <p:sp>
             <p:nvSpPr>
               <p:cNvPr id="101" name="TextBox 100">
                 <a:extLst>
                   <a:ext uri="{FF2B5EF4-FFF2-40B4-BE49-F238E27FC236}">
-                    <a16:creationId xmlns:a16="http://schemas.microsoft.com/office/drawing/2014/main" id="{9F2301C0-0A88-4E92-948B-0291B496F7EA}"/>
+                    <a16:creationId xmlns:a16="http://schemas.microsoft.com/office/drawing/2014/main" xmlns="" id="{9F2301C0-0A88-4E92-948B-0291B496F7EA}"/>
                   </a:ext>
                 </a:extLst>
               </p:cNvPr>
@@ -9402,6 +9419,7 @@
               </a:bodyPr>
               <a:lstStyle/>
               <a:p>
+                <a:pPr/>
                 <a14:m>
                   <m:oMathPara xmlns:m="http://schemas.openxmlformats.org/officeDocument/2006/math">
                     <m:oMathParaPr>
@@ -9412,7 +9430,7 @@
                         <m:sSubPr>
                           <m:ctrlPr>
                             <a:rPr lang="en-US" altLang="ko-KR" b="0" i="1" smtClean="0">
-                              <a:latin typeface="Cambria Math" panose="02040503050406030204" pitchFamily="18" charset="0"/>
+                              <a:latin typeface="Cambria Math"/>
                             </a:rPr>
                           </m:ctrlPr>
                         </m:sSubPr>
@@ -9441,7 +9459,7 @@
             </p:txBody>
           </p:sp>
         </mc:Choice>
-        <mc:Fallback>
+        <mc:Fallback xmlns="">
           <p:sp>
             <p:nvSpPr>
               <p:cNvPr id="101" name="TextBox 100">
@@ -9486,14 +9504,14 @@
           </p:sp>
         </mc:Fallback>
       </mc:AlternateContent>
-      <mc:AlternateContent xmlns:mc="http://schemas.openxmlformats.org/markup-compatibility/2006">
-        <mc:Choice xmlns:a14="http://schemas.microsoft.com/office/drawing/2010/main" Requires="a14">
+      <mc:AlternateContent xmlns:mc="http://schemas.openxmlformats.org/markup-compatibility/2006" xmlns:a14="http://schemas.microsoft.com/office/drawing/2010/main">
+        <mc:Choice Requires="a14">
           <p:sp>
             <p:nvSpPr>
               <p:cNvPr id="102" name="TextBox 101">
                 <a:extLst>
                   <a:ext uri="{FF2B5EF4-FFF2-40B4-BE49-F238E27FC236}">
-                    <a16:creationId xmlns:a16="http://schemas.microsoft.com/office/drawing/2014/main" id="{D026AF8C-ED5F-47DC-9A70-8CC8A24547CC}"/>
+                    <a16:creationId xmlns:a16="http://schemas.microsoft.com/office/drawing/2014/main" xmlns="" id="{D026AF8C-ED5F-47DC-9A70-8CC8A24547CC}"/>
                   </a:ext>
                 </a:extLst>
               </p:cNvPr>
@@ -9516,6 +9534,7 @@
               </a:bodyPr>
               <a:lstStyle/>
               <a:p>
+                <a:pPr/>
                 <a14:m>
                   <m:oMathPara xmlns:m="http://schemas.openxmlformats.org/officeDocument/2006/math">
                     <m:oMathParaPr>
@@ -9526,7 +9545,7 @@
                         <m:sSubPr>
                           <m:ctrlPr>
                             <a:rPr lang="en-US" altLang="ko-KR" b="0" i="1" smtClean="0">
-                              <a:latin typeface="Cambria Math" panose="02040503050406030204" pitchFamily="18" charset="0"/>
+                              <a:latin typeface="Cambria Math"/>
                             </a:rPr>
                           </m:ctrlPr>
                         </m:sSubPr>
@@ -9555,7 +9574,7 @@
             </p:txBody>
           </p:sp>
         </mc:Choice>
-        <mc:Fallback>
+        <mc:Fallback xmlns="">
           <p:sp>
             <p:nvSpPr>
               <p:cNvPr id="102" name="TextBox 101">
@@ -9605,7 +9624,7 @@
           <p:cNvPr id="85" name="직사각형 84">
             <a:extLst>
               <a:ext uri="{FF2B5EF4-FFF2-40B4-BE49-F238E27FC236}">
-                <a16:creationId xmlns:a16="http://schemas.microsoft.com/office/drawing/2014/main" id="{0340919C-3F99-4D66-A40B-A77812AD8FF2}"/>
+                <a16:creationId xmlns:a16="http://schemas.microsoft.com/office/drawing/2014/main" xmlns="" id="{0340919C-3F99-4D66-A40B-A77812AD8FF2}"/>
               </a:ext>
             </a:extLst>
           </p:cNvPr>
@@ -9659,7 +9678,7 @@
           <p:cNvPr id="86" name="직사각형 85">
             <a:extLst>
               <a:ext uri="{FF2B5EF4-FFF2-40B4-BE49-F238E27FC236}">
-                <a16:creationId xmlns:a16="http://schemas.microsoft.com/office/drawing/2014/main" id="{A9E5F8AE-FAF3-46B5-B971-5D0873F57EAC}"/>
+                <a16:creationId xmlns:a16="http://schemas.microsoft.com/office/drawing/2014/main" xmlns="" id="{A9E5F8AE-FAF3-46B5-B971-5D0873F57EAC}"/>
               </a:ext>
             </a:extLst>
           </p:cNvPr>
@@ -9713,7 +9732,7 @@
           <p:cNvPr id="87" name="직사각형 86">
             <a:extLst>
               <a:ext uri="{FF2B5EF4-FFF2-40B4-BE49-F238E27FC236}">
-                <a16:creationId xmlns:a16="http://schemas.microsoft.com/office/drawing/2014/main" id="{86CF02CE-C70D-438D-800E-94003CBDD101}"/>
+                <a16:creationId xmlns:a16="http://schemas.microsoft.com/office/drawing/2014/main" xmlns="" id="{86CF02CE-C70D-438D-800E-94003CBDD101}"/>
               </a:ext>
             </a:extLst>
           </p:cNvPr>
@@ -9767,7 +9786,7 @@
           <p:cNvPr id="88" name="자유형 36">
             <a:extLst>
               <a:ext uri="{FF2B5EF4-FFF2-40B4-BE49-F238E27FC236}">
-                <a16:creationId xmlns:a16="http://schemas.microsoft.com/office/drawing/2014/main" id="{35D0ED0E-CBFF-45AB-A077-FF0A7EF5DCA0}"/>
+                <a16:creationId xmlns:a16="http://schemas.microsoft.com/office/drawing/2014/main" xmlns="" id="{35D0ED0E-CBFF-45AB-A077-FF0A7EF5DCA0}"/>
               </a:ext>
             </a:extLst>
           </p:cNvPr>
@@ -10018,7 +10037,7 @@
           <p:cNvPr id="89" name="자유형 41">
             <a:extLst>
               <a:ext uri="{FF2B5EF4-FFF2-40B4-BE49-F238E27FC236}">
-                <a16:creationId xmlns:a16="http://schemas.microsoft.com/office/drawing/2014/main" id="{12AD3E6B-2D0A-4AAB-BD1F-DEC910E8F6DD}"/>
+                <a16:creationId xmlns:a16="http://schemas.microsoft.com/office/drawing/2014/main" xmlns="" id="{12AD3E6B-2D0A-4AAB-BD1F-DEC910E8F6DD}"/>
               </a:ext>
             </a:extLst>
           </p:cNvPr>
@@ -10269,7 +10288,7 @@
           <p:cNvPr id="90" name="자유형 42">
             <a:extLst>
               <a:ext uri="{FF2B5EF4-FFF2-40B4-BE49-F238E27FC236}">
-                <a16:creationId xmlns:a16="http://schemas.microsoft.com/office/drawing/2014/main" id="{469244DA-896C-42C4-8D61-8BCBF038A505}"/>
+                <a16:creationId xmlns:a16="http://schemas.microsoft.com/office/drawing/2014/main" xmlns="" id="{469244DA-896C-42C4-8D61-8BCBF038A505}"/>
               </a:ext>
             </a:extLst>
           </p:cNvPr>
@@ -10515,14 +10534,14 @@
           </a:p>
         </p:txBody>
       </p:sp>
-      <mc:AlternateContent xmlns:mc="http://schemas.openxmlformats.org/markup-compatibility/2006">
-        <mc:Choice xmlns:a14="http://schemas.microsoft.com/office/drawing/2010/main" Requires="a14">
+      <mc:AlternateContent xmlns:mc="http://schemas.openxmlformats.org/markup-compatibility/2006" xmlns:a14="http://schemas.microsoft.com/office/drawing/2010/main">
+        <mc:Choice Requires="a14">
           <p:sp>
             <p:nvSpPr>
               <p:cNvPr id="91" name="TextBox 90">
                 <a:extLst>
                   <a:ext uri="{FF2B5EF4-FFF2-40B4-BE49-F238E27FC236}">
-                    <a16:creationId xmlns:a16="http://schemas.microsoft.com/office/drawing/2014/main" id="{1B512E6E-2D06-4683-BD79-394484AAD5C2}"/>
+                    <a16:creationId xmlns:a16="http://schemas.microsoft.com/office/drawing/2014/main" xmlns="" id="{1B512E6E-2D06-4683-BD79-394484AAD5C2}"/>
                   </a:ext>
                 </a:extLst>
               </p:cNvPr>
@@ -10545,6 +10564,7 @@
               </a:bodyPr>
               <a:lstStyle/>
               <a:p>
+                <a:pPr/>
                 <a14:m>
                   <m:oMathPara xmlns:m="http://schemas.openxmlformats.org/officeDocument/2006/math">
                     <m:oMathParaPr>
@@ -10555,7 +10575,7 @@
                         <m:sSubPr>
                           <m:ctrlPr>
                             <a:rPr lang="en-US" altLang="ko-KR" b="0" i="1" smtClean="0">
-                              <a:latin typeface="Cambria Math" panose="02040503050406030204" pitchFamily="18" charset="0"/>
+                              <a:latin typeface="Cambria Math"/>
                             </a:rPr>
                           </m:ctrlPr>
                         </m:sSubPr>
@@ -10584,7 +10604,7 @@
             </p:txBody>
           </p:sp>
         </mc:Choice>
-        <mc:Fallback>
+        <mc:Fallback xmlns="">
           <p:sp>
             <p:nvSpPr>
               <p:cNvPr id="91" name="TextBox 90">
@@ -10629,14 +10649,14 @@
           </p:sp>
         </mc:Fallback>
       </mc:AlternateContent>
-      <mc:AlternateContent xmlns:mc="http://schemas.openxmlformats.org/markup-compatibility/2006">
-        <mc:Choice xmlns:a14="http://schemas.microsoft.com/office/drawing/2010/main" Requires="a14">
+      <mc:AlternateContent xmlns:mc="http://schemas.openxmlformats.org/markup-compatibility/2006" xmlns:a14="http://schemas.microsoft.com/office/drawing/2010/main">
+        <mc:Choice Requires="a14">
           <p:sp>
             <p:nvSpPr>
               <p:cNvPr id="92" name="TextBox 91">
                 <a:extLst>
                   <a:ext uri="{FF2B5EF4-FFF2-40B4-BE49-F238E27FC236}">
-                    <a16:creationId xmlns:a16="http://schemas.microsoft.com/office/drawing/2014/main" id="{858F9D8B-82C9-4DD9-92B7-AD64291383C7}"/>
+                    <a16:creationId xmlns:a16="http://schemas.microsoft.com/office/drawing/2014/main" xmlns="" id="{858F9D8B-82C9-4DD9-92B7-AD64291383C7}"/>
                   </a:ext>
                 </a:extLst>
               </p:cNvPr>
@@ -10659,6 +10679,7 @@
               </a:bodyPr>
               <a:lstStyle/>
               <a:p>
+                <a:pPr/>
                 <a14:m>
                   <m:oMathPara xmlns:m="http://schemas.openxmlformats.org/officeDocument/2006/math">
                     <m:oMathParaPr>
@@ -10669,7 +10690,7 @@
                         <m:sSubPr>
                           <m:ctrlPr>
                             <a:rPr lang="en-US" altLang="ko-KR" b="0" i="1" smtClean="0">
-                              <a:latin typeface="Cambria Math" panose="02040503050406030204" pitchFamily="18" charset="0"/>
+                              <a:latin typeface="Cambria Math"/>
                             </a:rPr>
                           </m:ctrlPr>
                         </m:sSubPr>
@@ -10698,7 +10719,7 @@
             </p:txBody>
           </p:sp>
         </mc:Choice>
-        <mc:Fallback>
+        <mc:Fallback xmlns="">
           <p:sp>
             <p:nvSpPr>
               <p:cNvPr id="92" name="TextBox 91">
@@ -10743,14 +10764,14 @@
           </p:sp>
         </mc:Fallback>
       </mc:AlternateContent>
-      <mc:AlternateContent xmlns:mc="http://schemas.openxmlformats.org/markup-compatibility/2006">
-        <mc:Choice xmlns:a14="http://schemas.microsoft.com/office/drawing/2010/main" Requires="a14">
+      <mc:AlternateContent xmlns:mc="http://schemas.openxmlformats.org/markup-compatibility/2006" xmlns:a14="http://schemas.microsoft.com/office/drawing/2010/main">
+        <mc:Choice Requires="a14">
           <p:sp>
             <p:nvSpPr>
               <p:cNvPr id="93" name="TextBox 92">
                 <a:extLst>
                   <a:ext uri="{FF2B5EF4-FFF2-40B4-BE49-F238E27FC236}">
-                    <a16:creationId xmlns:a16="http://schemas.microsoft.com/office/drawing/2014/main" id="{2671BE5F-A326-47D1-A9C5-EDC9C3D5135B}"/>
+                    <a16:creationId xmlns:a16="http://schemas.microsoft.com/office/drawing/2014/main" xmlns="" id="{2671BE5F-A326-47D1-A9C5-EDC9C3D5135B}"/>
                   </a:ext>
                 </a:extLst>
               </p:cNvPr>
@@ -10773,6 +10794,7 @@
               </a:bodyPr>
               <a:lstStyle/>
               <a:p>
+                <a:pPr/>
                 <a14:m>
                   <m:oMathPara xmlns:m="http://schemas.openxmlformats.org/officeDocument/2006/math">
                     <m:oMathParaPr>
@@ -10783,7 +10805,7 @@
                         <m:sSubPr>
                           <m:ctrlPr>
                             <a:rPr lang="en-US" altLang="ko-KR" b="0" i="1" smtClean="0">
-                              <a:latin typeface="Cambria Math" panose="02040503050406030204" pitchFamily="18" charset="0"/>
+                              <a:latin typeface="Cambria Math"/>
                             </a:rPr>
                           </m:ctrlPr>
                         </m:sSubPr>
@@ -10812,7 +10834,7 @@
             </p:txBody>
           </p:sp>
         </mc:Choice>
-        <mc:Fallback>
+        <mc:Fallback xmlns="">
           <p:sp>
             <p:nvSpPr>
               <p:cNvPr id="93" name="TextBox 92">
@@ -10862,7 +10884,7 @@
           <p:cNvPr id="20" name="화살표: 아래쪽 19">
             <a:extLst>
               <a:ext uri="{FF2B5EF4-FFF2-40B4-BE49-F238E27FC236}">
-                <a16:creationId xmlns:a16="http://schemas.microsoft.com/office/drawing/2014/main" id="{81C3315B-B951-4949-94B6-5B4C90B24614}"/>
+                <a16:creationId xmlns:a16="http://schemas.microsoft.com/office/drawing/2014/main" xmlns="" id="{81C3315B-B951-4949-94B6-5B4C90B24614}"/>
               </a:ext>
             </a:extLst>
           </p:cNvPr>
@@ -10917,7 +10939,7 @@
           <p:cNvPr id="22" name="직사각형 21">
             <a:extLst>
               <a:ext uri="{FF2B5EF4-FFF2-40B4-BE49-F238E27FC236}">
-                <a16:creationId xmlns:a16="http://schemas.microsoft.com/office/drawing/2014/main" id="{AFFD3E73-CBB0-441D-A7F6-1A1B16A4144B}"/>
+                <a16:creationId xmlns:a16="http://schemas.microsoft.com/office/drawing/2014/main" xmlns="" id="{AFFD3E73-CBB0-441D-A7F6-1A1B16A4144B}"/>
               </a:ext>
             </a:extLst>
           </p:cNvPr>
@@ -10969,7 +10991,7 @@
           <p:cNvPr id="121" name="직사각형 120">
             <a:extLst>
               <a:ext uri="{FF2B5EF4-FFF2-40B4-BE49-F238E27FC236}">
-                <a16:creationId xmlns:a16="http://schemas.microsoft.com/office/drawing/2014/main" id="{234C2D60-901C-4BDE-B7B7-43747819E697}"/>
+                <a16:creationId xmlns:a16="http://schemas.microsoft.com/office/drawing/2014/main" xmlns="" id="{234C2D60-901C-4BDE-B7B7-43747819E697}"/>
               </a:ext>
             </a:extLst>
           </p:cNvPr>
@@ -11021,7 +11043,7 @@
           <p:cNvPr id="122" name="직사각형 121">
             <a:extLst>
               <a:ext uri="{FF2B5EF4-FFF2-40B4-BE49-F238E27FC236}">
-                <a16:creationId xmlns:a16="http://schemas.microsoft.com/office/drawing/2014/main" id="{0930CBCC-6FD0-40B7-B977-90473E863A0E}"/>
+                <a16:creationId xmlns:a16="http://schemas.microsoft.com/office/drawing/2014/main" xmlns="" id="{0930CBCC-6FD0-40B7-B977-90473E863A0E}"/>
               </a:ext>
             </a:extLst>
           </p:cNvPr>
@@ -11073,7 +11095,7 @@
           <p:cNvPr id="123" name="TextBox 122">
             <a:extLst>
               <a:ext uri="{FF2B5EF4-FFF2-40B4-BE49-F238E27FC236}">
-                <a16:creationId xmlns:a16="http://schemas.microsoft.com/office/drawing/2014/main" id="{927733F2-08AC-4543-B36F-97A8C32AE349}"/>
+                <a16:creationId xmlns:a16="http://schemas.microsoft.com/office/drawing/2014/main" xmlns="" id="{927733F2-08AC-4543-B36F-97A8C32AE349}"/>
               </a:ext>
             </a:extLst>
           </p:cNvPr>
@@ -11113,7 +11135,7 @@
           <p:cNvPr id="124" name="TextBox 123">
             <a:extLst>
               <a:ext uri="{FF2B5EF4-FFF2-40B4-BE49-F238E27FC236}">
-                <a16:creationId xmlns:a16="http://schemas.microsoft.com/office/drawing/2014/main" id="{AE6F87EF-007C-460E-BE03-EAE968E26E8D}"/>
+                <a16:creationId xmlns:a16="http://schemas.microsoft.com/office/drawing/2014/main" xmlns="" id="{AE6F87EF-007C-460E-BE03-EAE968E26E8D}"/>
               </a:ext>
             </a:extLst>
           </p:cNvPr>
@@ -11152,14 +11174,14 @@
           </a:p>
         </p:txBody>
       </p:sp>
-      <mc:AlternateContent xmlns:mc="http://schemas.openxmlformats.org/markup-compatibility/2006">
-        <mc:Choice xmlns:a14="http://schemas.microsoft.com/office/drawing/2010/main" Requires="a14">
+      <mc:AlternateContent xmlns:mc="http://schemas.openxmlformats.org/markup-compatibility/2006" xmlns:a14="http://schemas.microsoft.com/office/drawing/2010/main">
+        <mc:Choice Requires="a14">
           <p:sp>
             <p:nvSpPr>
               <p:cNvPr id="125" name="TextBox 124">
                 <a:extLst>
                   <a:ext uri="{FF2B5EF4-FFF2-40B4-BE49-F238E27FC236}">
-                    <a16:creationId xmlns:a16="http://schemas.microsoft.com/office/drawing/2014/main" id="{95E6CAEC-7D4F-4D96-B9BB-09AC57F5F383}"/>
+                    <a16:creationId xmlns:a16="http://schemas.microsoft.com/office/drawing/2014/main" xmlns="" id="{95E6CAEC-7D4F-4D96-B9BB-09AC57F5F383}"/>
                   </a:ext>
                 </a:extLst>
               </p:cNvPr>
@@ -11182,6 +11204,7 @@
               </a:bodyPr>
               <a:lstStyle/>
               <a:p>
+                <a:pPr/>
                 <a14:m>
                   <m:oMathPara xmlns:m="http://schemas.openxmlformats.org/officeDocument/2006/math">
                     <m:oMathParaPr>
@@ -11192,7 +11215,7 @@
                         <m:sSubPr>
                           <m:ctrlPr>
                             <a:rPr lang="en-US" altLang="ko-KR" b="0" i="1" smtClean="0">
-                              <a:latin typeface="Cambria Math" panose="02040503050406030204" pitchFamily="18" charset="0"/>
+                              <a:latin typeface="Cambria Math"/>
                             </a:rPr>
                           </m:ctrlPr>
                         </m:sSubPr>
@@ -11221,7 +11244,7 @@
             </p:txBody>
           </p:sp>
         </mc:Choice>
-        <mc:Fallback>
+        <mc:Fallback xmlns="">
           <p:sp>
             <p:nvSpPr>
               <p:cNvPr id="125" name="TextBox 124">
@@ -11266,14 +11289,14 @@
           </p:sp>
         </mc:Fallback>
       </mc:AlternateContent>
-      <mc:AlternateContent xmlns:mc="http://schemas.openxmlformats.org/markup-compatibility/2006">
-        <mc:Choice xmlns:a14="http://schemas.microsoft.com/office/drawing/2010/main" Requires="a14">
+      <mc:AlternateContent xmlns:mc="http://schemas.openxmlformats.org/markup-compatibility/2006" xmlns:a14="http://schemas.microsoft.com/office/drawing/2010/main">
+        <mc:Choice Requires="a14">
           <p:sp>
             <p:nvSpPr>
               <p:cNvPr id="126" name="TextBox 125">
                 <a:extLst>
                   <a:ext uri="{FF2B5EF4-FFF2-40B4-BE49-F238E27FC236}">
-                    <a16:creationId xmlns:a16="http://schemas.microsoft.com/office/drawing/2014/main" id="{1C1D9613-EE1C-4465-AD23-4527C2FC2DA0}"/>
+                    <a16:creationId xmlns:a16="http://schemas.microsoft.com/office/drawing/2014/main" xmlns="" id="{1C1D9613-EE1C-4465-AD23-4527C2FC2DA0}"/>
                   </a:ext>
                 </a:extLst>
               </p:cNvPr>
@@ -11296,6 +11319,7 @@
               </a:bodyPr>
               <a:lstStyle/>
               <a:p>
+                <a:pPr/>
                 <a14:m>
                   <m:oMathPara xmlns:m="http://schemas.openxmlformats.org/officeDocument/2006/math">
                     <m:oMathParaPr>
@@ -11306,7 +11330,7 @@
                         <m:sSubPr>
                           <m:ctrlPr>
                             <a:rPr lang="en-US" altLang="ko-KR" b="0" i="1" smtClean="0">
-                              <a:latin typeface="Cambria Math" panose="02040503050406030204" pitchFamily="18" charset="0"/>
+                              <a:latin typeface="Cambria Math"/>
                             </a:rPr>
                           </m:ctrlPr>
                         </m:sSubPr>
@@ -11335,7 +11359,7 @@
             </p:txBody>
           </p:sp>
         </mc:Choice>
-        <mc:Fallback>
+        <mc:Fallback xmlns="">
           <p:sp>
             <p:nvSpPr>
               <p:cNvPr id="126" name="TextBox 125">
@@ -11380,14 +11404,14 @@
           </p:sp>
         </mc:Fallback>
       </mc:AlternateContent>
-      <mc:AlternateContent xmlns:mc="http://schemas.openxmlformats.org/markup-compatibility/2006">
-        <mc:Choice xmlns:a14="http://schemas.microsoft.com/office/drawing/2010/main" Requires="a14">
+      <mc:AlternateContent xmlns:mc="http://schemas.openxmlformats.org/markup-compatibility/2006" xmlns:a14="http://schemas.microsoft.com/office/drawing/2010/main">
+        <mc:Choice Requires="a14">
           <p:sp>
             <p:nvSpPr>
               <p:cNvPr id="127" name="TextBox 126">
                 <a:extLst>
                   <a:ext uri="{FF2B5EF4-FFF2-40B4-BE49-F238E27FC236}">
-                    <a16:creationId xmlns:a16="http://schemas.microsoft.com/office/drawing/2014/main" id="{BB3D3828-976C-4D61-A038-1B5FBA465028}"/>
+                    <a16:creationId xmlns:a16="http://schemas.microsoft.com/office/drawing/2014/main" xmlns="" id="{BB3D3828-976C-4D61-A038-1B5FBA465028}"/>
                   </a:ext>
                 </a:extLst>
               </p:cNvPr>
@@ -11410,6 +11434,7 @@
               </a:bodyPr>
               <a:lstStyle/>
               <a:p>
+                <a:pPr/>
                 <a14:m>
                   <m:oMathPara xmlns:m="http://schemas.openxmlformats.org/officeDocument/2006/math">
                     <m:oMathParaPr>
@@ -11420,7 +11445,7 @@
                         <m:sSubPr>
                           <m:ctrlPr>
                             <a:rPr lang="en-US" altLang="ko-KR" b="0" i="1" smtClean="0">
-                              <a:latin typeface="Cambria Math" panose="02040503050406030204" pitchFamily="18" charset="0"/>
+                              <a:latin typeface="Cambria Math"/>
                             </a:rPr>
                           </m:ctrlPr>
                         </m:sSubPr>
@@ -11449,7 +11474,7 @@
             </p:txBody>
           </p:sp>
         </mc:Choice>
-        <mc:Fallback>
+        <mc:Fallback xmlns="">
           <p:sp>
             <p:nvSpPr>
               <p:cNvPr id="127" name="TextBox 126">
@@ -11529,7 +11554,7 @@
           <p:cNvPr id="120" name="TextBox 119">
             <a:extLst>
               <a:ext uri="{FF2B5EF4-FFF2-40B4-BE49-F238E27FC236}">
-                <a16:creationId xmlns:a16="http://schemas.microsoft.com/office/drawing/2014/main" id="{832061C8-0623-48E1-873D-EFB91F385BE2}"/>
+                <a16:creationId xmlns:a16="http://schemas.microsoft.com/office/drawing/2014/main" xmlns="" id="{832061C8-0623-48E1-873D-EFB91F385BE2}"/>
               </a:ext>
             </a:extLst>
           </p:cNvPr>
@@ -11589,7 +11614,7 @@
           <p:cNvPr id="3" name="직선 화살표 연결선 2">
             <a:extLst>
               <a:ext uri="{FF2B5EF4-FFF2-40B4-BE49-F238E27FC236}">
-                <a16:creationId xmlns:a16="http://schemas.microsoft.com/office/drawing/2014/main" id="{040C2B51-BAFC-4CAA-B211-38CAACCEDB0D}"/>
+                <a16:creationId xmlns:a16="http://schemas.microsoft.com/office/drawing/2014/main" xmlns="" id="{040C2B51-BAFC-4CAA-B211-38CAACCEDB0D}"/>
               </a:ext>
             </a:extLst>
           </p:cNvPr>
@@ -11635,7 +11660,7 @@
           <p:cNvPr id="11" name="직선 화살표 연결선 10">
             <a:extLst>
               <a:ext uri="{FF2B5EF4-FFF2-40B4-BE49-F238E27FC236}">
-                <a16:creationId xmlns:a16="http://schemas.microsoft.com/office/drawing/2014/main" id="{8EF8873D-1AD7-402C-A444-34E2D013A0E0}"/>
+                <a16:creationId xmlns:a16="http://schemas.microsoft.com/office/drawing/2014/main" xmlns="" id="{8EF8873D-1AD7-402C-A444-34E2D013A0E0}"/>
               </a:ext>
             </a:extLst>
           </p:cNvPr>
@@ -11680,7 +11705,7 @@
           <p:cNvPr id="13" name="직선 화살표 연결선 12">
             <a:extLst>
               <a:ext uri="{FF2B5EF4-FFF2-40B4-BE49-F238E27FC236}">
-                <a16:creationId xmlns:a16="http://schemas.microsoft.com/office/drawing/2014/main" id="{A3542202-D6A9-4DBA-BCBB-CEBE1E4536B3}"/>
+                <a16:creationId xmlns:a16="http://schemas.microsoft.com/office/drawing/2014/main" xmlns="" id="{A3542202-D6A9-4DBA-BCBB-CEBE1E4536B3}"/>
               </a:ext>
             </a:extLst>
           </p:cNvPr>
@@ -11725,7 +11750,7 @@
           <p:cNvPr id="15" name="직선 화살표 연결선 14">
             <a:extLst>
               <a:ext uri="{FF2B5EF4-FFF2-40B4-BE49-F238E27FC236}">
-                <a16:creationId xmlns:a16="http://schemas.microsoft.com/office/drawing/2014/main" id="{A29B7648-42CB-4DEE-9996-3CDE3BD92A4A}"/>
+                <a16:creationId xmlns:a16="http://schemas.microsoft.com/office/drawing/2014/main" xmlns="" id="{A29B7648-42CB-4DEE-9996-3CDE3BD92A4A}"/>
               </a:ext>
             </a:extLst>
           </p:cNvPr>
@@ -11770,7 +11795,7 @@
           <p:cNvPr id="17" name="직선 화살표 연결선 16">
             <a:extLst>
               <a:ext uri="{FF2B5EF4-FFF2-40B4-BE49-F238E27FC236}">
-                <a16:creationId xmlns:a16="http://schemas.microsoft.com/office/drawing/2014/main" id="{DD4A1FE4-8F34-4D5D-8C2B-4EE68491132E}"/>
+                <a16:creationId xmlns:a16="http://schemas.microsoft.com/office/drawing/2014/main" xmlns="" id="{DD4A1FE4-8F34-4D5D-8C2B-4EE68491132E}"/>
               </a:ext>
             </a:extLst>
           </p:cNvPr>
@@ -11816,7 +11841,7 @@
           <p:cNvPr id="19" name="직선 화살표 연결선 18">
             <a:extLst>
               <a:ext uri="{FF2B5EF4-FFF2-40B4-BE49-F238E27FC236}">
-                <a16:creationId xmlns:a16="http://schemas.microsoft.com/office/drawing/2014/main" id="{6ACE88B7-13E2-4A22-93FF-85606FB6931D}"/>
+                <a16:creationId xmlns:a16="http://schemas.microsoft.com/office/drawing/2014/main" xmlns="" id="{6ACE88B7-13E2-4A22-93FF-85606FB6931D}"/>
               </a:ext>
             </a:extLst>
           </p:cNvPr>
@@ -11861,7 +11886,7 @@
           <p:cNvPr id="21" name="직선 화살표 연결선 20">
             <a:extLst>
               <a:ext uri="{FF2B5EF4-FFF2-40B4-BE49-F238E27FC236}">
-                <a16:creationId xmlns:a16="http://schemas.microsoft.com/office/drawing/2014/main" id="{D800A1A7-1A4E-43CB-8DD0-D43651B1F3CD}"/>
+                <a16:creationId xmlns:a16="http://schemas.microsoft.com/office/drawing/2014/main" xmlns="" id="{D800A1A7-1A4E-43CB-8DD0-D43651B1F3CD}"/>
               </a:ext>
             </a:extLst>
           </p:cNvPr>
@@ -11907,7 +11932,7 @@
           <p:cNvPr id="23" name="직선 화살표 연결선 22">
             <a:extLst>
               <a:ext uri="{FF2B5EF4-FFF2-40B4-BE49-F238E27FC236}">
-                <a16:creationId xmlns:a16="http://schemas.microsoft.com/office/drawing/2014/main" id="{247563C1-ABFA-4A5C-A741-ABC57BC692C3}"/>
+                <a16:creationId xmlns:a16="http://schemas.microsoft.com/office/drawing/2014/main" xmlns="" id="{247563C1-ABFA-4A5C-A741-ABC57BC692C3}"/>
               </a:ext>
             </a:extLst>
           </p:cNvPr>
@@ -11952,7 +11977,7 @@
           <p:cNvPr id="26" name="직선 화살표 연결선 25">
             <a:extLst>
               <a:ext uri="{FF2B5EF4-FFF2-40B4-BE49-F238E27FC236}">
-                <a16:creationId xmlns:a16="http://schemas.microsoft.com/office/drawing/2014/main" id="{FC88860E-52C4-498C-A7A7-F51F00EFB6FE}"/>
+                <a16:creationId xmlns:a16="http://schemas.microsoft.com/office/drawing/2014/main" xmlns="" id="{FC88860E-52C4-498C-A7A7-F51F00EFB6FE}"/>
               </a:ext>
             </a:extLst>
           </p:cNvPr>
@@ -13356,14 +13381,14 @@
           </a:p>
         </p:txBody>
       </p:sp>
-      <mc:AlternateContent xmlns:mc="http://schemas.openxmlformats.org/markup-compatibility/2006">
-        <mc:Choice xmlns:a14="http://schemas.microsoft.com/office/drawing/2010/main" Requires="a14">
+      <mc:AlternateContent xmlns:mc="http://schemas.openxmlformats.org/markup-compatibility/2006" xmlns:a14="http://schemas.microsoft.com/office/drawing/2010/main">
+        <mc:Choice Requires="a14">
           <p:sp>
             <p:nvSpPr>
               <p:cNvPr id="44" name="TextBox 43">
                 <a:extLst>
                   <a:ext uri="{FF2B5EF4-FFF2-40B4-BE49-F238E27FC236}">
-                    <a16:creationId xmlns:a16="http://schemas.microsoft.com/office/drawing/2014/main" id="{2389C9F1-1BC1-4696-B08C-03D181BA8EC8}"/>
+                    <a16:creationId xmlns:a16="http://schemas.microsoft.com/office/drawing/2014/main" xmlns="" id="{2389C9F1-1BC1-4696-B08C-03D181BA8EC8}"/>
                   </a:ext>
                 </a:extLst>
               </p:cNvPr>
@@ -13386,6 +13411,7 @@
               </a:bodyPr>
               <a:lstStyle/>
               <a:p>
+                <a:pPr/>
                 <a14:m>
                   <m:oMathPara xmlns:m="http://schemas.openxmlformats.org/officeDocument/2006/math">
                     <m:oMathParaPr>
@@ -13396,7 +13422,7 @@
                         <m:sSubPr>
                           <m:ctrlPr>
                             <a:rPr lang="en-US" altLang="ko-KR" b="0" i="1" smtClean="0">
-                              <a:latin typeface="Cambria Math" panose="02040503050406030204" pitchFamily="18" charset="0"/>
+                              <a:latin typeface="Cambria Math"/>
                             </a:rPr>
                           </m:ctrlPr>
                         </m:sSubPr>
@@ -13425,7 +13451,7 @@
             </p:txBody>
           </p:sp>
         </mc:Choice>
-        <mc:Fallback>
+        <mc:Fallback xmlns="">
           <p:sp>
             <p:nvSpPr>
               <p:cNvPr id="44" name="TextBox 43">
@@ -13470,14 +13496,14 @@
           </p:sp>
         </mc:Fallback>
       </mc:AlternateContent>
-      <mc:AlternateContent xmlns:mc="http://schemas.openxmlformats.org/markup-compatibility/2006">
-        <mc:Choice xmlns:a14="http://schemas.microsoft.com/office/drawing/2010/main" Requires="a14">
+      <mc:AlternateContent xmlns:mc="http://schemas.openxmlformats.org/markup-compatibility/2006" xmlns:a14="http://schemas.microsoft.com/office/drawing/2010/main">
+        <mc:Choice Requires="a14">
           <p:sp>
             <p:nvSpPr>
               <p:cNvPr id="45" name="TextBox 44">
                 <a:extLst>
                   <a:ext uri="{FF2B5EF4-FFF2-40B4-BE49-F238E27FC236}">
-                    <a16:creationId xmlns:a16="http://schemas.microsoft.com/office/drawing/2014/main" id="{891F25FD-976C-4420-A449-57E1FD49D835}"/>
+                    <a16:creationId xmlns:a16="http://schemas.microsoft.com/office/drawing/2014/main" xmlns="" id="{891F25FD-976C-4420-A449-57E1FD49D835}"/>
                   </a:ext>
                 </a:extLst>
               </p:cNvPr>
@@ -13500,6 +13526,7 @@
               </a:bodyPr>
               <a:lstStyle/>
               <a:p>
+                <a:pPr/>
                 <a14:m>
                   <m:oMathPara xmlns:m="http://schemas.openxmlformats.org/officeDocument/2006/math">
                     <m:oMathParaPr>
@@ -13510,7 +13537,7 @@
                         <m:sSubPr>
                           <m:ctrlPr>
                             <a:rPr lang="en-US" altLang="ko-KR" b="0" i="1" smtClean="0">
-                              <a:latin typeface="Cambria Math" panose="02040503050406030204" pitchFamily="18" charset="0"/>
+                              <a:latin typeface="Cambria Math"/>
                             </a:rPr>
                           </m:ctrlPr>
                         </m:sSubPr>
@@ -13539,7 +13566,7 @@
             </p:txBody>
           </p:sp>
         </mc:Choice>
-        <mc:Fallback>
+        <mc:Fallback xmlns="">
           <p:sp>
             <p:nvSpPr>
               <p:cNvPr id="45" name="TextBox 44">
@@ -13584,14 +13611,14 @@
           </p:sp>
         </mc:Fallback>
       </mc:AlternateContent>
-      <mc:AlternateContent xmlns:mc="http://schemas.openxmlformats.org/markup-compatibility/2006">
-        <mc:Choice xmlns:a14="http://schemas.microsoft.com/office/drawing/2010/main" Requires="a14">
+      <mc:AlternateContent xmlns:mc="http://schemas.openxmlformats.org/markup-compatibility/2006" xmlns:a14="http://schemas.microsoft.com/office/drawing/2010/main">
+        <mc:Choice Requires="a14">
           <p:sp>
             <p:nvSpPr>
               <p:cNvPr id="46" name="TextBox 45">
                 <a:extLst>
                   <a:ext uri="{FF2B5EF4-FFF2-40B4-BE49-F238E27FC236}">
-                    <a16:creationId xmlns:a16="http://schemas.microsoft.com/office/drawing/2014/main" id="{C9CE65DF-C084-46E8-8760-97DD4D78500E}"/>
+                    <a16:creationId xmlns:a16="http://schemas.microsoft.com/office/drawing/2014/main" xmlns="" id="{C9CE65DF-C084-46E8-8760-97DD4D78500E}"/>
                   </a:ext>
                 </a:extLst>
               </p:cNvPr>
@@ -13614,6 +13641,7 @@
               </a:bodyPr>
               <a:lstStyle/>
               <a:p>
+                <a:pPr/>
                 <a14:m>
                   <m:oMathPara xmlns:m="http://schemas.openxmlformats.org/officeDocument/2006/math">
                     <m:oMathParaPr>
@@ -13624,7 +13652,7 @@
                         <m:sSubPr>
                           <m:ctrlPr>
                             <a:rPr lang="en-US" altLang="ko-KR" b="0" i="1" smtClean="0">
-                              <a:latin typeface="Cambria Math" panose="02040503050406030204" pitchFamily="18" charset="0"/>
+                              <a:latin typeface="Cambria Math"/>
                             </a:rPr>
                           </m:ctrlPr>
                         </m:sSubPr>
@@ -13653,7 +13681,7 @@
             </p:txBody>
           </p:sp>
         </mc:Choice>
-        <mc:Fallback>
+        <mc:Fallback xmlns="">
           <p:sp>
             <p:nvSpPr>
               <p:cNvPr id="46" name="TextBox 45">
@@ -13698,14 +13726,14 @@
           </p:sp>
         </mc:Fallback>
       </mc:AlternateContent>
-      <mc:AlternateContent xmlns:mc="http://schemas.openxmlformats.org/markup-compatibility/2006">
-        <mc:Choice xmlns:a14="http://schemas.microsoft.com/office/drawing/2010/main" Requires="a14">
+      <mc:AlternateContent xmlns:mc="http://schemas.openxmlformats.org/markup-compatibility/2006" xmlns:a14="http://schemas.microsoft.com/office/drawing/2010/main">
+        <mc:Choice Requires="a14">
           <p:sp>
             <p:nvSpPr>
               <p:cNvPr id="47" name="TextBox 46">
                 <a:extLst>
                   <a:ext uri="{FF2B5EF4-FFF2-40B4-BE49-F238E27FC236}">
-                    <a16:creationId xmlns:a16="http://schemas.microsoft.com/office/drawing/2014/main" id="{55D353FC-771E-444A-BF9F-9D5973D430B2}"/>
+                    <a16:creationId xmlns:a16="http://schemas.microsoft.com/office/drawing/2014/main" xmlns="" id="{55D353FC-771E-444A-BF9F-9D5973D430B2}"/>
                   </a:ext>
                 </a:extLst>
               </p:cNvPr>
@@ -13728,6 +13756,7 @@
               </a:bodyPr>
               <a:lstStyle/>
               <a:p>
+                <a:pPr/>
                 <a14:m>
                   <m:oMathPara xmlns:m="http://schemas.openxmlformats.org/officeDocument/2006/math">
                     <m:oMathParaPr>
@@ -13738,7 +13767,7 @@
                         <m:sSubPr>
                           <m:ctrlPr>
                             <a:rPr lang="en-US" altLang="ko-KR" b="0" i="1" smtClean="0">
-                              <a:latin typeface="Cambria Math" panose="02040503050406030204" pitchFamily="18" charset="0"/>
+                              <a:latin typeface="Cambria Math"/>
                             </a:rPr>
                           </m:ctrlPr>
                         </m:sSubPr>
@@ -13767,7 +13796,7 @@
             </p:txBody>
           </p:sp>
         </mc:Choice>
-        <mc:Fallback>
+        <mc:Fallback xmlns="">
           <p:sp>
             <p:nvSpPr>
               <p:cNvPr id="47" name="TextBox 46">
@@ -13812,14 +13841,14 @@
           </p:sp>
         </mc:Fallback>
       </mc:AlternateContent>
-      <mc:AlternateContent xmlns:mc="http://schemas.openxmlformats.org/markup-compatibility/2006">
-        <mc:Choice xmlns:a14="http://schemas.microsoft.com/office/drawing/2010/main" Requires="a14">
+      <mc:AlternateContent xmlns:mc="http://schemas.openxmlformats.org/markup-compatibility/2006" xmlns:a14="http://schemas.microsoft.com/office/drawing/2010/main">
+        <mc:Choice Requires="a14">
           <p:sp>
             <p:nvSpPr>
               <p:cNvPr id="48" name="TextBox 47">
                 <a:extLst>
                   <a:ext uri="{FF2B5EF4-FFF2-40B4-BE49-F238E27FC236}">
-                    <a16:creationId xmlns:a16="http://schemas.microsoft.com/office/drawing/2014/main" id="{54DE8BB8-8293-4E88-846C-D1DF82E5CEFE}"/>
+                    <a16:creationId xmlns:a16="http://schemas.microsoft.com/office/drawing/2014/main" xmlns="" id="{54DE8BB8-8293-4E88-846C-D1DF82E5CEFE}"/>
                   </a:ext>
                 </a:extLst>
               </p:cNvPr>
@@ -13842,6 +13871,7 @@
               </a:bodyPr>
               <a:lstStyle/>
               <a:p>
+                <a:pPr/>
                 <a14:m>
                   <m:oMathPara xmlns:m="http://schemas.openxmlformats.org/officeDocument/2006/math">
                     <m:oMathParaPr>
@@ -13852,7 +13882,7 @@
                         <m:sSubPr>
                           <m:ctrlPr>
                             <a:rPr lang="en-US" altLang="ko-KR" b="0" i="1" smtClean="0">
-                              <a:latin typeface="Cambria Math" panose="02040503050406030204" pitchFamily="18" charset="0"/>
+                              <a:latin typeface="Cambria Math"/>
                             </a:rPr>
                           </m:ctrlPr>
                         </m:sSubPr>
@@ -13881,7 +13911,7 @@
             </p:txBody>
           </p:sp>
         </mc:Choice>
-        <mc:Fallback>
+        <mc:Fallback xmlns="">
           <p:sp>
             <p:nvSpPr>
               <p:cNvPr id="48" name="TextBox 47">
@@ -13926,14 +13956,14 @@
           </p:sp>
         </mc:Fallback>
       </mc:AlternateContent>
-      <mc:AlternateContent xmlns:mc="http://schemas.openxmlformats.org/markup-compatibility/2006">
-        <mc:Choice xmlns:a14="http://schemas.microsoft.com/office/drawing/2010/main" Requires="a14">
+      <mc:AlternateContent xmlns:mc="http://schemas.openxmlformats.org/markup-compatibility/2006" xmlns:a14="http://schemas.microsoft.com/office/drawing/2010/main">
+        <mc:Choice Requires="a14">
           <p:sp>
             <p:nvSpPr>
               <p:cNvPr id="49" name="TextBox 48">
                 <a:extLst>
                   <a:ext uri="{FF2B5EF4-FFF2-40B4-BE49-F238E27FC236}">
-                    <a16:creationId xmlns:a16="http://schemas.microsoft.com/office/drawing/2014/main" id="{39E07179-F872-4762-B61F-49A0E909116D}"/>
+                    <a16:creationId xmlns:a16="http://schemas.microsoft.com/office/drawing/2014/main" xmlns="" id="{39E07179-F872-4762-B61F-49A0E909116D}"/>
                   </a:ext>
                 </a:extLst>
               </p:cNvPr>
@@ -13956,6 +13986,7 @@
               </a:bodyPr>
               <a:lstStyle/>
               <a:p>
+                <a:pPr/>
                 <a14:m>
                   <m:oMathPara xmlns:m="http://schemas.openxmlformats.org/officeDocument/2006/math">
                     <m:oMathParaPr>
@@ -13966,7 +13997,7 @@
                         <m:sSubPr>
                           <m:ctrlPr>
                             <a:rPr lang="en-US" altLang="ko-KR" b="0" i="1" smtClean="0">
-                              <a:latin typeface="Cambria Math" panose="02040503050406030204" pitchFamily="18" charset="0"/>
+                              <a:latin typeface="Cambria Math"/>
                             </a:rPr>
                           </m:ctrlPr>
                         </m:sSubPr>
@@ -13995,7 +14026,7 @@
             </p:txBody>
           </p:sp>
         </mc:Choice>
-        <mc:Fallback>
+        <mc:Fallback xmlns="">
           <p:sp>
             <p:nvSpPr>
               <p:cNvPr id="49" name="TextBox 48">
@@ -14045,7 +14076,7 @@
           <p:cNvPr id="30" name="그룹 29">
             <a:extLst>
               <a:ext uri="{FF2B5EF4-FFF2-40B4-BE49-F238E27FC236}">
-                <a16:creationId xmlns:a16="http://schemas.microsoft.com/office/drawing/2014/main" id="{81800122-E495-4273-849B-6E3848A28EE0}"/>
+                <a16:creationId xmlns:a16="http://schemas.microsoft.com/office/drawing/2014/main" xmlns="" id="{81800122-E495-4273-849B-6E3848A28EE0}"/>
               </a:ext>
             </a:extLst>
           </p:cNvPr>
@@ -14065,7 +14096,7 @@
             <p:cNvPr id="115" name="화살표: 아래쪽 114">
               <a:extLst>
                 <a:ext uri="{FF2B5EF4-FFF2-40B4-BE49-F238E27FC236}">
-                  <a16:creationId xmlns:a16="http://schemas.microsoft.com/office/drawing/2014/main" id="{D1A66A2C-C81C-4B94-AD0B-9DD894B16EE0}"/>
+                  <a16:creationId xmlns:a16="http://schemas.microsoft.com/office/drawing/2014/main" xmlns="" id="{D1A66A2C-C81C-4B94-AD0B-9DD894B16EE0}"/>
                 </a:ext>
               </a:extLst>
             </p:cNvPr>
@@ -14120,7 +14151,7 @@
             <p:cNvPr id="116" name="직사각형 115">
               <a:extLst>
                 <a:ext uri="{FF2B5EF4-FFF2-40B4-BE49-F238E27FC236}">
-                  <a16:creationId xmlns:a16="http://schemas.microsoft.com/office/drawing/2014/main" id="{ACB2CE96-0555-4DE0-8A56-2235454F55BE}"/>
+                  <a16:creationId xmlns:a16="http://schemas.microsoft.com/office/drawing/2014/main" xmlns="" id="{ACB2CE96-0555-4DE0-8A56-2235454F55BE}"/>
                 </a:ext>
               </a:extLst>
             </p:cNvPr>
@@ -14172,7 +14203,7 @@
             <p:cNvPr id="117" name="직사각형 116">
               <a:extLst>
                 <a:ext uri="{FF2B5EF4-FFF2-40B4-BE49-F238E27FC236}">
-                  <a16:creationId xmlns:a16="http://schemas.microsoft.com/office/drawing/2014/main" id="{BB03A9E3-A3B9-4E41-BDA1-27D30CDB6457}"/>
+                  <a16:creationId xmlns:a16="http://schemas.microsoft.com/office/drawing/2014/main" xmlns="" id="{BB03A9E3-A3B9-4E41-BDA1-27D30CDB6457}"/>
                 </a:ext>
               </a:extLst>
             </p:cNvPr>
@@ -14224,7 +14255,7 @@
             <p:cNvPr id="118" name="직사각형 117">
               <a:extLst>
                 <a:ext uri="{FF2B5EF4-FFF2-40B4-BE49-F238E27FC236}">
-                  <a16:creationId xmlns:a16="http://schemas.microsoft.com/office/drawing/2014/main" id="{99184727-9563-484D-A6CF-5A77FDD35173}"/>
+                  <a16:creationId xmlns:a16="http://schemas.microsoft.com/office/drawing/2014/main" xmlns="" id="{99184727-9563-484D-A6CF-5A77FDD35173}"/>
                 </a:ext>
               </a:extLst>
             </p:cNvPr>
@@ -14277,7 +14308,7 @@
           <p:cNvPr id="119" name="TextBox 118">
             <a:extLst>
               <a:ext uri="{FF2B5EF4-FFF2-40B4-BE49-F238E27FC236}">
-                <a16:creationId xmlns:a16="http://schemas.microsoft.com/office/drawing/2014/main" id="{CB2C09CE-8B04-4133-9304-BC579DF3759B}"/>
+                <a16:creationId xmlns:a16="http://schemas.microsoft.com/office/drawing/2014/main" xmlns="" id="{CB2C09CE-8B04-4133-9304-BC579DF3759B}"/>
               </a:ext>
             </a:extLst>
           </p:cNvPr>
@@ -14317,7 +14348,7 @@
           <p:cNvPr id="59" name="화살표: 아래쪽 58">
             <a:extLst>
               <a:ext uri="{FF2B5EF4-FFF2-40B4-BE49-F238E27FC236}">
-                <a16:creationId xmlns:a16="http://schemas.microsoft.com/office/drawing/2014/main" id="{64139DE1-1F31-4F45-BFD0-90388EF9A9F9}"/>
+                <a16:creationId xmlns:a16="http://schemas.microsoft.com/office/drawing/2014/main" xmlns="" id="{64139DE1-1F31-4F45-BFD0-90388EF9A9F9}"/>
               </a:ext>
             </a:extLst>
           </p:cNvPr>
@@ -14372,7 +14403,7 @@
           <p:cNvPr id="60" name="직사각형 59">
             <a:extLst>
               <a:ext uri="{FF2B5EF4-FFF2-40B4-BE49-F238E27FC236}">
-                <a16:creationId xmlns:a16="http://schemas.microsoft.com/office/drawing/2014/main" id="{1B2016A3-1CFD-4919-A33F-E66E960A40BA}"/>
+                <a16:creationId xmlns:a16="http://schemas.microsoft.com/office/drawing/2014/main" xmlns="" id="{1B2016A3-1CFD-4919-A33F-E66E960A40BA}"/>
               </a:ext>
             </a:extLst>
           </p:cNvPr>
@@ -14424,7 +14455,7 @@
           <p:cNvPr id="61" name="직사각형 60">
             <a:extLst>
               <a:ext uri="{FF2B5EF4-FFF2-40B4-BE49-F238E27FC236}">
-                <a16:creationId xmlns:a16="http://schemas.microsoft.com/office/drawing/2014/main" id="{793509B3-9536-4057-8BAD-7D97A931DD6A}"/>
+                <a16:creationId xmlns:a16="http://schemas.microsoft.com/office/drawing/2014/main" xmlns="" id="{793509B3-9536-4057-8BAD-7D97A931DD6A}"/>
               </a:ext>
             </a:extLst>
           </p:cNvPr>
@@ -14476,7 +14507,7 @@
           <p:cNvPr id="62" name="직사각형 61">
             <a:extLst>
               <a:ext uri="{FF2B5EF4-FFF2-40B4-BE49-F238E27FC236}">
-                <a16:creationId xmlns:a16="http://schemas.microsoft.com/office/drawing/2014/main" id="{5302A6EE-6398-4C4D-9DF8-C6D27BA38937}"/>
+                <a16:creationId xmlns:a16="http://schemas.microsoft.com/office/drawing/2014/main" xmlns="" id="{5302A6EE-6398-4C4D-9DF8-C6D27BA38937}"/>
               </a:ext>
             </a:extLst>
           </p:cNvPr>
@@ -14528,7 +14559,7 @@
           <p:cNvPr id="63" name="TextBox 62">
             <a:extLst>
               <a:ext uri="{FF2B5EF4-FFF2-40B4-BE49-F238E27FC236}">
-                <a16:creationId xmlns:a16="http://schemas.microsoft.com/office/drawing/2014/main" id="{E12CDEE4-5DCA-4F3A-9931-7FAF7F6768AD}"/>
+                <a16:creationId xmlns:a16="http://schemas.microsoft.com/office/drawing/2014/main" xmlns="" id="{E12CDEE4-5DCA-4F3A-9931-7FAF7F6768AD}"/>
               </a:ext>
             </a:extLst>
           </p:cNvPr>
@@ -14568,7 +14599,7 @@
           <p:cNvPr id="34" name="그룹 33">
             <a:extLst>
               <a:ext uri="{FF2B5EF4-FFF2-40B4-BE49-F238E27FC236}">
-                <a16:creationId xmlns:a16="http://schemas.microsoft.com/office/drawing/2014/main" id="{7EAFCDC8-C1F4-4359-A56C-25480E4D33E3}"/>
+                <a16:creationId xmlns:a16="http://schemas.microsoft.com/office/drawing/2014/main" xmlns="" id="{7EAFCDC8-C1F4-4359-A56C-25480E4D33E3}"/>
               </a:ext>
             </a:extLst>
           </p:cNvPr>
@@ -14588,7 +14619,7 @@
             <p:cNvPr id="65" name="화살표: 아래쪽 64">
               <a:extLst>
                 <a:ext uri="{FF2B5EF4-FFF2-40B4-BE49-F238E27FC236}">
-                  <a16:creationId xmlns:a16="http://schemas.microsoft.com/office/drawing/2014/main" id="{D81B72CB-F1B0-4033-A036-FA17DB3DDFB1}"/>
+                  <a16:creationId xmlns:a16="http://schemas.microsoft.com/office/drawing/2014/main" xmlns="" id="{D81B72CB-F1B0-4033-A036-FA17DB3DDFB1}"/>
                 </a:ext>
               </a:extLst>
             </p:cNvPr>
@@ -14643,7 +14674,7 @@
             <p:cNvPr id="66" name="직사각형 65">
               <a:extLst>
                 <a:ext uri="{FF2B5EF4-FFF2-40B4-BE49-F238E27FC236}">
-                  <a16:creationId xmlns:a16="http://schemas.microsoft.com/office/drawing/2014/main" id="{675DA16B-9A79-47A6-9EAC-3F566C908773}"/>
+                  <a16:creationId xmlns:a16="http://schemas.microsoft.com/office/drawing/2014/main" xmlns="" id="{675DA16B-9A79-47A6-9EAC-3F566C908773}"/>
                 </a:ext>
               </a:extLst>
             </p:cNvPr>
@@ -14695,7 +14726,7 @@
             <p:cNvPr id="67" name="직사각형 66">
               <a:extLst>
                 <a:ext uri="{FF2B5EF4-FFF2-40B4-BE49-F238E27FC236}">
-                  <a16:creationId xmlns:a16="http://schemas.microsoft.com/office/drawing/2014/main" id="{3B60BDB6-C7DE-4BC1-A0A4-CF29B8A71F98}"/>
+                  <a16:creationId xmlns:a16="http://schemas.microsoft.com/office/drawing/2014/main" xmlns="" id="{3B60BDB6-C7DE-4BC1-A0A4-CF29B8A71F98}"/>
                 </a:ext>
               </a:extLst>
             </p:cNvPr>
@@ -14747,7 +14778,7 @@
             <p:cNvPr id="68" name="직사각형 67">
               <a:extLst>
                 <a:ext uri="{FF2B5EF4-FFF2-40B4-BE49-F238E27FC236}">
-                  <a16:creationId xmlns:a16="http://schemas.microsoft.com/office/drawing/2014/main" id="{7115E2D4-A4B6-47F7-B1E8-7DD96BC6F0C8}"/>
+                  <a16:creationId xmlns:a16="http://schemas.microsoft.com/office/drawing/2014/main" xmlns="" id="{7115E2D4-A4B6-47F7-B1E8-7DD96BC6F0C8}"/>
                 </a:ext>
               </a:extLst>
             </p:cNvPr>
@@ -14800,7 +14831,7 @@
           <p:cNvPr id="31" name="직사각형 30">
             <a:extLst>
               <a:ext uri="{FF2B5EF4-FFF2-40B4-BE49-F238E27FC236}">
-                <a16:creationId xmlns:a16="http://schemas.microsoft.com/office/drawing/2014/main" id="{66957543-AF12-455F-B367-0CC018C3C310}"/>
+                <a16:creationId xmlns:a16="http://schemas.microsoft.com/office/drawing/2014/main" xmlns="" id="{66957543-AF12-455F-B367-0CC018C3C310}"/>
               </a:ext>
             </a:extLst>
           </p:cNvPr>
@@ -14833,14 +14864,14 @@
           </a:p>
         </p:txBody>
       </p:sp>
-      <mc:AlternateContent xmlns:mc="http://schemas.openxmlformats.org/markup-compatibility/2006">
-        <mc:Choice xmlns:a14="http://schemas.microsoft.com/office/drawing/2010/main" Requires="a14">
+      <mc:AlternateContent xmlns:mc="http://schemas.openxmlformats.org/markup-compatibility/2006" xmlns:a14="http://schemas.microsoft.com/office/drawing/2010/main">
+        <mc:Choice Requires="a14">
           <p:sp>
             <p:nvSpPr>
               <p:cNvPr id="74" name="직사각형 73">
                 <a:extLst>
                   <a:ext uri="{FF2B5EF4-FFF2-40B4-BE49-F238E27FC236}">
-                    <a16:creationId xmlns:a16="http://schemas.microsoft.com/office/drawing/2014/main" id="{418389AB-906E-421A-97CC-513351C6120A}"/>
+                    <a16:creationId xmlns:a16="http://schemas.microsoft.com/office/drawing/2014/main" xmlns="" id="{418389AB-906E-421A-97CC-513351C6120A}"/>
                   </a:ext>
                 </a:extLst>
               </p:cNvPr>
@@ -14924,7 +14955,7 @@
             </p:txBody>
           </p:sp>
         </mc:Choice>
-        <mc:Fallback>
+        <mc:Fallback xmlns="">
           <p:sp>
             <p:nvSpPr>
               <p:cNvPr id="74" name="직사각형 73">
@@ -14974,7 +15005,7 @@
           <p:cNvPr id="35" name="그룹 34">
             <a:extLst>
               <a:ext uri="{FF2B5EF4-FFF2-40B4-BE49-F238E27FC236}">
-                <a16:creationId xmlns:a16="http://schemas.microsoft.com/office/drawing/2014/main" id="{05F108F8-492F-4101-8AD9-4D18971DA1FB}"/>
+                <a16:creationId xmlns:a16="http://schemas.microsoft.com/office/drawing/2014/main" xmlns="" id="{05F108F8-492F-4101-8AD9-4D18971DA1FB}"/>
               </a:ext>
             </a:extLst>
           </p:cNvPr>
@@ -14994,7 +15025,7 @@
             <p:cNvPr id="77" name="화살표: 아래쪽 76">
               <a:extLst>
                 <a:ext uri="{FF2B5EF4-FFF2-40B4-BE49-F238E27FC236}">
-                  <a16:creationId xmlns:a16="http://schemas.microsoft.com/office/drawing/2014/main" id="{EA443A86-A8BE-4170-92A7-759E59BBA6DB}"/>
+                  <a16:creationId xmlns:a16="http://schemas.microsoft.com/office/drawing/2014/main" xmlns="" id="{EA443A86-A8BE-4170-92A7-759E59BBA6DB}"/>
                 </a:ext>
               </a:extLst>
             </p:cNvPr>
@@ -15049,7 +15080,7 @@
             <p:cNvPr id="78" name="직사각형 77">
               <a:extLst>
                 <a:ext uri="{FF2B5EF4-FFF2-40B4-BE49-F238E27FC236}">
-                  <a16:creationId xmlns:a16="http://schemas.microsoft.com/office/drawing/2014/main" id="{A400F399-3643-421A-A569-6CF5B00DB989}"/>
+                  <a16:creationId xmlns:a16="http://schemas.microsoft.com/office/drawing/2014/main" xmlns="" id="{A400F399-3643-421A-A569-6CF5B00DB989}"/>
                 </a:ext>
               </a:extLst>
             </p:cNvPr>
@@ -15101,7 +15132,7 @@
             <p:cNvPr id="79" name="직사각형 78">
               <a:extLst>
                 <a:ext uri="{FF2B5EF4-FFF2-40B4-BE49-F238E27FC236}">
-                  <a16:creationId xmlns:a16="http://schemas.microsoft.com/office/drawing/2014/main" id="{4D212B28-5AED-499B-8371-8CC7A763CC87}"/>
+                  <a16:creationId xmlns:a16="http://schemas.microsoft.com/office/drawing/2014/main" xmlns="" id="{4D212B28-5AED-499B-8371-8CC7A763CC87}"/>
                 </a:ext>
               </a:extLst>
             </p:cNvPr>
@@ -15153,7 +15184,7 @@
             <p:cNvPr id="80" name="직사각형 79">
               <a:extLst>
                 <a:ext uri="{FF2B5EF4-FFF2-40B4-BE49-F238E27FC236}">
-                  <a16:creationId xmlns:a16="http://schemas.microsoft.com/office/drawing/2014/main" id="{3C8E34C7-A8E7-4B8B-B775-625D8B4064E5}"/>
+                  <a16:creationId xmlns:a16="http://schemas.microsoft.com/office/drawing/2014/main" xmlns="" id="{3C8E34C7-A8E7-4B8B-B775-625D8B4064E5}"/>
                 </a:ext>
               </a:extLst>
             </p:cNvPr>
@@ -15211,6 +15242,1717 @@
   <p:clrMapOvr>
     <a:masterClrMapping/>
   </p:clrMapOvr>
+  <p:timing>
+    <p:tnLst>
+      <p:par>
+        <p:cTn id="1" dur="indefinite" restart="never" nodeType="tmRoot"/>
+      </p:par>
+    </p:tnLst>
+  </p:timing>
+</p:sld>
+</file>
+
+<file path=ppt/slides/slide4.xml><?xml version="1.0" encoding="utf-8"?>
+<p:sld xmlns:a="http://schemas.openxmlformats.org/drawingml/2006/main" xmlns:r="http://schemas.openxmlformats.org/officeDocument/2006/relationships" xmlns:p="http://schemas.openxmlformats.org/presentationml/2006/main">
+  <p:cSld>
+    <p:spTree>
+      <p:nvGrpSpPr>
+        <p:cNvPr id="1" name=""/>
+        <p:cNvGrpSpPr/>
+        <p:nvPr/>
+      </p:nvGrpSpPr>
+      <p:grpSpPr>
+        <a:xfrm>
+          <a:off x="0" y="0"/>
+          <a:ext cx="0" cy="0"/>
+          <a:chOff x="0" y="0"/>
+          <a:chExt cx="0" cy="0"/>
+        </a:xfrm>
+      </p:grpSpPr>
+      <p:grpSp>
+        <p:nvGrpSpPr>
+          <p:cNvPr id="42" name="그룹 41"/>
+          <p:cNvGrpSpPr/>
+          <p:nvPr/>
+        </p:nvGrpSpPr>
+        <p:grpSpPr>
+          <a:xfrm>
+            <a:off x="2612913" y="1270501"/>
+            <a:ext cx="3918175" cy="646331"/>
+            <a:chOff x="2612913" y="1270501"/>
+            <a:chExt cx="3918175" cy="646331"/>
+          </a:xfrm>
+        </p:grpSpPr>
+        <mc:AlternateContent xmlns:mc="http://schemas.openxmlformats.org/markup-compatibility/2006">
+          <mc:Choice xmlns:a14="http://schemas.microsoft.com/office/drawing/2010/main" Requires="a14">
+            <p:sp>
+              <p:nvSpPr>
+                <p:cNvPr id="4" name="TextBox 3"/>
+                <p:cNvSpPr txBox="1"/>
+                <p:nvPr/>
+              </p:nvSpPr>
+              <p:spPr>
+                <a:xfrm>
+                  <a:off x="2612913" y="1270501"/>
+                  <a:ext cx="569257" cy="646331"/>
+                </a:xfrm>
+                <a:prstGeom prst="rect">
+                  <a:avLst/>
+                </a:prstGeom>
+                <a:noFill/>
+              </p:spPr>
+              <p:txBody>
+                <a:bodyPr wrap="none" rtlCol="0">
+                  <a:spAutoFit/>
+                </a:bodyPr>
+                <a:lstStyle/>
+                <a:p>
+                  <a14:m>
+                    <m:oMathPara xmlns:m="http://schemas.openxmlformats.org/officeDocument/2006/math">
+                      <m:oMathParaPr>
+                        <m:jc m:val="centerGroup"/>
+                      </m:oMathParaPr>
+                      <m:oMath xmlns:m="http://schemas.openxmlformats.org/officeDocument/2006/math">
+                        <m:r>
+                          <a:rPr lang="en-US" altLang="ko-KR" sz="3600" b="0" i="1" smtClean="0">
+                            <a:latin typeface="Cambria Math"/>
+                          </a:rPr>
+                          <m:t>𝑠</m:t>
+                        </m:r>
+                      </m:oMath>
+                    </m:oMathPara>
+                  </a14:m>
+                  <a:endParaRPr lang="ko-KR" altLang="en-US" sz="3600" dirty="0"/>
+                </a:p>
+              </p:txBody>
+            </p:sp>
+          </mc:Choice>
+          <mc:Fallback>
+            <p:sp>
+              <p:nvSpPr>
+                <p:cNvPr id="4" name="TextBox 3"/>
+                <p:cNvSpPr txBox="1">
+                  <a:spLocks noRot="1" noChangeAspect="1" noMove="1" noResize="1" noEditPoints="1" noAdjustHandles="1" noChangeArrowheads="1" noChangeShapeType="1" noTextEdit="1"/>
+                </p:cNvSpPr>
+                <p:nvPr/>
+              </p:nvSpPr>
+              <p:spPr>
+                <a:xfrm>
+                  <a:off x="2612913" y="1270501"/>
+                  <a:ext cx="569257" cy="646331"/>
+                </a:xfrm>
+                <a:prstGeom prst="rect">
+                  <a:avLst/>
+                </a:prstGeom>
+                <a:blipFill rotWithShape="1">
+                  <a:blip r:embed="rId2"/>
+                  <a:stretch>
+                    <a:fillRect/>
+                  </a:stretch>
+                </a:blipFill>
+              </p:spPr>
+              <p:txBody>
+                <a:bodyPr/>
+                <a:lstStyle/>
+                <a:p>
+                  <a:r>
+                    <a:rPr lang="ko-KR" altLang="en-US">
+                      <a:noFill/>
+                    </a:rPr>
+                    <a:t> </a:t>
+                  </a:r>
+                </a:p>
+              </p:txBody>
+            </p:sp>
+          </mc:Fallback>
+        </mc:AlternateContent>
+        <mc:AlternateContent xmlns:mc="http://schemas.openxmlformats.org/markup-compatibility/2006">
+          <mc:Choice xmlns:a14="http://schemas.microsoft.com/office/drawing/2010/main" Requires="a14">
+            <p:sp>
+              <p:nvSpPr>
+                <p:cNvPr id="5" name="TextBox 4"/>
+                <p:cNvSpPr txBox="1"/>
+                <p:nvPr/>
+              </p:nvSpPr>
+              <p:spPr>
+                <a:xfrm>
+                  <a:off x="4232323" y="1270501"/>
+                  <a:ext cx="642805" cy="646331"/>
+                </a:xfrm>
+                <a:prstGeom prst="rect">
+                  <a:avLst/>
+                </a:prstGeom>
+                <a:noFill/>
+                <a:ln>
+                  <a:solidFill>
+                    <a:schemeClr val="tx1"/>
+                  </a:solidFill>
+                </a:ln>
+              </p:spPr>
+              <p:txBody>
+                <a:bodyPr wrap="none" rtlCol="0">
+                  <a:spAutoFit/>
+                </a:bodyPr>
+                <a:lstStyle/>
+                <a:p>
+                  <a14:m>
+                    <m:oMathPara xmlns:m="http://schemas.openxmlformats.org/officeDocument/2006/math">
+                      <m:oMathParaPr>
+                        <m:jc m:val="centerGroup"/>
+                      </m:oMathParaPr>
+                      <m:oMath xmlns:m="http://schemas.openxmlformats.org/officeDocument/2006/math">
+                        <m:r>
+                          <a:rPr lang="en-US" altLang="ko-KR" sz="3600" b="0" i="1" smtClean="0">
+                            <a:latin typeface="Cambria Math"/>
+                          </a:rPr>
+                          <m:t>𝐴</m:t>
+                        </m:r>
+                      </m:oMath>
+                    </m:oMathPara>
+                  </a14:m>
+                  <a:endParaRPr lang="ko-KR" altLang="en-US" sz="3600" dirty="0"/>
+                </a:p>
+              </p:txBody>
+            </p:sp>
+          </mc:Choice>
+          <mc:Fallback>
+            <p:sp>
+              <p:nvSpPr>
+                <p:cNvPr id="5" name="TextBox 4"/>
+                <p:cNvSpPr txBox="1">
+                  <a:spLocks noRot="1" noChangeAspect="1" noMove="1" noResize="1" noEditPoints="1" noAdjustHandles="1" noChangeArrowheads="1" noChangeShapeType="1" noTextEdit="1"/>
+                </p:cNvSpPr>
+                <p:nvPr/>
+              </p:nvSpPr>
+              <p:spPr>
+                <a:xfrm>
+                  <a:off x="4232323" y="1270501"/>
+                  <a:ext cx="642805" cy="646331"/>
+                </a:xfrm>
+                <a:prstGeom prst="rect">
+                  <a:avLst/>
+                </a:prstGeom>
+                <a:blipFill rotWithShape="1">
+                  <a:blip r:embed="rId3"/>
+                  <a:stretch>
+                    <a:fillRect/>
+                  </a:stretch>
+                </a:blipFill>
+                <a:ln>
+                  <a:solidFill>
+                    <a:schemeClr val="tx1"/>
+                  </a:solidFill>
+                </a:ln>
+              </p:spPr>
+              <p:txBody>
+                <a:bodyPr/>
+                <a:lstStyle/>
+                <a:p>
+                  <a:r>
+                    <a:rPr lang="ko-KR" altLang="en-US">
+                      <a:noFill/>
+                    </a:rPr>
+                    <a:t> </a:t>
+                  </a:r>
+                </a:p>
+              </p:txBody>
+            </p:sp>
+          </mc:Fallback>
+        </mc:AlternateContent>
+        <mc:AlternateContent xmlns:mc="http://schemas.openxmlformats.org/markup-compatibility/2006">
+          <mc:Choice xmlns:a14="http://schemas.microsoft.com/office/drawing/2010/main" Requires="a14">
+            <p:sp>
+              <p:nvSpPr>
+                <p:cNvPr id="6" name="TextBox 5"/>
+                <p:cNvSpPr txBox="1"/>
+                <p:nvPr/>
+              </p:nvSpPr>
+              <p:spPr>
+                <a:xfrm>
+                  <a:off x="5925281" y="1270501"/>
+                  <a:ext cx="605807" cy="646331"/>
+                </a:xfrm>
+                <a:prstGeom prst="rect">
+                  <a:avLst/>
+                </a:prstGeom>
+                <a:noFill/>
+              </p:spPr>
+              <p:txBody>
+                <a:bodyPr wrap="none" rtlCol="0">
+                  <a:spAutoFit/>
+                </a:bodyPr>
+                <a:lstStyle/>
+                <a:p>
+                  <a14:m>
+                    <m:oMathPara xmlns:m="http://schemas.openxmlformats.org/officeDocument/2006/math">
+                      <m:oMathParaPr>
+                        <m:jc m:val="centerGroup"/>
+                      </m:oMathParaPr>
+                      <m:oMath xmlns:m="http://schemas.openxmlformats.org/officeDocument/2006/math">
+                        <m:r>
+                          <a:rPr lang="en-US" altLang="ko-KR" sz="3600" b="0" i="1" smtClean="0">
+                            <a:latin typeface="Cambria Math"/>
+                          </a:rPr>
+                          <m:t>𝑥</m:t>
+                        </m:r>
+                      </m:oMath>
+                    </m:oMathPara>
+                  </a14:m>
+                  <a:endParaRPr lang="ko-KR" altLang="en-US" sz="3600" dirty="0"/>
+                </a:p>
+              </p:txBody>
+            </p:sp>
+          </mc:Choice>
+          <mc:Fallback>
+            <p:sp>
+              <p:nvSpPr>
+                <p:cNvPr id="6" name="TextBox 5"/>
+                <p:cNvSpPr txBox="1">
+                  <a:spLocks noRot="1" noChangeAspect="1" noMove="1" noResize="1" noEditPoints="1" noAdjustHandles="1" noChangeArrowheads="1" noChangeShapeType="1" noTextEdit="1"/>
+                </p:cNvSpPr>
+                <p:nvPr/>
+              </p:nvSpPr>
+              <p:spPr>
+                <a:xfrm>
+                  <a:off x="5925281" y="1270501"/>
+                  <a:ext cx="605807" cy="646331"/>
+                </a:xfrm>
+                <a:prstGeom prst="rect">
+                  <a:avLst/>
+                </a:prstGeom>
+                <a:blipFill rotWithShape="1">
+                  <a:blip r:embed="rId4"/>
+                  <a:stretch>
+                    <a:fillRect/>
+                  </a:stretch>
+                </a:blipFill>
+              </p:spPr>
+              <p:txBody>
+                <a:bodyPr/>
+                <a:lstStyle/>
+                <a:p>
+                  <a:r>
+                    <a:rPr lang="ko-KR" altLang="en-US">
+                      <a:noFill/>
+                    </a:rPr>
+                    <a:t> </a:t>
+                  </a:r>
+                </a:p>
+              </p:txBody>
+            </p:sp>
+          </mc:Fallback>
+        </mc:AlternateContent>
+        <p:cxnSp>
+          <p:nvCxnSpPr>
+            <p:cNvPr id="9" name="직선 화살표 연결선 8"/>
+            <p:cNvCxnSpPr>
+              <a:stCxn id="4" idx="3"/>
+            </p:cNvCxnSpPr>
+            <p:nvPr/>
+          </p:nvCxnSpPr>
+          <p:spPr>
+            <a:xfrm>
+              <a:off x="3216363" y="1593667"/>
+              <a:ext cx="870903" cy="0"/>
+            </a:xfrm>
+            <a:prstGeom prst="straightConnector1">
+              <a:avLst/>
+            </a:prstGeom>
+            <a:ln>
+              <a:solidFill>
+                <a:schemeClr val="tx1"/>
+              </a:solidFill>
+              <a:tailEnd type="arrow"/>
+            </a:ln>
+          </p:spPr>
+          <p:style>
+            <a:lnRef idx="1">
+              <a:schemeClr val="accent1"/>
+            </a:lnRef>
+            <a:fillRef idx="0">
+              <a:schemeClr val="accent1"/>
+            </a:fillRef>
+            <a:effectRef idx="0">
+              <a:schemeClr val="accent1"/>
+            </a:effectRef>
+            <a:fontRef idx="minor">
+              <a:schemeClr val="tx1"/>
+            </a:fontRef>
+          </p:style>
+        </p:cxnSp>
+        <p:cxnSp>
+          <p:nvCxnSpPr>
+            <p:cNvPr id="13" name="직선 화살표 연결선 12"/>
+            <p:cNvCxnSpPr/>
+            <p:nvPr/>
+          </p:nvCxnSpPr>
+          <p:spPr>
+            <a:xfrm>
+              <a:off x="5088571" y="1593667"/>
+              <a:ext cx="870903" cy="0"/>
+            </a:xfrm>
+            <a:prstGeom prst="straightConnector1">
+              <a:avLst/>
+            </a:prstGeom>
+            <a:ln>
+              <a:solidFill>
+                <a:schemeClr val="tx1"/>
+              </a:solidFill>
+              <a:tailEnd type="arrow"/>
+            </a:ln>
+          </p:spPr>
+          <p:style>
+            <a:lnRef idx="1">
+              <a:schemeClr val="accent1"/>
+            </a:lnRef>
+            <a:fillRef idx="0">
+              <a:schemeClr val="accent1"/>
+            </a:fillRef>
+            <a:effectRef idx="0">
+              <a:schemeClr val="accent1"/>
+            </a:effectRef>
+            <a:fontRef idx="minor">
+              <a:schemeClr val="tx1"/>
+            </a:fontRef>
+          </p:style>
+        </p:cxnSp>
+      </p:grpSp>
+      <mc:AlternateContent xmlns:mc="http://schemas.openxmlformats.org/markup-compatibility/2006">
+        <mc:Choice xmlns:a14="http://schemas.microsoft.com/office/drawing/2010/main" Requires="a14">
+          <p:sp>
+            <p:nvSpPr>
+              <p:cNvPr id="15" name="TextBox 14"/>
+              <p:cNvSpPr txBox="1"/>
+              <p:nvPr/>
+            </p:nvSpPr>
+            <p:spPr>
+              <a:xfrm>
+                <a:off x="414952" y="2060848"/>
+                <a:ext cx="1458284" cy="461665"/>
+              </a:xfrm>
+              <a:prstGeom prst="rect">
+                <a:avLst/>
+              </a:prstGeom>
+              <a:noFill/>
+            </p:spPr>
+            <p:txBody>
+              <a:bodyPr wrap="none" rtlCol="0">
+                <a:spAutoFit/>
+              </a:bodyPr>
+              <a:lstStyle/>
+              <a:p>
+                <a:pPr algn="ctr"/>
+                <a:r>
+                  <a:rPr lang="en-US" altLang="ko-KR" sz="2400" dirty="0" smtClean="0"/>
+                  <a:t>Ex) </a:t>
+                </a:r>
+                <a14:m>
+                  <m:oMath xmlns:m="http://schemas.openxmlformats.org/officeDocument/2006/math">
+                    <m:r>
+                      <a:rPr lang="en-US" altLang="ko-KR" sz="2400" b="0" i="1" smtClean="0">
+                        <a:latin typeface="Cambria Math"/>
+                      </a:rPr>
+                      <m:t>𝐴</m:t>
+                    </m:r>
+                    <m:r>
+                      <a:rPr lang="en-US" altLang="ko-KR" sz="2400" b="0" i="1" smtClean="0">
+                        <a:latin typeface="Cambria Math"/>
+                      </a:rPr>
+                      <m:t>=2</m:t>
+                    </m:r>
+                  </m:oMath>
+                </a14:m>
+                <a:endParaRPr lang="ko-KR" altLang="en-US" sz="2400" dirty="0"/>
+              </a:p>
+            </p:txBody>
+          </p:sp>
+        </mc:Choice>
+        <mc:Fallback>
+          <p:sp>
+            <p:nvSpPr>
+              <p:cNvPr id="15" name="TextBox 14"/>
+              <p:cNvSpPr txBox="1">
+                <a:spLocks noRot="1" noChangeAspect="1" noMove="1" noResize="1" noEditPoints="1" noAdjustHandles="1" noChangeArrowheads="1" noChangeShapeType="1" noTextEdit="1"/>
+              </p:cNvSpPr>
+              <p:nvPr/>
+            </p:nvSpPr>
+            <p:spPr>
+              <a:xfrm>
+                <a:off x="414952" y="2060848"/>
+                <a:ext cx="1458284" cy="461665"/>
+              </a:xfrm>
+              <a:prstGeom prst="rect">
+                <a:avLst/>
+              </a:prstGeom>
+              <a:blipFill rotWithShape="1">
+                <a:blip r:embed="rId5"/>
+                <a:stretch>
+                  <a:fillRect l="-5858" t="-10526" r="-837" b="-28947"/>
+                </a:stretch>
+              </a:blipFill>
+            </p:spPr>
+            <p:txBody>
+              <a:bodyPr/>
+              <a:lstStyle/>
+              <a:p>
+                <a:r>
+                  <a:rPr lang="ko-KR" altLang="en-US">
+                    <a:noFill/>
+                  </a:rPr>
+                  <a:t> </a:t>
+                </a:r>
+              </a:p>
+            </p:txBody>
+          </p:sp>
+        </mc:Fallback>
+      </mc:AlternateContent>
+      <mc:AlternateContent xmlns:mc="http://schemas.openxmlformats.org/markup-compatibility/2006">
+        <mc:Choice xmlns:a14="http://schemas.microsoft.com/office/drawing/2010/main" Requires="a14">
+          <p:sp>
+            <p:nvSpPr>
+              <p:cNvPr id="16" name="TextBox 15"/>
+              <p:cNvSpPr txBox="1"/>
+              <p:nvPr/>
+            </p:nvSpPr>
+            <p:spPr>
+              <a:xfrm>
+                <a:off x="1403104" y="2703150"/>
+                <a:ext cx="1244123" cy="461665"/>
+              </a:xfrm>
+              <a:prstGeom prst="rect">
+                <a:avLst/>
+              </a:prstGeom>
+              <a:noFill/>
+            </p:spPr>
+            <p:txBody>
+              <a:bodyPr wrap="none" rtlCol="0">
+                <a:spAutoFit/>
+              </a:bodyPr>
+              <a:lstStyle/>
+              <a:p>
+                <a:pPr algn="ctr"/>
+                <a14:m>
+                  <m:oMathPara xmlns:m="http://schemas.openxmlformats.org/officeDocument/2006/math">
+                    <m:oMathParaPr>
+                      <m:jc m:val="centerGroup"/>
+                    </m:oMathParaPr>
+                    <m:oMath xmlns:m="http://schemas.openxmlformats.org/officeDocument/2006/math">
+                      <m:r>
+                        <a:rPr lang="en-US" altLang="ko-KR" sz="2400" b="0" i="1" smtClean="0">
+                          <a:latin typeface="Cambria Math"/>
+                        </a:rPr>
+                        <m:t>𝑠</m:t>
+                      </m:r>
+                      <m:r>
+                        <a:rPr lang="en-US" altLang="ko-KR" sz="2400" b="0" i="1" smtClean="0">
+                          <a:latin typeface="Cambria Math"/>
+                        </a:rPr>
+                        <m:t>:[0, 1]</m:t>
+                      </m:r>
+                    </m:oMath>
+                  </m:oMathPara>
+                </a14:m>
+                <a:endParaRPr lang="ko-KR" altLang="en-US" sz="2400" dirty="0"/>
+              </a:p>
+            </p:txBody>
+          </p:sp>
+        </mc:Choice>
+        <mc:Fallback>
+          <p:sp>
+            <p:nvSpPr>
+              <p:cNvPr id="16" name="TextBox 15"/>
+              <p:cNvSpPr txBox="1">
+                <a:spLocks noRot="1" noChangeAspect="1" noMove="1" noResize="1" noEditPoints="1" noAdjustHandles="1" noChangeArrowheads="1" noChangeShapeType="1" noTextEdit="1"/>
+              </p:cNvSpPr>
+              <p:nvPr/>
+            </p:nvSpPr>
+            <p:spPr>
+              <a:xfrm>
+                <a:off x="1403104" y="2703150"/>
+                <a:ext cx="1244123" cy="461665"/>
+              </a:xfrm>
+              <a:prstGeom prst="rect">
+                <a:avLst/>
+              </a:prstGeom>
+              <a:blipFill rotWithShape="1">
+                <a:blip r:embed="rId6"/>
+                <a:stretch>
+                  <a:fillRect b="-19737"/>
+                </a:stretch>
+              </a:blipFill>
+            </p:spPr>
+            <p:txBody>
+              <a:bodyPr/>
+              <a:lstStyle/>
+              <a:p>
+                <a:r>
+                  <a:rPr lang="ko-KR" altLang="en-US">
+                    <a:noFill/>
+                  </a:rPr>
+                  <a:t> </a:t>
+                </a:r>
+              </a:p>
+            </p:txBody>
+          </p:sp>
+        </mc:Fallback>
+      </mc:AlternateContent>
+      <mc:AlternateContent xmlns:mc="http://schemas.openxmlformats.org/markup-compatibility/2006">
+        <mc:Choice xmlns:a14="http://schemas.microsoft.com/office/drawing/2010/main" Requires="a14">
+          <p:sp>
+            <p:nvSpPr>
+              <p:cNvPr id="17" name="TextBox 16"/>
+              <p:cNvSpPr txBox="1"/>
+              <p:nvPr/>
+            </p:nvSpPr>
+            <p:spPr>
+              <a:xfrm>
+                <a:off x="5717619" y="2703150"/>
+                <a:ext cx="1267976" cy="461665"/>
+              </a:xfrm>
+              <a:prstGeom prst="rect">
+                <a:avLst/>
+              </a:prstGeom>
+              <a:noFill/>
+            </p:spPr>
+            <p:txBody>
+              <a:bodyPr wrap="none" rtlCol="0">
+                <a:spAutoFit/>
+              </a:bodyPr>
+              <a:lstStyle/>
+              <a:p>
+                <a:pPr algn="ctr"/>
+                <a14:m>
+                  <m:oMathPara xmlns:m="http://schemas.openxmlformats.org/officeDocument/2006/math">
+                    <m:oMathParaPr>
+                      <m:jc m:val="centerGroup"/>
+                    </m:oMathParaPr>
+                    <m:oMath xmlns:m="http://schemas.openxmlformats.org/officeDocument/2006/math">
+                      <m:r>
+                        <a:rPr lang="en-US" altLang="ko-KR" sz="2400" b="0" i="1" smtClean="0">
+                          <a:latin typeface="Cambria Math"/>
+                        </a:rPr>
+                        <m:t>𝑥</m:t>
+                      </m:r>
+                      <m:r>
+                        <a:rPr lang="en-US" altLang="ko-KR" sz="2400" b="0" i="1" smtClean="0">
+                          <a:latin typeface="Cambria Math"/>
+                        </a:rPr>
+                        <m:t>:[0, 2]</m:t>
+                      </m:r>
+                    </m:oMath>
+                  </m:oMathPara>
+                </a14:m>
+                <a:endParaRPr lang="ko-KR" altLang="en-US" sz="2400" dirty="0"/>
+              </a:p>
+            </p:txBody>
+          </p:sp>
+        </mc:Choice>
+        <mc:Fallback>
+          <p:sp>
+            <p:nvSpPr>
+              <p:cNvPr id="17" name="TextBox 16"/>
+              <p:cNvSpPr txBox="1">
+                <a:spLocks noRot="1" noChangeAspect="1" noMove="1" noResize="1" noEditPoints="1" noAdjustHandles="1" noChangeArrowheads="1" noChangeShapeType="1" noTextEdit="1"/>
+              </p:cNvSpPr>
+              <p:nvPr/>
+            </p:nvSpPr>
+            <p:spPr>
+              <a:xfrm>
+                <a:off x="5717619" y="2703150"/>
+                <a:ext cx="1267976" cy="461665"/>
+              </a:xfrm>
+              <a:prstGeom prst="rect">
+                <a:avLst/>
+              </a:prstGeom>
+              <a:blipFill rotWithShape="1">
+                <a:blip r:embed="rId7"/>
+                <a:stretch>
+                  <a:fillRect b="-19737"/>
+                </a:stretch>
+              </a:blipFill>
+            </p:spPr>
+            <p:txBody>
+              <a:bodyPr/>
+              <a:lstStyle/>
+              <a:p>
+                <a:r>
+                  <a:rPr lang="ko-KR" altLang="en-US">
+                    <a:noFill/>
+                  </a:rPr>
+                  <a:t> </a:t>
+                </a:r>
+              </a:p>
+            </p:txBody>
+          </p:sp>
+        </mc:Fallback>
+      </mc:AlternateContent>
+      <mc:AlternateContent xmlns:mc="http://schemas.openxmlformats.org/markup-compatibility/2006">
+        <mc:Choice xmlns:a14="http://schemas.microsoft.com/office/drawing/2010/main" Requires="a14">
+          <p:sp>
+            <p:nvSpPr>
+              <p:cNvPr id="18" name="TextBox 17"/>
+              <p:cNvSpPr txBox="1"/>
+              <p:nvPr/>
+            </p:nvSpPr>
+            <p:spPr>
+              <a:xfrm>
+                <a:off x="483337" y="3152453"/>
+                <a:ext cx="3083665" cy="461665"/>
+              </a:xfrm>
+              <a:prstGeom prst="rect">
+                <a:avLst/>
+              </a:prstGeom>
+              <a:noFill/>
+            </p:spPr>
+            <p:txBody>
+              <a:bodyPr wrap="none" rtlCol="0">
+                <a:spAutoFit/>
+              </a:bodyPr>
+              <a:lstStyle/>
+              <a:p>
+                <a:pPr algn="ctr"/>
+                <a14:m>
+                  <m:oMathPara xmlns:m="http://schemas.openxmlformats.org/officeDocument/2006/math">
+                    <m:oMathParaPr>
+                      <m:jc m:val="centerGroup"/>
+                    </m:oMathParaPr>
+                    <m:oMath xmlns:m="http://schemas.openxmlformats.org/officeDocument/2006/math">
+                      <m:sSub>
+                        <m:sSubPr>
+                          <m:ctrlPr>
+                            <a:rPr lang="en-US" altLang="ko-KR" sz="2400" b="0" i="1" smtClean="0">
+                              <a:latin typeface="Cambria Math"/>
+                            </a:rPr>
+                          </m:ctrlPr>
+                        </m:sSubPr>
+                        <m:e>
+                          <m:r>
+                            <a:rPr lang="en-US" altLang="ko-KR" sz="2400" b="0" i="1" smtClean="0">
+                              <a:latin typeface="Cambria Math"/>
+                            </a:rPr>
+                            <m:t>𝑝</m:t>
+                          </m:r>
+                        </m:e>
+                        <m:sub>
+                          <m:r>
+                            <a:rPr lang="en-US" altLang="ko-KR" sz="2400" b="0" i="1" smtClean="0">
+                              <a:latin typeface="Cambria Math"/>
+                            </a:rPr>
+                            <m:t>𝑠</m:t>
+                          </m:r>
+                        </m:sub>
+                      </m:sSub>
+                      <m:d>
+                        <m:dPr>
+                          <m:ctrlPr>
+                            <a:rPr lang="en-US" altLang="ko-KR" sz="2400" b="0" i="1" smtClean="0">
+                              <a:latin typeface="Cambria Math"/>
+                            </a:rPr>
+                          </m:ctrlPr>
+                        </m:dPr>
+                        <m:e>
+                          <m:r>
+                            <a:rPr lang="en-US" altLang="ko-KR" sz="2400" b="0" i="1" smtClean="0">
+                              <a:latin typeface="Cambria Math"/>
+                            </a:rPr>
+                            <m:t>𝑠</m:t>
+                          </m:r>
+                        </m:e>
+                      </m:d>
+                      <m:r>
+                        <a:rPr lang="en-US" altLang="ko-KR" sz="2400" b="0" i="1" smtClean="0">
+                          <a:latin typeface="Cambria Math"/>
+                        </a:rPr>
+                        <m:t>=1{0≤</m:t>
+                      </m:r>
+                      <m:r>
+                        <a:rPr lang="en-US" altLang="ko-KR" sz="2400" b="0" i="1" smtClean="0">
+                          <a:latin typeface="Cambria Math"/>
+                        </a:rPr>
+                        <m:t>𝑠</m:t>
+                      </m:r>
+                      <m:r>
+                        <a:rPr lang="en-US" altLang="ko-KR" sz="2400" b="0" i="1" smtClean="0">
+                          <a:latin typeface="Cambria Math"/>
+                        </a:rPr>
+                        <m:t>≤1}</m:t>
+                      </m:r>
+                    </m:oMath>
+                  </m:oMathPara>
+                </a14:m>
+                <a:endParaRPr lang="ko-KR" altLang="en-US" sz="2400" dirty="0"/>
+              </a:p>
+            </p:txBody>
+          </p:sp>
+        </mc:Choice>
+        <mc:Fallback>
+          <p:sp>
+            <p:nvSpPr>
+              <p:cNvPr id="18" name="TextBox 17"/>
+              <p:cNvSpPr txBox="1">
+                <a:spLocks noRot="1" noChangeAspect="1" noMove="1" noResize="1" noEditPoints="1" noAdjustHandles="1" noChangeArrowheads="1" noChangeShapeType="1" noTextEdit="1"/>
+              </p:cNvSpPr>
+              <p:nvPr/>
+            </p:nvSpPr>
+            <p:spPr>
+              <a:xfrm>
+                <a:off x="483337" y="3152453"/>
+                <a:ext cx="3083665" cy="461665"/>
+              </a:xfrm>
+              <a:prstGeom prst="rect">
+                <a:avLst/>
+              </a:prstGeom>
+              <a:blipFill rotWithShape="1">
+                <a:blip r:embed="rId8"/>
+                <a:stretch>
+                  <a:fillRect b="-19737"/>
+                </a:stretch>
+              </a:blipFill>
+            </p:spPr>
+            <p:txBody>
+              <a:bodyPr/>
+              <a:lstStyle/>
+              <a:p>
+                <a:r>
+                  <a:rPr lang="ko-KR" altLang="en-US">
+                    <a:noFill/>
+                  </a:rPr>
+                  <a:t> </a:t>
+                </a:r>
+              </a:p>
+            </p:txBody>
+          </p:sp>
+        </mc:Fallback>
+      </mc:AlternateContent>
+      <mc:AlternateContent xmlns:mc="http://schemas.openxmlformats.org/markup-compatibility/2006">
+        <mc:Choice xmlns:a14="http://schemas.microsoft.com/office/drawing/2010/main" Requires="a14">
+          <p:sp>
+            <p:nvSpPr>
+              <p:cNvPr id="19" name="TextBox 18"/>
+              <p:cNvSpPr txBox="1"/>
+              <p:nvPr/>
+            </p:nvSpPr>
+            <p:spPr>
+              <a:xfrm>
+                <a:off x="4443777" y="3152453"/>
+                <a:ext cx="3815660" cy="461665"/>
+              </a:xfrm>
+              <a:prstGeom prst="rect">
+                <a:avLst/>
+              </a:prstGeom>
+              <a:noFill/>
+            </p:spPr>
+            <p:txBody>
+              <a:bodyPr wrap="none" rtlCol="0">
+                <a:spAutoFit/>
+              </a:bodyPr>
+              <a:lstStyle/>
+              <a:p>
+                <a:pPr algn="ctr"/>
+                <a14:m>
+                  <m:oMathPara xmlns:m="http://schemas.openxmlformats.org/officeDocument/2006/math">
+                    <m:oMathParaPr>
+                      <m:jc m:val="centerGroup"/>
+                    </m:oMathParaPr>
+                    <m:oMath xmlns:m="http://schemas.openxmlformats.org/officeDocument/2006/math">
+                      <m:sSub>
+                        <m:sSubPr>
+                          <m:ctrlPr>
+                            <a:rPr lang="en-US" altLang="ko-KR" sz="2400" b="0" i="1" smtClean="0">
+                              <a:latin typeface="Cambria Math"/>
+                            </a:rPr>
+                          </m:ctrlPr>
+                        </m:sSubPr>
+                        <m:e>
+                          <m:r>
+                            <a:rPr lang="en-US" altLang="ko-KR" sz="2400" b="0" i="1" smtClean="0">
+                              <a:latin typeface="Cambria Math"/>
+                            </a:rPr>
+                            <m:t>𝑝</m:t>
+                          </m:r>
+                        </m:e>
+                        <m:sub>
+                          <m:r>
+                            <a:rPr lang="en-US" altLang="ko-KR" sz="2400" b="0" i="1" smtClean="0">
+                              <a:latin typeface="Cambria Math"/>
+                            </a:rPr>
+                            <m:t>𝑥</m:t>
+                          </m:r>
+                        </m:sub>
+                      </m:sSub>
+                      <m:d>
+                        <m:dPr>
+                          <m:ctrlPr>
+                            <a:rPr lang="en-US" altLang="ko-KR" sz="2400" b="0" i="1" smtClean="0">
+                              <a:latin typeface="Cambria Math"/>
+                            </a:rPr>
+                          </m:ctrlPr>
+                        </m:dPr>
+                        <m:e>
+                          <m:r>
+                            <a:rPr lang="en-US" altLang="ko-KR" sz="2400" b="0" i="1" smtClean="0">
+                              <a:latin typeface="Cambria Math"/>
+                            </a:rPr>
+                            <m:t>𝑥</m:t>
+                          </m:r>
+                        </m:e>
+                      </m:d>
+                      <m:r>
+                        <a:rPr lang="en-US" altLang="ko-KR" sz="2400" b="0" i="1" smtClean="0">
+                          <a:latin typeface="Cambria Math"/>
+                        </a:rPr>
+                        <m:t>=(0.5)1{0≤</m:t>
+                      </m:r>
+                      <m:r>
+                        <a:rPr lang="en-US" altLang="ko-KR" sz="2400" b="0" i="1" smtClean="0">
+                          <a:latin typeface="Cambria Math"/>
+                        </a:rPr>
+                        <m:t>𝑥</m:t>
+                      </m:r>
+                      <m:r>
+                        <a:rPr lang="en-US" altLang="ko-KR" sz="2400" b="0" i="1" smtClean="0">
+                          <a:latin typeface="Cambria Math"/>
+                        </a:rPr>
+                        <m:t>≤2}</m:t>
+                      </m:r>
+                    </m:oMath>
+                  </m:oMathPara>
+                </a14:m>
+                <a:endParaRPr lang="ko-KR" altLang="en-US" sz="2400" dirty="0"/>
+              </a:p>
+            </p:txBody>
+          </p:sp>
+        </mc:Choice>
+        <mc:Fallback>
+          <p:sp>
+            <p:nvSpPr>
+              <p:cNvPr id="19" name="TextBox 18"/>
+              <p:cNvSpPr txBox="1">
+                <a:spLocks noRot="1" noChangeAspect="1" noMove="1" noResize="1" noEditPoints="1" noAdjustHandles="1" noChangeArrowheads="1" noChangeShapeType="1" noTextEdit="1"/>
+              </p:cNvSpPr>
+              <p:nvPr/>
+            </p:nvSpPr>
+            <p:spPr>
+              <a:xfrm>
+                <a:off x="4443777" y="3152453"/>
+                <a:ext cx="3815660" cy="461665"/>
+              </a:xfrm>
+              <a:prstGeom prst="rect">
+                <a:avLst/>
+              </a:prstGeom>
+              <a:blipFill rotWithShape="1">
+                <a:blip r:embed="rId9"/>
+                <a:stretch>
+                  <a:fillRect b="-19737"/>
+                </a:stretch>
+              </a:blipFill>
+            </p:spPr>
+            <p:txBody>
+              <a:bodyPr/>
+              <a:lstStyle/>
+              <a:p>
+                <a:r>
+                  <a:rPr lang="ko-KR" altLang="en-US">
+                    <a:noFill/>
+                  </a:rPr>
+                  <a:t> </a:t>
+                </a:r>
+              </a:p>
+            </p:txBody>
+          </p:sp>
+        </mc:Fallback>
+      </mc:AlternateContent>
+      <p:cxnSp>
+        <p:nvCxnSpPr>
+          <p:cNvPr id="21" name="직선 화살표 연결선 20"/>
+          <p:cNvCxnSpPr/>
+          <p:nvPr/>
+        </p:nvCxnSpPr>
+        <p:spPr>
+          <a:xfrm>
+            <a:off x="679677" y="5214138"/>
+            <a:ext cx="2880320" cy="0"/>
+          </a:xfrm>
+          <a:prstGeom prst="straightConnector1">
+            <a:avLst/>
+          </a:prstGeom>
+          <a:ln w="38100">
+            <a:solidFill>
+              <a:schemeClr val="tx1"/>
+            </a:solidFill>
+            <a:tailEnd type="arrow"/>
+          </a:ln>
+        </p:spPr>
+        <p:style>
+          <a:lnRef idx="1">
+            <a:schemeClr val="accent1"/>
+          </a:lnRef>
+          <a:fillRef idx="0">
+            <a:schemeClr val="accent1"/>
+          </a:fillRef>
+          <a:effectRef idx="0">
+            <a:schemeClr val="accent1"/>
+          </a:effectRef>
+          <a:fontRef idx="minor">
+            <a:schemeClr val="tx1"/>
+          </a:fontRef>
+        </p:style>
+      </p:cxnSp>
+      <p:sp>
+        <p:nvSpPr>
+          <p:cNvPr id="23" name="직사각형 22"/>
+          <p:cNvSpPr/>
+          <p:nvPr/>
+        </p:nvSpPr>
+        <p:spPr>
+          <a:xfrm>
+            <a:off x="1322034" y="4278034"/>
+            <a:ext cx="1351207" cy="936104"/>
+          </a:xfrm>
+          <a:prstGeom prst="rect">
+            <a:avLst/>
+          </a:prstGeom>
+          <a:noFill/>
+          <a:ln>
+            <a:solidFill>
+              <a:schemeClr val="tx1"/>
+            </a:solidFill>
+          </a:ln>
+        </p:spPr>
+        <p:style>
+          <a:lnRef idx="2">
+            <a:schemeClr val="accent1">
+              <a:shade val="50000"/>
+            </a:schemeClr>
+          </a:lnRef>
+          <a:fillRef idx="1">
+            <a:schemeClr val="accent1"/>
+          </a:fillRef>
+          <a:effectRef idx="0">
+            <a:schemeClr val="accent1"/>
+          </a:effectRef>
+          <a:fontRef idx="minor">
+            <a:schemeClr val="lt1"/>
+          </a:fontRef>
+        </p:style>
+        <p:txBody>
+          <a:bodyPr rtlCol="0" anchor="ctr"/>
+          <a:lstStyle/>
+          <a:p>
+            <a:pPr algn="ctr"/>
+            <a:endParaRPr lang="ko-KR" altLang="en-US"/>
+          </a:p>
+        </p:txBody>
+      </p:sp>
+      <p:sp>
+        <p:nvSpPr>
+          <p:cNvPr id="24" name="TextBox 23"/>
+          <p:cNvSpPr txBox="1"/>
+          <p:nvPr/>
+        </p:nvSpPr>
+        <p:spPr>
+          <a:xfrm>
+            <a:off x="1160461" y="5276854"/>
+            <a:ext cx="311304" cy="369332"/>
+          </a:xfrm>
+          <a:prstGeom prst="rect">
+            <a:avLst/>
+          </a:prstGeom>
+          <a:noFill/>
+        </p:spPr>
+        <p:txBody>
+          <a:bodyPr wrap="none" rtlCol="0">
+            <a:spAutoFit/>
+          </a:bodyPr>
+          <a:lstStyle/>
+          <a:p>
+            <a:r>
+              <a:rPr lang="en-US" altLang="ko-KR" dirty="0" smtClean="0"/>
+              <a:t>0</a:t>
+            </a:r>
+            <a:endParaRPr lang="ko-KR" altLang="en-US" dirty="0"/>
+          </a:p>
+        </p:txBody>
+      </p:sp>
+      <p:sp>
+        <p:nvSpPr>
+          <p:cNvPr id="25" name="TextBox 24"/>
+          <p:cNvSpPr txBox="1"/>
+          <p:nvPr/>
+        </p:nvSpPr>
+        <p:spPr>
+          <a:xfrm>
+            <a:off x="2543172" y="5276854"/>
+            <a:ext cx="311304" cy="369332"/>
+          </a:xfrm>
+          <a:prstGeom prst="rect">
+            <a:avLst/>
+          </a:prstGeom>
+          <a:noFill/>
+        </p:spPr>
+        <p:txBody>
+          <a:bodyPr wrap="none" rtlCol="0">
+            <a:spAutoFit/>
+          </a:bodyPr>
+          <a:lstStyle/>
+          <a:p>
+            <a:r>
+              <a:rPr lang="en-US" altLang="ko-KR" dirty="0"/>
+              <a:t>1</a:t>
+            </a:r>
+            <a:endParaRPr lang="ko-KR" altLang="en-US" dirty="0"/>
+          </a:p>
+        </p:txBody>
+      </p:sp>
+      <p:cxnSp>
+        <p:nvCxnSpPr>
+          <p:cNvPr id="27" name="직선 화살표 연결선 26"/>
+          <p:cNvCxnSpPr/>
+          <p:nvPr/>
+        </p:nvCxnSpPr>
+        <p:spPr>
+          <a:xfrm>
+            <a:off x="4390044" y="5214138"/>
+            <a:ext cx="4086181" cy="0"/>
+          </a:xfrm>
+          <a:prstGeom prst="straightConnector1">
+            <a:avLst/>
+          </a:prstGeom>
+          <a:ln w="38100">
+            <a:solidFill>
+              <a:schemeClr val="tx1"/>
+            </a:solidFill>
+            <a:tailEnd type="arrow"/>
+          </a:ln>
+        </p:spPr>
+        <p:style>
+          <a:lnRef idx="1">
+            <a:schemeClr val="accent1"/>
+          </a:lnRef>
+          <a:fillRef idx="0">
+            <a:schemeClr val="accent1"/>
+          </a:fillRef>
+          <a:effectRef idx="0">
+            <a:schemeClr val="accent1"/>
+          </a:effectRef>
+          <a:fontRef idx="minor">
+            <a:schemeClr val="tx1"/>
+          </a:fontRef>
+        </p:style>
+      </p:cxnSp>
+      <p:sp>
+        <p:nvSpPr>
+          <p:cNvPr id="28" name="직사각형 27"/>
+          <p:cNvSpPr/>
+          <p:nvPr/>
+        </p:nvSpPr>
+        <p:spPr>
+          <a:xfrm>
+            <a:off x="5032401" y="4746086"/>
+            <a:ext cx="2759501" cy="468052"/>
+          </a:xfrm>
+          <a:prstGeom prst="rect">
+            <a:avLst/>
+          </a:prstGeom>
+          <a:noFill/>
+          <a:ln>
+            <a:solidFill>
+              <a:schemeClr val="tx1"/>
+            </a:solidFill>
+          </a:ln>
+        </p:spPr>
+        <p:style>
+          <a:lnRef idx="2">
+            <a:schemeClr val="accent1">
+              <a:shade val="50000"/>
+            </a:schemeClr>
+          </a:lnRef>
+          <a:fillRef idx="1">
+            <a:schemeClr val="accent1"/>
+          </a:fillRef>
+          <a:effectRef idx="0">
+            <a:schemeClr val="accent1"/>
+          </a:effectRef>
+          <a:fontRef idx="minor">
+            <a:schemeClr val="lt1"/>
+          </a:fontRef>
+        </p:style>
+        <p:txBody>
+          <a:bodyPr rtlCol="0" anchor="ctr"/>
+          <a:lstStyle/>
+          <a:p>
+            <a:pPr algn="ctr"/>
+            <a:endParaRPr lang="ko-KR" altLang="en-US"/>
+          </a:p>
+        </p:txBody>
+      </p:sp>
+      <p:sp>
+        <p:nvSpPr>
+          <p:cNvPr id="29" name="TextBox 28"/>
+          <p:cNvSpPr txBox="1"/>
+          <p:nvPr/>
+        </p:nvSpPr>
+        <p:spPr>
+          <a:xfrm>
+            <a:off x="4870828" y="5276854"/>
+            <a:ext cx="311304" cy="369332"/>
+          </a:xfrm>
+          <a:prstGeom prst="rect">
+            <a:avLst/>
+          </a:prstGeom>
+          <a:noFill/>
+        </p:spPr>
+        <p:txBody>
+          <a:bodyPr wrap="none" rtlCol="0">
+            <a:spAutoFit/>
+          </a:bodyPr>
+          <a:lstStyle/>
+          <a:p>
+            <a:r>
+              <a:rPr lang="en-US" altLang="ko-KR" dirty="0" smtClean="0"/>
+              <a:t>0</a:t>
+            </a:r>
+            <a:endParaRPr lang="ko-KR" altLang="en-US" dirty="0"/>
+          </a:p>
+        </p:txBody>
+      </p:sp>
+      <p:sp>
+        <p:nvSpPr>
+          <p:cNvPr id="30" name="TextBox 29"/>
+          <p:cNvSpPr txBox="1"/>
+          <p:nvPr/>
+        </p:nvSpPr>
+        <p:spPr>
+          <a:xfrm>
+            <a:off x="6253539" y="5276854"/>
+            <a:ext cx="311304" cy="369332"/>
+          </a:xfrm>
+          <a:prstGeom prst="rect">
+            <a:avLst/>
+          </a:prstGeom>
+          <a:noFill/>
+        </p:spPr>
+        <p:txBody>
+          <a:bodyPr wrap="none" rtlCol="0">
+            <a:spAutoFit/>
+          </a:bodyPr>
+          <a:lstStyle/>
+          <a:p>
+            <a:r>
+              <a:rPr lang="en-US" altLang="ko-KR" dirty="0" smtClean="0"/>
+              <a:t>1</a:t>
+            </a:r>
+            <a:endParaRPr lang="ko-KR" altLang="en-US" dirty="0"/>
+          </a:p>
+        </p:txBody>
+      </p:sp>
+      <p:sp>
+        <p:nvSpPr>
+          <p:cNvPr id="31" name="TextBox 30"/>
+          <p:cNvSpPr txBox="1"/>
+          <p:nvPr/>
+        </p:nvSpPr>
+        <p:spPr>
+          <a:xfrm>
+            <a:off x="7636250" y="5276854"/>
+            <a:ext cx="311304" cy="369332"/>
+          </a:xfrm>
+          <a:prstGeom prst="rect">
+            <a:avLst/>
+          </a:prstGeom>
+          <a:noFill/>
+        </p:spPr>
+        <p:txBody>
+          <a:bodyPr wrap="none" rtlCol="0">
+            <a:spAutoFit/>
+          </a:bodyPr>
+          <a:lstStyle/>
+          <a:p>
+            <a:r>
+              <a:rPr lang="en-US" altLang="ko-KR" dirty="0" smtClean="0"/>
+              <a:t>2</a:t>
+            </a:r>
+            <a:endParaRPr lang="ko-KR" altLang="en-US" dirty="0"/>
+          </a:p>
+        </p:txBody>
+      </p:sp>
+      <p:sp>
+        <p:nvSpPr>
+          <p:cNvPr id="33" name="TextBox 32"/>
+          <p:cNvSpPr txBox="1"/>
+          <p:nvPr/>
+        </p:nvSpPr>
+        <p:spPr>
+          <a:xfrm>
+            <a:off x="2722767" y="4093368"/>
+            <a:ext cx="311304" cy="369332"/>
+          </a:xfrm>
+          <a:prstGeom prst="rect">
+            <a:avLst/>
+          </a:prstGeom>
+          <a:noFill/>
+        </p:spPr>
+        <p:txBody>
+          <a:bodyPr wrap="none" rtlCol="0">
+            <a:spAutoFit/>
+          </a:bodyPr>
+          <a:lstStyle/>
+          <a:p>
+            <a:r>
+              <a:rPr lang="en-US" altLang="ko-KR" dirty="0"/>
+              <a:t>1</a:t>
+            </a:r>
+            <a:endParaRPr lang="ko-KR" altLang="en-US" dirty="0"/>
+          </a:p>
+        </p:txBody>
+      </p:sp>
+      <p:sp>
+        <p:nvSpPr>
+          <p:cNvPr id="34" name="TextBox 33"/>
+          <p:cNvSpPr txBox="1"/>
+          <p:nvPr/>
+        </p:nvSpPr>
+        <p:spPr>
+          <a:xfrm>
+            <a:off x="7870640" y="4561420"/>
+            <a:ext cx="489236" cy="369332"/>
+          </a:xfrm>
+          <a:prstGeom prst="rect">
+            <a:avLst/>
+          </a:prstGeom>
+          <a:noFill/>
+        </p:spPr>
+        <p:txBody>
+          <a:bodyPr wrap="none" rtlCol="0">
+            <a:spAutoFit/>
+          </a:bodyPr>
+          <a:lstStyle/>
+          <a:p>
+            <a:r>
+              <a:rPr lang="en-US" altLang="ko-KR" dirty="0" smtClean="0"/>
+              <a:t>0.5</a:t>
+            </a:r>
+            <a:endParaRPr lang="ko-KR" altLang="en-US" dirty="0"/>
+          </a:p>
+        </p:txBody>
+      </p:sp>
+      <mc:AlternateContent xmlns:mc="http://schemas.openxmlformats.org/markup-compatibility/2006">
+        <mc:Choice xmlns:a14="http://schemas.microsoft.com/office/drawing/2010/main" Requires="a14">
+          <p:sp>
+            <p:nvSpPr>
+              <p:cNvPr id="35" name="직사각형 34"/>
+              <p:cNvSpPr/>
+              <p:nvPr/>
+            </p:nvSpPr>
+            <p:spPr>
+              <a:xfrm>
+                <a:off x="687641" y="3877344"/>
+                <a:ext cx="784124" cy="369332"/>
+              </a:xfrm>
+              <a:prstGeom prst="rect">
+                <a:avLst/>
+              </a:prstGeom>
+            </p:spPr>
+            <p:txBody>
+              <a:bodyPr wrap="none">
+                <a:spAutoFit/>
+              </a:bodyPr>
+              <a:lstStyle/>
+              <a:p>
+                <a14:m>
+                  <m:oMathPara xmlns:m="http://schemas.openxmlformats.org/officeDocument/2006/math">
+                    <m:oMathParaPr>
+                      <m:jc m:val="centerGroup"/>
+                    </m:oMathParaPr>
+                    <m:oMath xmlns:m="http://schemas.openxmlformats.org/officeDocument/2006/math">
+                      <m:sSub>
+                        <m:sSubPr>
+                          <m:ctrlPr>
+                            <a:rPr lang="en-US" altLang="ko-KR" i="1">
+                              <a:latin typeface="Cambria Math"/>
+                            </a:rPr>
+                          </m:ctrlPr>
+                        </m:sSubPr>
+                        <m:e>
+                          <m:r>
+                            <a:rPr lang="en-US" altLang="ko-KR" i="1">
+                              <a:latin typeface="Cambria Math"/>
+                            </a:rPr>
+                            <m:t>𝑝</m:t>
+                          </m:r>
+                        </m:e>
+                        <m:sub>
+                          <m:r>
+                            <a:rPr lang="en-US" altLang="ko-KR" i="1">
+                              <a:latin typeface="Cambria Math"/>
+                            </a:rPr>
+                            <m:t>𝑠</m:t>
+                          </m:r>
+                        </m:sub>
+                      </m:sSub>
+                      <m:d>
+                        <m:dPr>
+                          <m:ctrlPr>
+                            <a:rPr lang="en-US" altLang="ko-KR" i="1">
+                              <a:latin typeface="Cambria Math"/>
+                            </a:rPr>
+                          </m:ctrlPr>
+                        </m:dPr>
+                        <m:e>
+                          <m:r>
+                            <a:rPr lang="en-US" altLang="ko-KR" i="1">
+                              <a:latin typeface="Cambria Math"/>
+                            </a:rPr>
+                            <m:t>𝑠</m:t>
+                          </m:r>
+                        </m:e>
+                      </m:d>
+                    </m:oMath>
+                  </m:oMathPara>
+                </a14:m>
+                <a:endParaRPr lang="ko-KR" altLang="en-US" dirty="0"/>
+              </a:p>
+            </p:txBody>
+          </p:sp>
+        </mc:Choice>
+        <mc:Fallback>
+          <p:sp>
+            <p:nvSpPr>
+              <p:cNvPr id="35" name="직사각형 34"/>
+              <p:cNvSpPr>
+                <a:spLocks noRot="1" noChangeAspect="1" noMove="1" noResize="1" noEditPoints="1" noAdjustHandles="1" noChangeArrowheads="1" noChangeShapeType="1" noTextEdit="1"/>
+              </p:cNvSpPr>
+              <p:nvPr/>
+            </p:nvSpPr>
+            <p:spPr>
+              <a:xfrm>
+                <a:off x="687641" y="3877344"/>
+                <a:ext cx="784124" cy="369332"/>
+              </a:xfrm>
+              <a:prstGeom prst="rect">
+                <a:avLst/>
+              </a:prstGeom>
+              <a:blipFill rotWithShape="1">
+                <a:blip r:embed="rId10"/>
+                <a:stretch>
+                  <a:fillRect b="-8197"/>
+                </a:stretch>
+              </a:blipFill>
+            </p:spPr>
+            <p:txBody>
+              <a:bodyPr/>
+              <a:lstStyle/>
+              <a:p>
+                <a:r>
+                  <a:rPr lang="ko-KR" altLang="en-US">
+                    <a:noFill/>
+                  </a:rPr>
+                  <a:t> </a:t>
+                </a:r>
+              </a:p>
+            </p:txBody>
+          </p:sp>
+        </mc:Fallback>
+      </mc:AlternateContent>
+      <mc:AlternateContent xmlns:mc="http://schemas.openxmlformats.org/markup-compatibility/2006">
+        <mc:Choice xmlns:a14="http://schemas.microsoft.com/office/drawing/2010/main" Requires="a14">
+          <p:sp>
+            <p:nvSpPr>
+              <p:cNvPr id="36" name="직사각형 35"/>
+              <p:cNvSpPr/>
+              <p:nvPr/>
+            </p:nvSpPr>
+            <p:spPr>
+              <a:xfrm>
+                <a:off x="4478766" y="4376754"/>
+                <a:ext cx="821059" cy="369332"/>
+              </a:xfrm>
+              <a:prstGeom prst="rect">
+                <a:avLst/>
+              </a:prstGeom>
+            </p:spPr>
+            <p:txBody>
+              <a:bodyPr wrap="none">
+                <a:spAutoFit/>
+              </a:bodyPr>
+              <a:lstStyle/>
+              <a:p>
+                <a14:m>
+                  <m:oMathPara xmlns:m="http://schemas.openxmlformats.org/officeDocument/2006/math">
+                    <m:oMathParaPr>
+                      <m:jc m:val="centerGroup"/>
+                    </m:oMathParaPr>
+                    <m:oMath xmlns:m="http://schemas.openxmlformats.org/officeDocument/2006/math">
+                      <m:sSub>
+                        <m:sSubPr>
+                          <m:ctrlPr>
+                            <a:rPr lang="en-US" altLang="ko-KR" i="1" smtClean="0">
+                              <a:latin typeface="Cambria Math"/>
+                            </a:rPr>
+                          </m:ctrlPr>
+                        </m:sSubPr>
+                        <m:e>
+                          <m:r>
+                            <a:rPr lang="en-US" altLang="ko-KR" i="1">
+                              <a:latin typeface="Cambria Math"/>
+                            </a:rPr>
+                            <m:t>𝑝</m:t>
+                          </m:r>
+                        </m:e>
+                        <m:sub>
+                          <m:r>
+                            <a:rPr lang="en-US" altLang="ko-KR" b="0" i="1" smtClean="0">
+                              <a:latin typeface="Cambria Math"/>
+                            </a:rPr>
+                            <m:t>𝑥</m:t>
+                          </m:r>
+                        </m:sub>
+                      </m:sSub>
+                      <m:d>
+                        <m:dPr>
+                          <m:ctrlPr>
+                            <a:rPr lang="en-US" altLang="ko-KR" i="1">
+                              <a:latin typeface="Cambria Math"/>
+                            </a:rPr>
+                          </m:ctrlPr>
+                        </m:dPr>
+                        <m:e>
+                          <m:r>
+                            <a:rPr lang="en-US" altLang="ko-KR" b="0" i="1" smtClean="0">
+                              <a:latin typeface="Cambria Math"/>
+                            </a:rPr>
+                            <m:t>𝑥</m:t>
+                          </m:r>
+                        </m:e>
+                      </m:d>
+                    </m:oMath>
+                  </m:oMathPara>
+                </a14:m>
+                <a:endParaRPr lang="ko-KR" altLang="en-US" dirty="0"/>
+              </a:p>
+            </p:txBody>
+          </p:sp>
+        </mc:Choice>
+        <mc:Fallback>
+          <p:sp>
+            <p:nvSpPr>
+              <p:cNvPr id="36" name="직사각형 35"/>
+              <p:cNvSpPr>
+                <a:spLocks noRot="1" noChangeAspect="1" noMove="1" noResize="1" noEditPoints="1" noAdjustHandles="1" noChangeArrowheads="1" noChangeShapeType="1" noTextEdit="1"/>
+              </p:cNvSpPr>
+              <p:nvPr/>
+            </p:nvSpPr>
+            <p:spPr>
+              <a:xfrm>
+                <a:off x="4478766" y="4376754"/>
+                <a:ext cx="821059" cy="369332"/>
+              </a:xfrm>
+              <a:prstGeom prst="rect">
+                <a:avLst/>
+              </a:prstGeom>
+              <a:blipFill rotWithShape="1">
+                <a:blip r:embed="rId11"/>
+                <a:stretch>
+                  <a:fillRect b="-8197"/>
+                </a:stretch>
+              </a:blipFill>
+            </p:spPr>
+            <p:txBody>
+              <a:bodyPr/>
+              <a:lstStyle/>
+              <a:p>
+                <a:r>
+                  <a:rPr lang="ko-KR" altLang="en-US">
+                    <a:noFill/>
+                  </a:rPr>
+                  <a:t> </a:t>
+                </a:r>
+              </a:p>
+            </p:txBody>
+          </p:sp>
+        </mc:Fallback>
+      </mc:AlternateContent>
+      <mc:AlternateContent xmlns:mc="http://schemas.openxmlformats.org/markup-compatibility/2006">
+        <mc:Choice xmlns:a14="http://schemas.microsoft.com/office/drawing/2010/main" Requires="a14">
+          <p:sp>
+            <p:nvSpPr>
+              <p:cNvPr id="38" name="직사각형 37"/>
+              <p:cNvSpPr/>
+              <p:nvPr/>
+            </p:nvSpPr>
+            <p:spPr>
+              <a:xfrm>
+                <a:off x="3435665" y="5203722"/>
+                <a:ext cx="378565" cy="369332"/>
+              </a:xfrm>
+              <a:prstGeom prst="rect">
+                <a:avLst/>
+              </a:prstGeom>
+            </p:spPr>
+            <p:txBody>
+              <a:bodyPr wrap="none">
+                <a:spAutoFit/>
+              </a:bodyPr>
+              <a:lstStyle/>
+              <a:p>
+                <a14:m>
+                  <m:oMathPara xmlns:m="http://schemas.openxmlformats.org/officeDocument/2006/math">
+                    <m:oMathParaPr>
+                      <m:jc m:val="centerGroup"/>
+                    </m:oMathParaPr>
+                    <m:oMath xmlns:m="http://schemas.openxmlformats.org/officeDocument/2006/math">
+                      <m:r>
+                        <a:rPr lang="en-US" altLang="ko-KR" i="1">
+                          <a:latin typeface="Cambria Math"/>
+                        </a:rPr>
+                        <m:t>𝑠</m:t>
+                      </m:r>
+                    </m:oMath>
+                  </m:oMathPara>
+                </a14:m>
+                <a:endParaRPr lang="ko-KR" altLang="en-US" dirty="0"/>
+              </a:p>
+            </p:txBody>
+          </p:sp>
+        </mc:Choice>
+        <mc:Fallback>
+          <p:sp>
+            <p:nvSpPr>
+              <p:cNvPr id="38" name="직사각형 37"/>
+              <p:cNvSpPr>
+                <a:spLocks noRot="1" noChangeAspect="1" noMove="1" noResize="1" noEditPoints="1" noAdjustHandles="1" noChangeArrowheads="1" noChangeShapeType="1" noTextEdit="1"/>
+              </p:cNvSpPr>
+              <p:nvPr/>
+            </p:nvSpPr>
+            <p:spPr>
+              <a:xfrm>
+                <a:off x="3435665" y="5203722"/>
+                <a:ext cx="378565" cy="369332"/>
+              </a:xfrm>
+              <a:prstGeom prst="rect">
+                <a:avLst/>
+              </a:prstGeom>
+              <a:blipFill rotWithShape="1">
+                <a:blip r:embed="rId12"/>
+                <a:stretch>
+                  <a:fillRect/>
+                </a:stretch>
+              </a:blipFill>
+            </p:spPr>
+            <p:txBody>
+              <a:bodyPr/>
+              <a:lstStyle/>
+              <a:p>
+                <a:r>
+                  <a:rPr lang="ko-KR" altLang="en-US">
+                    <a:noFill/>
+                  </a:rPr>
+                  <a:t> </a:t>
+                </a:r>
+              </a:p>
+            </p:txBody>
+          </p:sp>
+        </mc:Fallback>
+      </mc:AlternateContent>
+      <mc:AlternateContent xmlns:mc="http://schemas.openxmlformats.org/markup-compatibility/2006">
+        <mc:Choice xmlns:a14="http://schemas.microsoft.com/office/drawing/2010/main" Requires="a14">
+          <p:sp>
+            <p:nvSpPr>
+              <p:cNvPr id="39" name="직사각형 38"/>
+              <p:cNvSpPr/>
+              <p:nvPr/>
+            </p:nvSpPr>
+            <p:spPr>
+              <a:xfrm>
+                <a:off x="8332209" y="5203722"/>
+                <a:ext cx="396840" cy="369332"/>
+              </a:xfrm>
+              <a:prstGeom prst="rect">
+                <a:avLst/>
+              </a:prstGeom>
+            </p:spPr>
+            <p:txBody>
+              <a:bodyPr wrap="none">
+                <a:spAutoFit/>
+              </a:bodyPr>
+              <a:lstStyle/>
+              <a:p>
+                <a14:m>
+                  <m:oMathPara xmlns:m="http://schemas.openxmlformats.org/officeDocument/2006/math">
+                    <m:oMathParaPr>
+                      <m:jc m:val="centerGroup"/>
+                    </m:oMathParaPr>
+                    <m:oMath xmlns:m="http://schemas.openxmlformats.org/officeDocument/2006/math">
+                      <m:r>
+                        <a:rPr lang="en-US" altLang="ko-KR" b="0" i="1" smtClean="0">
+                          <a:latin typeface="Cambria Math"/>
+                        </a:rPr>
+                        <m:t>𝑥</m:t>
+                      </m:r>
+                    </m:oMath>
+                  </m:oMathPara>
+                </a14:m>
+                <a:endParaRPr lang="ko-KR" altLang="en-US" dirty="0"/>
+              </a:p>
+            </p:txBody>
+          </p:sp>
+        </mc:Choice>
+        <mc:Fallback>
+          <p:sp>
+            <p:nvSpPr>
+              <p:cNvPr id="39" name="직사각형 38"/>
+              <p:cNvSpPr>
+                <a:spLocks noRot="1" noChangeAspect="1" noMove="1" noResize="1" noEditPoints="1" noAdjustHandles="1" noChangeArrowheads="1" noChangeShapeType="1" noTextEdit="1"/>
+              </p:cNvSpPr>
+              <p:nvPr/>
+            </p:nvSpPr>
+            <p:spPr>
+              <a:xfrm>
+                <a:off x="8332209" y="5203722"/>
+                <a:ext cx="396840" cy="369332"/>
+              </a:xfrm>
+              <a:prstGeom prst="rect">
+                <a:avLst/>
+              </a:prstGeom>
+              <a:blipFill rotWithShape="1">
+                <a:blip r:embed="rId13"/>
+                <a:stretch>
+                  <a:fillRect/>
+                </a:stretch>
+              </a:blipFill>
+            </p:spPr>
+            <p:txBody>
+              <a:bodyPr/>
+              <a:lstStyle/>
+              <a:p>
+                <a:r>
+                  <a:rPr lang="ko-KR" altLang="en-US">
+                    <a:noFill/>
+                  </a:rPr>
+                  <a:t> </a:t>
+                </a:r>
+              </a:p>
+            </p:txBody>
+          </p:sp>
+        </mc:Fallback>
+      </mc:AlternateContent>
+    </p:spTree>
+    <p:extLst>
+      <p:ext uri="{BB962C8B-B14F-4D97-AF65-F5344CB8AC3E}">
+        <p14:creationId xmlns:p14="http://schemas.microsoft.com/office/powerpoint/2010/main" val="2574278763"/>
+      </p:ext>
+    </p:extLst>
+  </p:cSld>
+  <p:clrMapOvr>
+    <a:masterClrMapping/>
+  </p:clrMapOvr>
+  <p:timing>
+    <p:tnLst>
+      <p:par>
+        <p:cTn id="1" dur="indefinite" restart="never" nodeType="tmRoot"/>
+      </p:par>
+    </p:tnLst>
+  </p:timing>
 </p:sld>
 </file>
 

</xml_diff>